<commit_message>
Polish README and update dependencies
</commit_message>
<xml_diff>
--- a/samples/cn_art.pptx
+++ b/samples/cn_art.pptx
@@ -7,9 +7,8 @@
   <p:sldIdLst>
     <p:sldId id="256" r:id="rId7"/>
     <p:sldId id="257" r:id="rId8"/>
-    <p:sldId id="258" r:id="rId9"/>
-    <p:sldId id="259" r:id="rId10"/>
-    <p:sldId id="260" r:id="rId11"/>
+    <p:sldId id="258" r:id="rId10"/>
+    <p:sldId id="259" r:id="rId11"/>
   </p:sldIdLst>
   <p:sldSz cx="9144000" cy="6858000" type="screen4x3"/>
   <p:notesSz cx="6858000" cy="9144000"/>
@@ -109,6 +108,566 @@
     </a:lvl9pPr>
   </p:defaultTextStyle>
 </p:presentation>
+</file>
+
+<file path=ppt/notesMasters/notesMaster1.xml><?xml version="1.0" encoding="utf-8"?>
+<p:notesMaster xmlns:a="http://schemas.openxmlformats.org/drawingml/2006/main" xmlns:p="http://schemas.openxmlformats.org/presentationml/2006/main" xmlns:r="http://schemas.openxmlformats.org/officeDocument/2006/relationships">
+  <p:cSld>
+    <p:bg>
+      <p:bgRef idx="1001">
+        <a:schemeClr val="bg1"/>
+      </p:bgRef>
+    </p:bg>
+    <p:spTree>
+      <p:nvGrpSpPr>
+        <p:cNvPr id="1" name=""/>
+        <p:cNvGrpSpPr/>
+        <p:nvPr/>
+      </p:nvGrpSpPr>
+      <p:grpSpPr>
+        <a:xfrm>
+          <a:off x="0" y="0"/>
+          <a:ext cx="0" cy="0"/>
+          <a:chOff x="0" y="0"/>
+          <a:chExt cx="0" cy="0"/>
+        </a:xfrm>
+      </p:grpSpPr>
+      <p:sp>
+        <p:nvSpPr>
+          <p:cNvPr id="2" name="Header Placeholder 1"/>
+          <p:cNvSpPr>
+            <a:spLocks noGrp="1"/>
+          </p:cNvSpPr>
+          <p:nvPr>
+            <p:ph type="hdr" sz="quarter"/>
+          </p:nvPr>
+        </p:nvSpPr>
+        <p:spPr>
+          <a:xfrm>
+            <a:off x="0" y="0"/>
+            <a:ext cx="2971800" cy="457200"/>
+          </a:xfrm>
+          <a:prstGeom prst="rect">
+            <a:avLst/>
+          </a:prstGeom>
+        </p:spPr>
+        <p:txBody>
+          <a:bodyPr vert="horz" lIns="91440" tIns="45720" rIns="91440" bIns="45720" rtlCol="0"/>
+          <a:lstStyle>
+            <a:lvl1pPr algn="l">
+              <a:defRPr sz="1200"/>
+            </a:lvl1pPr>
+          </a:lstStyle>
+          <a:p>
+            <a:endParaRPr lang="en-US"/>
+          </a:p>
+        </p:txBody>
+      </p:sp>
+      <p:sp>
+        <p:nvSpPr>
+          <p:cNvPr id="3" name="Date Placeholder 2"/>
+          <p:cNvSpPr>
+            <a:spLocks noGrp="1"/>
+          </p:cNvSpPr>
+          <p:nvPr>
+            <p:ph type="dt" idx="1"/>
+          </p:nvPr>
+        </p:nvSpPr>
+        <p:spPr>
+          <a:xfrm>
+            <a:off x="3884613" y="0"/>
+            <a:ext cx="2971800" cy="457200"/>
+          </a:xfrm>
+          <a:prstGeom prst="rect">
+            <a:avLst/>
+          </a:prstGeom>
+        </p:spPr>
+        <p:txBody>
+          <a:bodyPr vert="horz" lIns="91440" tIns="45720" rIns="91440" bIns="45720" rtlCol="0"/>
+          <a:lstStyle>
+            <a:lvl1pPr algn="r">
+              <a:defRPr sz="1200"/>
+            </a:lvl1pPr>
+          </a:lstStyle>
+          <a:p>
+            <a:fld id="{0F89C1C7-3DCD-1040-A9CF-14679D8B5DDD}" type="datetimeFigureOut">
+              <a:rPr lang="en-US" smtClean="0"/>
+              <a:t>10/17/16</a:t>
+            </a:fld>
+            <a:endParaRPr lang="en-US"/>
+          </a:p>
+        </p:txBody>
+      </p:sp>
+      <p:sp>
+        <p:nvSpPr>
+          <p:cNvPr id="4" name="Slide Image Placeholder 3"/>
+          <p:cNvSpPr>
+            <a:spLocks noGrp="1" noRot="1" noChangeAspect="1"/>
+          </p:cNvSpPr>
+          <p:nvPr>
+            <p:ph type="sldImg" idx="2"/>
+          </p:nvPr>
+        </p:nvSpPr>
+        <p:spPr>
+          <a:xfrm>
+            <a:off x="1143000" y="685800"/>
+            <a:ext cx="4572000" cy="3429000"/>
+          </a:xfrm>
+          <a:prstGeom prst="rect">
+            <a:avLst/>
+          </a:prstGeom>
+          <a:noFill/>
+          <a:ln w="12700">
+            <a:solidFill>
+              <a:prstClr val="black"/>
+            </a:solidFill>
+          </a:ln>
+        </p:spPr>
+        <p:txBody>
+          <a:bodyPr vert="horz" lIns="91440" tIns="45720" rIns="91440" bIns="45720" rtlCol="0" anchor="ctr"/>
+          <a:lstStyle/>
+          <a:p>
+            <a:endParaRPr lang="en-US"/>
+          </a:p>
+        </p:txBody>
+      </p:sp>
+      <p:sp>
+        <p:nvSpPr>
+          <p:cNvPr id="5" name="Notes Placeholder 4"/>
+          <p:cNvSpPr>
+            <a:spLocks noGrp="1"/>
+          </p:cNvSpPr>
+          <p:nvPr>
+            <p:ph type="body" sz="quarter" idx="3"/>
+          </p:nvPr>
+        </p:nvSpPr>
+        <p:spPr>
+          <a:xfrm>
+            <a:off x="685800" y="4343400"/>
+            <a:ext cx="5486400" cy="4114800"/>
+          </a:xfrm>
+          <a:prstGeom prst="rect">
+            <a:avLst/>
+          </a:prstGeom>
+        </p:spPr>
+        <p:txBody>
+          <a:bodyPr vert="horz" lIns="91440" tIns="45720" rIns="91440" bIns="45720" rtlCol="0"/>
+          <a:lstStyle/>
+          <a:p>
+            <a:pPr lvl="0"/>
+            <a:r>
+              <a:rPr lang="en-US" smtClean="0"/>
+              <a:t>Click to edit Master text styles</a:t>
+            </a:r>
+          </a:p>
+          <a:p>
+            <a:pPr lvl="1"/>
+            <a:r>
+              <a:rPr lang="en-US" smtClean="0"/>
+              <a:t>Second level</a:t>
+            </a:r>
+          </a:p>
+          <a:p>
+            <a:pPr lvl="2"/>
+            <a:r>
+              <a:rPr lang="en-US" smtClean="0"/>
+              <a:t>Third level</a:t>
+            </a:r>
+          </a:p>
+          <a:p>
+            <a:pPr lvl="3"/>
+            <a:r>
+              <a:rPr lang="en-US" smtClean="0"/>
+              <a:t>Fourth level</a:t>
+            </a:r>
+          </a:p>
+          <a:p>
+            <a:pPr lvl="4"/>
+            <a:r>
+              <a:rPr lang="en-US" smtClean="0"/>
+              <a:t>Fifth level</a:t>
+            </a:r>
+            <a:endParaRPr lang="en-US"/>
+          </a:p>
+        </p:txBody>
+      </p:sp>
+      <p:sp>
+        <p:nvSpPr>
+          <p:cNvPr id="6" name="Footer Placeholder 5"/>
+          <p:cNvSpPr>
+            <a:spLocks noGrp="1"/>
+          </p:cNvSpPr>
+          <p:nvPr>
+            <p:ph type="ftr" sz="quarter" idx="4"/>
+          </p:nvPr>
+        </p:nvSpPr>
+        <p:spPr>
+          <a:xfrm>
+            <a:off x="0" y="8685213"/>
+            <a:ext cx="2971800" cy="457200"/>
+          </a:xfrm>
+          <a:prstGeom prst="rect">
+            <a:avLst/>
+          </a:prstGeom>
+        </p:spPr>
+        <p:txBody>
+          <a:bodyPr vert="horz" lIns="91440" tIns="45720" rIns="91440" bIns="45720" rtlCol="0" anchor="b"/>
+          <a:lstStyle>
+            <a:lvl1pPr algn="l">
+              <a:defRPr sz="1200"/>
+            </a:lvl1pPr>
+          </a:lstStyle>
+          <a:p>
+            <a:endParaRPr lang="en-US"/>
+          </a:p>
+        </p:txBody>
+      </p:sp>
+      <p:sp>
+        <p:nvSpPr>
+          <p:cNvPr id="7" name="Slide Number Placeholder 6"/>
+          <p:cNvSpPr>
+            <a:spLocks noGrp="1"/>
+          </p:cNvSpPr>
+          <p:nvPr>
+            <p:ph type="sldNum" sz="quarter" idx="5"/>
+          </p:nvPr>
+        </p:nvSpPr>
+        <p:spPr>
+          <a:xfrm>
+            <a:off x="3884613" y="8685213"/>
+            <a:ext cx="2971800" cy="457200"/>
+          </a:xfrm>
+          <a:prstGeom prst="rect">
+            <a:avLst/>
+          </a:prstGeom>
+        </p:spPr>
+        <p:txBody>
+          <a:bodyPr vert="horz" lIns="91440" tIns="45720" rIns="91440" bIns="45720" rtlCol="0" anchor="b"/>
+          <a:lstStyle>
+            <a:lvl1pPr algn="r">
+              <a:defRPr sz="1200"/>
+            </a:lvl1pPr>
+          </a:lstStyle>
+          <a:p>
+            <a:fld id="{BB5E49A5-4136-284D-997B-48E1D791AD67}" type="slidenum">
+              <a:rPr lang="en-US" smtClean="0"/>
+              <a:t>‹#›</a:t>
+            </a:fld>
+            <a:endParaRPr lang="en-US"/>
+          </a:p>
+        </p:txBody>
+      </p:sp>
+    </p:spTree>
+    <p:extLst>
+      <p:ext uri="{BB962C8B-B14F-4D97-AF65-F5344CB8AC3E}">
+        <p14:creationId xmlns:p14="http://schemas.microsoft.com/office/powerpoint/2010/main" val="2623252185"/>
+      </p:ext>
+    </p:extLst>
+  </p:cSld>
+  <p:clrMap bg1="lt1" tx1="dk1" bg2="lt2" tx2="dk2" accent1="accent1" accent2="accent2" accent3="accent3" accent4="accent4" accent5="accent5" accent6="accent6" hlink="hlink" folHlink="folHlink"/>
+  <p:notesStyle>
+    <a:lvl1pPr marL="0" algn="l" defTabSz="457200" rtl="0" eaLnBrk="1" latinLnBrk="0" hangingPunct="1">
+      <a:defRPr sz="1200" kern="1200">
+        <a:solidFill>
+          <a:schemeClr val="tx1"/>
+        </a:solidFill>
+        <a:latin typeface="+mn-lt"/>
+        <a:ea typeface="+mn-ea"/>
+        <a:cs typeface="+mn-cs"/>
+      </a:defRPr>
+    </a:lvl1pPr>
+    <a:lvl2pPr marL="457200" algn="l" defTabSz="457200" rtl="0" eaLnBrk="1" latinLnBrk="0" hangingPunct="1">
+      <a:defRPr sz="1200" kern="1200">
+        <a:solidFill>
+          <a:schemeClr val="tx1"/>
+        </a:solidFill>
+        <a:latin typeface="+mn-lt"/>
+        <a:ea typeface="+mn-ea"/>
+        <a:cs typeface="+mn-cs"/>
+      </a:defRPr>
+    </a:lvl2pPr>
+    <a:lvl3pPr marL="914400" algn="l" defTabSz="457200" rtl="0" eaLnBrk="1" latinLnBrk="0" hangingPunct="1">
+      <a:defRPr sz="1200" kern="1200">
+        <a:solidFill>
+          <a:schemeClr val="tx1"/>
+        </a:solidFill>
+        <a:latin typeface="+mn-lt"/>
+        <a:ea typeface="+mn-ea"/>
+        <a:cs typeface="+mn-cs"/>
+      </a:defRPr>
+    </a:lvl3pPr>
+    <a:lvl4pPr marL="1371600" algn="l" defTabSz="457200" rtl="0" eaLnBrk="1" latinLnBrk="0" hangingPunct="1">
+      <a:defRPr sz="1200" kern="1200">
+        <a:solidFill>
+          <a:schemeClr val="tx1"/>
+        </a:solidFill>
+        <a:latin typeface="+mn-lt"/>
+        <a:ea typeface="+mn-ea"/>
+        <a:cs typeface="+mn-cs"/>
+      </a:defRPr>
+    </a:lvl4pPr>
+    <a:lvl5pPr marL="1828800" algn="l" defTabSz="457200" rtl="0" eaLnBrk="1" latinLnBrk="0" hangingPunct="1">
+      <a:defRPr sz="1200" kern="1200">
+        <a:solidFill>
+          <a:schemeClr val="tx1"/>
+        </a:solidFill>
+        <a:latin typeface="+mn-lt"/>
+        <a:ea typeface="+mn-ea"/>
+        <a:cs typeface="+mn-cs"/>
+      </a:defRPr>
+    </a:lvl5pPr>
+    <a:lvl6pPr marL="2286000" algn="l" defTabSz="457200" rtl="0" eaLnBrk="1" latinLnBrk="0" hangingPunct="1">
+      <a:defRPr sz="1200" kern="1200">
+        <a:solidFill>
+          <a:schemeClr val="tx1"/>
+        </a:solidFill>
+        <a:latin typeface="+mn-lt"/>
+        <a:ea typeface="+mn-ea"/>
+        <a:cs typeface="+mn-cs"/>
+      </a:defRPr>
+    </a:lvl6pPr>
+    <a:lvl7pPr marL="2743200" algn="l" defTabSz="457200" rtl="0" eaLnBrk="1" latinLnBrk="0" hangingPunct="1">
+      <a:defRPr sz="1200" kern="1200">
+        <a:solidFill>
+          <a:schemeClr val="tx1"/>
+        </a:solidFill>
+        <a:latin typeface="+mn-lt"/>
+        <a:ea typeface="+mn-ea"/>
+        <a:cs typeface="+mn-cs"/>
+      </a:defRPr>
+    </a:lvl7pPr>
+    <a:lvl8pPr marL="3200400" algn="l" defTabSz="457200" rtl="0" eaLnBrk="1" latinLnBrk="0" hangingPunct="1">
+      <a:defRPr sz="1200" kern="1200">
+        <a:solidFill>
+          <a:schemeClr val="tx1"/>
+        </a:solidFill>
+        <a:latin typeface="+mn-lt"/>
+        <a:ea typeface="+mn-ea"/>
+        <a:cs typeface="+mn-cs"/>
+      </a:defRPr>
+    </a:lvl8pPr>
+    <a:lvl9pPr marL="3657600" algn="l" defTabSz="457200" rtl="0" eaLnBrk="1" latinLnBrk="0" hangingPunct="1">
+      <a:defRPr sz="1200" kern="1200">
+        <a:solidFill>
+          <a:schemeClr val="tx1"/>
+        </a:solidFill>
+        <a:latin typeface="+mn-lt"/>
+        <a:ea typeface="+mn-ea"/>
+        <a:cs typeface="+mn-cs"/>
+      </a:defRPr>
+    </a:lvl9pPr>
+  </p:notesStyle>
+</p:notesMaster>
+</file>
+
+<file path=ppt/notesSlides/notesSlide1.xml><?xml version="1.0" encoding="utf-8"?>
+<p:notes xmlns:a="http://schemas.openxmlformats.org/drawingml/2006/main" xmlns:p="http://schemas.openxmlformats.org/presentationml/2006/main" xmlns:r="http://schemas.openxmlformats.org/officeDocument/2006/relationships">
+  <p:cSld>
+    <p:spTree>
+      <p:nvGrpSpPr>
+        <p:cNvPr id="1" name=""/>
+        <p:cNvGrpSpPr/>
+        <p:nvPr/>
+      </p:nvGrpSpPr>
+      <p:grpSpPr>
+        <a:xfrm>
+          <a:off x="0" y="0"/>
+          <a:ext cx="0" cy="0"/>
+          <a:chOff x="0" y="0"/>
+          <a:chExt cx="0" cy="0"/>
+        </a:xfrm>
+      </p:grpSpPr>
+      <p:sp>
+        <p:nvSpPr>
+          <p:cNvPr id="2" name="Slide Image Placeholder 1"/>
+          <p:cNvSpPr>
+            <a:spLocks noGrp="1"/>
+          </p:cNvSpPr>
+          <p:nvPr>
+            <p:ph type="sldImg" idx="2"/>
+          </p:nvPr>
+        </p:nvSpPr>
+        <p:spPr/>
+      </p:sp>
+      <p:sp>
+        <p:nvSpPr>
+          <p:cNvPr id="3" name="Notes Placeholder 2"/>
+          <p:cNvSpPr>
+            <a:spLocks noGrp="1"/>
+          </p:cNvSpPr>
+          <p:nvPr>
+            <p:ph type="body" idx="3" sz="quarter"/>
+          </p:nvPr>
+        </p:nvSpPr>
+        <p:spPr/>
+        <p:txBody>
+          <a:bodyPr/>
+          <a:lstStyle/>
+          <a:p>
+            <a:r>
+              <a:t>背景介绍。</a:t>
+            </a:r>
+          </a:p>
+        </p:txBody>
+      </p:sp>
+      <p:sp>
+        <p:nvSpPr>
+          <p:cNvPr id="4" name="Slide Number Placeholder 3"/>
+          <p:cNvSpPr>
+            <a:spLocks noGrp="1"/>
+          </p:cNvSpPr>
+          <p:nvPr>
+            <p:ph type="sldNum" idx="5" sz="quarter"/>
+          </p:nvPr>
+        </p:nvSpPr>
+        <p:spPr/>
+      </p:sp>
+    </p:spTree>
+  </p:cSld>
+  <p:clrMapOvr>
+    <a:masterClrMapping/>
+  </p:clrMapOvr>
+</p:notes>
+</file>
+
+<file path=ppt/notesSlides/notesSlide2.xml><?xml version="1.0" encoding="utf-8"?>
+<p:notes xmlns:a="http://schemas.openxmlformats.org/drawingml/2006/main" xmlns:p="http://schemas.openxmlformats.org/presentationml/2006/main" xmlns:r="http://schemas.openxmlformats.org/officeDocument/2006/relationships">
+  <p:cSld>
+    <p:spTree>
+      <p:nvGrpSpPr>
+        <p:cNvPr id="1" name=""/>
+        <p:cNvGrpSpPr/>
+        <p:nvPr/>
+      </p:nvGrpSpPr>
+      <p:grpSpPr>
+        <a:xfrm>
+          <a:off x="0" y="0"/>
+          <a:ext cx="0" cy="0"/>
+          <a:chOff x="0" y="0"/>
+          <a:chExt cx="0" cy="0"/>
+        </a:xfrm>
+      </p:grpSpPr>
+      <p:sp>
+        <p:nvSpPr>
+          <p:cNvPr id="2" name="Slide Image Placeholder 1"/>
+          <p:cNvSpPr>
+            <a:spLocks noGrp="1"/>
+          </p:cNvSpPr>
+          <p:nvPr>
+            <p:ph type="sldImg" idx="2"/>
+          </p:nvPr>
+        </p:nvSpPr>
+        <p:spPr/>
+      </p:sp>
+      <p:sp>
+        <p:nvSpPr>
+          <p:cNvPr id="3" name="Notes Placeholder 2"/>
+          <p:cNvSpPr>
+            <a:spLocks noGrp="1"/>
+          </p:cNvSpPr>
+          <p:nvPr>
+            <p:ph type="body" idx="3" sz="quarter"/>
+          </p:nvPr>
+        </p:nvSpPr>
+        <p:spPr/>
+        <p:txBody>
+          <a:bodyPr/>
+          <a:lstStyle/>
+          <a:p>
+            <a:r>
+              <a:t>详细介绍核心艺术家。</a:t>
+            </a:r>
+          </a:p>
+        </p:txBody>
+      </p:sp>
+      <p:sp>
+        <p:nvSpPr>
+          <p:cNvPr id="4" name="Slide Number Placeholder 3"/>
+          <p:cNvSpPr>
+            <a:spLocks noGrp="1"/>
+          </p:cNvSpPr>
+          <p:nvPr>
+            <p:ph type="sldNum" idx="5" sz="quarter"/>
+          </p:nvPr>
+        </p:nvSpPr>
+        <p:spPr/>
+      </p:sp>
+    </p:spTree>
+  </p:cSld>
+  <p:clrMapOvr>
+    <a:masterClrMapping/>
+  </p:clrMapOvr>
+</p:notes>
+</file>
+
+<file path=ppt/notesSlides/notesSlide3.xml><?xml version="1.0" encoding="utf-8"?>
+<p:notes xmlns:a="http://schemas.openxmlformats.org/drawingml/2006/main" xmlns:p="http://schemas.openxmlformats.org/presentationml/2006/main" xmlns:r="http://schemas.openxmlformats.org/officeDocument/2006/relationships">
+  <p:cSld>
+    <p:spTree>
+      <p:nvGrpSpPr>
+        <p:cNvPr id="1" name=""/>
+        <p:cNvGrpSpPr/>
+        <p:nvPr/>
+      </p:nvGrpSpPr>
+      <p:grpSpPr>
+        <a:xfrm>
+          <a:off x="0" y="0"/>
+          <a:ext cx="0" cy="0"/>
+          <a:chOff x="0" y="0"/>
+          <a:chExt cx="0" cy="0"/>
+        </a:xfrm>
+      </p:grpSpPr>
+      <p:sp>
+        <p:nvSpPr>
+          <p:cNvPr id="2" name="Slide Image Placeholder 1"/>
+          <p:cNvSpPr>
+            <a:spLocks noGrp="1"/>
+          </p:cNvSpPr>
+          <p:nvPr>
+            <p:ph type="sldImg" idx="2"/>
+          </p:nvPr>
+        </p:nvSpPr>
+        <p:spPr/>
+      </p:sp>
+      <p:sp>
+        <p:nvSpPr>
+          <p:cNvPr id="3" name="Notes Placeholder 2"/>
+          <p:cNvSpPr>
+            <a:spLocks noGrp="1"/>
+          </p:cNvSpPr>
+          <p:nvPr>
+            <p:ph type="body" idx="3" sz="quarter"/>
+          </p:nvPr>
+        </p:nvSpPr>
+        <p:spPr/>
+        <p:txBody>
+          <a:bodyPr/>
+          <a:lstStyle/>
+          <a:p>
+            <a:r>
+              <a:t>分析技术层面的突破。</a:t>
+            </a:r>
+          </a:p>
+        </p:txBody>
+      </p:sp>
+      <p:sp>
+        <p:nvSpPr>
+          <p:cNvPr id="4" name="Slide Number Placeholder 3"/>
+          <p:cNvSpPr>
+            <a:spLocks noGrp="1"/>
+          </p:cNvSpPr>
+          <p:nvPr>
+            <p:ph type="sldNum" idx="5" sz="quarter"/>
+          </p:nvPr>
+        </p:nvSpPr>
+        <p:spPr/>
+      </p:sp>
+    </p:spTree>
+  </p:cSld>
+  <p:clrMapOvr>
+    <a:masterClrMapping/>
+  </p:clrMapOvr>
+</p:notes>
 </file>
 
 <file path=ppt/slideLayouts/slideLayout1.xml><?xml version="1.0" encoding="utf-8"?>
@@ -3108,7 +3667,7 @@
           <a:lstStyle/>
           <a:p>
             <a:r>
-              <a:t>Sample title</a:t>
+              <a:t>文艺复兴艺术赏析</a:t>
             </a:r>
           </a:p>
         </p:txBody>
@@ -3129,7 +3688,7 @@
           <a:lstStyle/>
           <a:p>
             <a:r>
-              <a:t>Generated for: 文艺复兴艺术赏析</a:t>
+              <a:t>AutoPPT 自动生成示例</a:t>
             </a:r>
           </a:p>
         </p:txBody>
@@ -3168,7 +3727,7 @@
           <a:lstStyle/>
           <a:p>
             <a:r>
-              <a:t>Sample title</a:t>
+              <a:t>文艺复兴起源</a:t>
             </a:r>
           </a:p>
         </p:txBody>
@@ -3191,19 +3750,19 @@
           <a:p>
             <a:pPr/>
             <a:r>
-              <a:t>Item 0</a:t>
+              <a:t>14-16 世纪起源于意大利佛罗伦萨</a:t>
             </a:r>
           </a:p>
           <a:p>
             <a:pPr/>
             <a:r>
-              <a:t>Item 1</a:t>
+              <a:t>以人文主义为核心，强调对人的价值的肯定</a:t>
             </a:r>
           </a:p>
           <a:p>
             <a:pPr/>
             <a:r>
-              <a:t>Item 2</a:t>
+              <a:t>重新发现和学习古希腊与罗马的古典文化</a:t>
             </a:r>
           </a:p>
         </p:txBody>
@@ -3242,7 +3801,7 @@
           <a:lstStyle/>
           <a:p>
             <a:r>
-              <a:t>Sample title</a:t>
+              <a:t>文艺复兴三杰</a:t>
             </a:r>
           </a:p>
         </p:txBody>
@@ -3265,19 +3824,19 @@
           <a:p>
             <a:pPr/>
             <a:r>
-              <a:t>Item 0</a:t>
+              <a:t>达芬奇：代表作《蒙娜丽莎》、《最后的晚餐》</a:t>
             </a:r>
           </a:p>
           <a:p>
             <a:pPr/>
             <a:r>
-              <a:t>Item 1</a:t>
+              <a:t>米开朗基罗：代表作《大卫像》、西斯廷教堂壁画</a:t>
             </a:r>
           </a:p>
           <a:p>
             <a:pPr/>
             <a:r>
-              <a:t>Item 2</a:t>
+              <a:t>拉斐尔：以优雅的圣母像和《雅典学院》闻名</a:t>
             </a:r>
           </a:p>
         </p:txBody>
@@ -3316,7 +3875,7 @@
           <a:lstStyle/>
           <a:p>
             <a:r>
-              <a:t>Sample title</a:t>
+              <a:t>艺术特征与技术</a:t>
             </a:r>
           </a:p>
         </p:txBody>
@@ -3339,99 +3898,19 @@
           <a:p>
             <a:pPr/>
             <a:r>
-              <a:t>Item 0</a:t>
+              <a:t>透视法的应用创造了真实的空间感</a:t>
             </a:r>
           </a:p>
           <a:p>
             <a:pPr/>
             <a:r>
-              <a:t>Item 1</a:t>
+              <a:t>对人体解剖学的深入研究提高了表现力</a:t>
             </a:r>
           </a:p>
           <a:p>
             <a:pPr/>
             <a:r>
-              <a:t>Item 2</a:t>
-            </a:r>
-          </a:p>
-        </p:txBody>
-      </p:sp>
-    </p:spTree>
-  </p:cSld>
-  <p:clrMapOvr>
-    <a:masterClrMapping/>
-  </p:clrMapOvr>
-</p:sld>
-</file>
-
-<file path=ppt/slides/slide5.xml><?xml version="1.0" encoding="utf-8"?>
-<p:sld xmlns:a="http://schemas.openxmlformats.org/drawingml/2006/main" xmlns:p="http://schemas.openxmlformats.org/presentationml/2006/main" xmlns:r="http://schemas.openxmlformats.org/officeDocument/2006/relationships">
-  <p:cSld>
-    <p:spTree>
-      <p:nvGrpSpPr>
-        <p:cNvPr id="1" name=""/>
-        <p:cNvGrpSpPr/>
-        <p:nvPr/>
-      </p:nvGrpSpPr>
-      <p:grpSpPr/>
-      <p:sp>
-        <p:nvSpPr>
-          <p:cNvPr id="2" name="Title 1"/>
-          <p:cNvSpPr>
-            <a:spLocks noGrp="1"/>
-          </p:cNvSpPr>
-          <p:nvPr>
-            <p:ph type="title"/>
-          </p:nvPr>
-        </p:nvSpPr>
-        <p:spPr/>
-        <p:txBody>
-          <a:bodyPr/>
-          <a:lstStyle/>
-          <a:p>
-            <a:r>
-              <a:t>References</a:t>
-            </a:r>
-          </a:p>
-        </p:txBody>
-      </p:sp>
-      <p:sp>
-        <p:nvSpPr>
-          <p:cNvPr id="3" name="Content Placeholder 2"/>
-          <p:cNvSpPr>
-            <a:spLocks noGrp="1"/>
-          </p:cNvSpPr>
-          <p:nvPr>
-            <p:ph idx="1"/>
-          </p:nvPr>
-        </p:nvSpPr>
-        <p:spPr/>
-        <p:txBody>
-          <a:bodyPr/>
-          <a:lstStyle/>
-          <a:p/>
-          <a:p>
-            <a:pPr>
-              <a:defRPr sz="1200"/>
-            </a:pPr>
-            <a:r>
-              <a:t>Item 0</a:t>
-            </a:r>
-          </a:p>
-          <a:p>
-            <a:pPr>
-              <a:defRPr sz="1200"/>
-            </a:pPr>
-            <a:r>
-              <a:t>Item 2</a:t>
-            </a:r>
-          </a:p>
-          <a:p>
-            <a:pPr>
-              <a:defRPr sz="1200"/>
-            </a:pPr>
-            <a:r>
-              <a:t>Item 1</a:t>
+              <a:t>明暗对照法 (Chiaroscuro) 增强了立体感</a:t>
             </a:r>
           </a:p>
         </p:txBody>
@@ -3762,4 +4241,324 @@
   </a:objectDefaults>
   <a:extraClrSchemeLst/>
 </a:theme>
+</file>
+
+<file path=ppt/theme/theme2.xml><?xml version="1.0" encoding="utf-8"?>
+<a:theme xmlns:a="http://schemas.openxmlformats.org/drawingml/2006/main" name="Office Theme">
+  <a:themeElements>
+    <a:clrScheme name="Office">
+      <a:dk1>
+        <a:sysClr val="windowText" lastClr="000000"/>
+      </a:dk1>
+      <a:lt1>
+        <a:sysClr val="window" lastClr="FFFFFF"/>
+      </a:lt1>
+      <a:dk2>
+        <a:srgbClr val="1F497D"/>
+      </a:dk2>
+      <a:lt2>
+        <a:srgbClr val="EEECE1"/>
+      </a:lt2>
+      <a:accent1>
+        <a:srgbClr val="4F81BD"/>
+      </a:accent1>
+      <a:accent2>
+        <a:srgbClr val="C0504D"/>
+      </a:accent2>
+      <a:accent3>
+        <a:srgbClr val="9BBB59"/>
+      </a:accent3>
+      <a:accent4>
+        <a:srgbClr val="8064A2"/>
+      </a:accent4>
+      <a:accent5>
+        <a:srgbClr val="4BACC6"/>
+      </a:accent5>
+      <a:accent6>
+        <a:srgbClr val="F79646"/>
+      </a:accent6>
+      <a:hlink>
+        <a:srgbClr val="0000FF"/>
+      </a:hlink>
+      <a:folHlink>
+        <a:srgbClr val="800080"/>
+      </a:folHlink>
+    </a:clrScheme>
+    <a:fontScheme name="Office">
+      <a:majorFont>
+        <a:latin typeface="Calibri"/>
+        <a:ea typeface=""/>
+        <a:cs typeface=""/>
+        <a:font script="Jpan" typeface="ＭＳ Ｐゴシック"/>
+        <a:font script="Hang" typeface="맑은 고딕"/>
+        <a:font script="Hans" typeface="宋体"/>
+        <a:font script="Hant" typeface="新細明體"/>
+        <a:font script="Arab" typeface="Times New Roman"/>
+        <a:font script="Hebr" typeface="Times New Roman"/>
+        <a:font script="Thai" typeface="Angsana New"/>
+        <a:font script="Ethi" typeface="Nyala"/>
+        <a:font script="Beng" typeface="Vrinda"/>
+        <a:font script="Gujr" typeface="Shruti"/>
+        <a:font script="Khmr" typeface="MoolBoran"/>
+        <a:font script="Knda" typeface="Tunga"/>
+        <a:font script="Guru" typeface="Raavi"/>
+        <a:font script="Cans" typeface="Euphemia"/>
+        <a:font script="Cher" typeface="Plantagenet Cherokee"/>
+        <a:font script="Yiii" typeface="Microsoft Yi Baiti"/>
+        <a:font script="Tibt" typeface="Microsoft Himalaya"/>
+        <a:font script="Thaa" typeface="MV Boli"/>
+        <a:font script="Deva" typeface="Mangal"/>
+        <a:font script="Telu" typeface="Gautami"/>
+        <a:font script="Taml" typeface="Latha"/>
+        <a:font script="Syrc" typeface="Estrangelo Edessa"/>
+        <a:font script="Orya" typeface="Kalinga"/>
+        <a:font script="Mlym" typeface="Kartika"/>
+        <a:font script="Laoo" typeface="DokChampa"/>
+        <a:font script="Sinh" typeface="Iskoola Pota"/>
+        <a:font script="Mong" typeface="Mongolian Baiti"/>
+        <a:font script="Viet" typeface="Times New Roman"/>
+        <a:font script="Uigh" typeface="Microsoft Uighur"/>
+        <a:font script="Geor" typeface="Sylfaen"/>
+      </a:majorFont>
+      <a:minorFont>
+        <a:latin typeface="Calibri"/>
+        <a:ea typeface=""/>
+        <a:cs typeface=""/>
+        <a:font script="Jpan" typeface="ＭＳ Ｐゴシック"/>
+        <a:font script="Hang" typeface="맑은 고딕"/>
+        <a:font script="Hans" typeface="宋体"/>
+        <a:font script="Hant" typeface="新細明體"/>
+        <a:font script="Arab" typeface="Arial"/>
+        <a:font script="Hebr" typeface="Arial"/>
+        <a:font script="Thai" typeface="Cordia New"/>
+        <a:font script="Ethi" typeface="Nyala"/>
+        <a:font script="Beng" typeface="Vrinda"/>
+        <a:font script="Gujr" typeface="Shruti"/>
+        <a:font script="Khmr" typeface="DaunPenh"/>
+        <a:font script="Knda" typeface="Tunga"/>
+        <a:font script="Guru" typeface="Raavi"/>
+        <a:font script="Cans" typeface="Euphemia"/>
+        <a:font script="Cher" typeface="Plantagenet Cherokee"/>
+        <a:font script="Yiii" typeface="Microsoft Yi Baiti"/>
+        <a:font script="Tibt" typeface="Microsoft Himalaya"/>
+        <a:font script="Thaa" typeface="MV Boli"/>
+        <a:font script="Deva" typeface="Mangal"/>
+        <a:font script="Telu" typeface="Gautami"/>
+        <a:font script="Taml" typeface="Latha"/>
+        <a:font script="Syrc" typeface="Estrangelo Edessa"/>
+        <a:font script="Orya" typeface="Kalinga"/>
+        <a:font script="Mlym" typeface="Kartika"/>
+        <a:font script="Laoo" typeface="DokChampa"/>
+        <a:font script="Sinh" typeface="Iskoola Pota"/>
+        <a:font script="Mong" typeface="Mongolian Baiti"/>
+        <a:font script="Viet" typeface="Arial"/>
+        <a:font script="Uigh" typeface="Microsoft Uighur"/>
+        <a:font script="Geor" typeface="Sylfaen"/>
+      </a:minorFont>
+    </a:fontScheme>
+    <a:fmtScheme name="Office">
+      <a:fillStyleLst>
+        <a:solidFill>
+          <a:schemeClr val="phClr"/>
+        </a:solidFill>
+        <a:gradFill rotWithShape="1">
+          <a:gsLst>
+            <a:gs pos="0">
+              <a:schemeClr val="phClr">
+                <a:tint val="50000"/>
+                <a:satMod val="300000"/>
+              </a:schemeClr>
+            </a:gs>
+            <a:gs pos="35000">
+              <a:schemeClr val="phClr">
+                <a:tint val="37000"/>
+                <a:satMod val="300000"/>
+              </a:schemeClr>
+            </a:gs>
+            <a:gs pos="100000">
+              <a:schemeClr val="phClr">
+                <a:tint val="15000"/>
+                <a:satMod val="350000"/>
+              </a:schemeClr>
+            </a:gs>
+          </a:gsLst>
+          <a:lin ang="16200000" scaled="1"/>
+        </a:gradFill>
+        <a:gradFill rotWithShape="1">
+          <a:gsLst>
+            <a:gs pos="0">
+              <a:schemeClr val="phClr">
+                <a:tint val="100000"/>
+                <a:shade val="100000"/>
+                <a:satMod val="130000"/>
+              </a:schemeClr>
+            </a:gs>
+            <a:gs pos="100000">
+              <a:schemeClr val="phClr">
+                <a:tint val="50000"/>
+                <a:shade val="100000"/>
+                <a:satMod val="350000"/>
+              </a:schemeClr>
+            </a:gs>
+          </a:gsLst>
+          <a:lin ang="16200000" scaled="0"/>
+        </a:gradFill>
+      </a:fillStyleLst>
+      <a:lnStyleLst>
+        <a:ln w="9525" cap="flat" cmpd="sng" algn="ctr">
+          <a:solidFill>
+            <a:schemeClr val="phClr">
+              <a:shade val="95000"/>
+              <a:satMod val="105000"/>
+            </a:schemeClr>
+          </a:solidFill>
+          <a:prstDash val="solid"/>
+        </a:ln>
+        <a:ln w="25400" cap="flat" cmpd="sng" algn="ctr">
+          <a:solidFill>
+            <a:schemeClr val="phClr"/>
+          </a:solidFill>
+          <a:prstDash val="solid"/>
+        </a:ln>
+        <a:ln w="38100" cap="flat" cmpd="sng" algn="ctr">
+          <a:solidFill>
+            <a:schemeClr val="phClr"/>
+          </a:solidFill>
+          <a:prstDash val="solid"/>
+        </a:ln>
+      </a:lnStyleLst>
+      <a:effectStyleLst>
+        <a:effectStyle>
+          <a:effectLst>
+            <a:outerShdw blurRad="40000" dist="20000" dir="5400000" rotWithShape="0">
+              <a:srgbClr val="000000">
+                <a:alpha val="38000"/>
+              </a:srgbClr>
+            </a:outerShdw>
+          </a:effectLst>
+        </a:effectStyle>
+        <a:effectStyle>
+          <a:effectLst>
+            <a:outerShdw blurRad="40000" dist="23000" dir="5400000" rotWithShape="0">
+              <a:srgbClr val="000000">
+                <a:alpha val="35000"/>
+              </a:srgbClr>
+            </a:outerShdw>
+          </a:effectLst>
+        </a:effectStyle>
+        <a:effectStyle>
+          <a:effectLst>
+            <a:outerShdw blurRad="40000" dist="23000" dir="5400000" rotWithShape="0">
+              <a:srgbClr val="000000">
+                <a:alpha val="35000"/>
+              </a:srgbClr>
+            </a:outerShdw>
+          </a:effectLst>
+          <a:scene3d>
+            <a:camera prst="orthographicFront">
+              <a:rot lat="0" lon="0" rev="0"/>
+            </a:camera>
+            <a:lightRig rig="threePt" dir="t">
+              <a:rot lat="0" lon="0" rev="1200000"/>
+            </a:lightRig>
+          </a:scene3d>
+          <a:sp3d>
+            <a:bevelT w="63500" h="25400"/>
+          </a:sp3d>
+        </a:effectStyle>
+      </a:effectStyleLst>
+      <a:bgFillStyleLst>
+        <a:solidFill>
+          <a:schemeClr val="phClr"/>
+        </a:solidFill>
+        <a:gradFill rotWithShape="1">
+          <a:gsLst>
+            <a:gs pos="0">
+              <a:schemeClr val="phClr">
+                <a:tint val="40000"/>
+                <a:satMod val="350000"/>
+              </a:schemeClr>
+            </a:gs>
+            <a:gs pos="40000">
+              <a:schemeClr val="phClr">
+                <a:tint val="45000"/>
+                <a:shade val="99000"/>
+                <a:satMod val="350000"/>
+              </a:schemeClr>
+            </a:gs>
+            <a:gs pos="100000">
+              <a:schemeClr val="phClr">
+                <a:shade val="20000"/>
+                <a:satMod val="255000"/>
+              </a:schemeClr>
+            </a:gs>
+          </a:gsLst>
+          <a:path path="circle">
+            <a:fillToRect l="50000" t="-80000" r="50000" b="180000"/>
+          </a:path>
+        </a:gradFill>
+        <a:gradFill rotWithShape="1">
+          <a:gsLst>
+            <a:gs pos="0">
+              <a:schemeClr val="phClr">
+                <a:tint val="80000"/>
+                <a:satMod val="300000"/>
+              </a:schemeClr>
+            </a:gs>
+            <a:gs pos="100000">
+              <a:schemeClr val="phClr">
+                <a:shade val="30000"/>
+                <a:satMod val="200000"/>
+              </a:schemeClr>
+            </a:gs>
+          </a:gsLst>
+          <a:path path="circle">
+            <a:fillToRect l="50000" t="50000" r="50000" b="50000"/>
+          </a:path>
+        </a:gradFill>
+      </a:bgFillStyleLst>
+    </a:fmtScheme>
+  </a:themeElements>
+  <a:objectDefaults>
+    <a:spDef>
+      <a:spPr/>
+      <a:bodyPr/>
+      <a:lstStyle/>
+      <a:style>
+        <a:lnRef idx="1">
+          <a:schemeClr val="accent1"/>
+        </a:lnRef>
+        <a:fillRef idx="3">
+          <a:schemeClr val="accent1"/>
+        </a:fillRef>
+        <a:effectRef idx="2">
+          <a:schemeClr val="accent1"/>
+        </a:effectRef>
+        <a:fontRef idx="minor">
+          <a:schemeClr val="lt1"/>
+        </a:fontRef>
+      </a:style>
+    </a:spDef>
+    <a:lnDef>
+      <a:spPr/>
+      <a:bodyPr/>
+      <a:lstStyle/>
+      <a:style>
+        <a:lnRef idx="2">
+          <a:schemeClr val="accent1"/>
+        </a:lnRef>
+        <a:fillRef idx="0">
+          <a:schemeClr val="accent1"/>
+        </a:fillRef>
+        <a:effectRef idx="1">
+          <a:schemeClr val="accent1"/>
+        </a:effectRef>
+        <a:fontRef idx="minor">
+          <a:schemeClr val="tx1"/>
+        </a:fontRef>
+      </a:style>
+    </a:lnDef>
+  </a:objectDefaults>
+  <a:extraClrSchemeLst/>
+</a:theme>
 </file>
</xml_diff>

<commit_message>
Final v0.1 polish: Migrated to google-genai SDK, fixed warnings, and updated samples with substantive research content
</commit_message>
<xml_diff>
--- a/samples/cn_art.pptx
+++ b/samples/cn_art.pptx
@@ -7,8 +7,15 @@
   <p:sldIdLst>
     <p:sldId id="256" r:id="rId7"/>
     <p:sldId id="257" r:id="rId8"/>
-    <p:sldId id="258" r:id="rId10"/>
-    <p:sldId id="259" r:id="rId11"/>
+    <p:sldId id="258" r:id="rId9"/>
+    <p:sldId id="259" r:id="rId10"/>
+    <p:sldId id="260" r:id="rId11"/>
+    <p:sldId id="261" r:id="rId12"/>
+    <p:sldId id="262" r:id="rId13"/>
+    <p:sldId id="263" r:id="rId14"/>
+    <p:sldId id="264" r:id="rId15"/>
+    <p:sldId id="265" r:id="rId16"/>
+    <p:sldId id="266" r:id="rId17"/>
   </p:sldIdLst>
   <p:sldSz cx="9144000" cy="6858000" type="screen4x3"/>
   <p:notesSz cx="6858000" cy="9144000"/>
@@ -108,566 +115,6 @@
     </a:lvl9pPr>
   </p:defaultTextStyle>
 </p:presentation>
-</file>
-
-<file path=ppt/notesMasters/notesMaster1.xml><?xml version="1.0" encoding="utf-8"?>
-<p:notesMaster xmlns:a="http://schemas.openxmlformats.org/drawingml/2006/main" xmlns:p="http://schemas.openxmlformats.org/presentationml/2006/main" xmlns:r="http://schemas.openxmlformats.org/officeDocument/2006/relationships">
-  <p:cSld>
-    <p:bg>
-      <p:bgRef idx="1001">
-        <a:schemeClr val="bg1"/>
-      </p:bgRef>
-    </p:bg>
-    <p:spTree>
-      <p:nvGrpSpPr>
-        <p:cNvPr id="1" name=""/>
-        <p:cNvGrpSpPr/>
-        <p:nvPr/>
-      </p:nvGrpSpPr>
-      <p:grpSpPr>
-        <a:xfrm>
-          <a:off x="0" y="0"/>
-          <a:ext cx="0" cy="0"/>
-          <a:chOff x="0" y="0"/>
-          <a:chExt cx="0" cy="0"/>
-        </a:xfrm>
-      </p:grpSpPr>
-      <p:sp>
-        <p:nvSpPr>
-          <p:cNvPr id="2" name="Header Placeholder 1"/>
-          <p:cNvSpPr>
-            <a:spLocks noGrp="1"/>
-          </p:cNvSpPr>
-          <p:nvPr>
-            <p:ph type="hdr" sz="quarter"/>
-          </p:nvPr>
-        </p:nvSpPr>
-        <p:spPr>
-          <a:xfrm>
-            <a:off x="0" y="0"/>
-            <a:ext cx="2971800" cy="457200"/>
-          </a:xfrm>
-          <a:prstGeom prst="rect">
-            <a:avLst/>
-          </a:prstGeom>
-        </p:spPr>
-        <p:txBody>
-          <a:bodyPr vert="horz" lIns="91440" tIns="45720" rIns="91440" bIns="45720" rtlCol="0"/>
-          <a:lstStyle>
-            <a:lvl1pPr algn="l">
-              <a:defRPr sz="1200"/>
-            </a:lvl1pPr>
-          </a:lstStyle>
-          <a:p>
-            <a:endParaRPr lang="en-US"/>
-          </a:p>
-        </p:txBody>
-      </p:sp>
-      <p:sp>
-        <p:nvSpPr>
-          <p:cNvPr id="3" name="Date Placeholder 2"/>
-          <p:cNvSpPr>
-            <a:spLocks noGrp="1"/>
-          </p:cNvSpPr>
-          <p:nvPr>
-            <p:ph type="dt" idx="1"/>
-          </p:nvPr>
-        </p:nvSpPr>
-        <p:spPr>
-          <a:xfrm>
-            <a:off x="3884613" y="0"/>
-            <a:ext cx="2971800" cy="457200"/>
-          </a:xfrm>
-          <a:prstGeom prst="rect">
-            <a:avLst/>
-          </a:prstGeom>
-        </p:spPr>
-        <p:txBody>
-          <a:bodyPr vert="horz" lIns="91440" tIns="45720" rIns="91440" bIns="45720" rtlCol="0"/>
-          <a:lstStyle>
-            <a:lvl1pPr algn="r">
-              <a:defRPr sz="1200"/>
-            </a:lvl1pPr>
-          </a:lstStyle>
-          <a:p>
-            <a:fld id="{0F89C1C7-3DCD-1040-A9CF-14679D8B5DDD}" type="datetimeFigureOut">
-              <a:rPr lang="en-US" smtClean="0"/>
-              <a:t>10/17/16</a:t>
-            </a:fld>
-            <a:endParaRPr lang="en-US"/>
-          </a:p>
-        </p:txBody>
-      </p:sp>
-      <p:sp>
-        <p:nvSpPr>
-          <p:cNvPr id="4" name="Slide Image Placeholder 3"/>
-          <p:cNvSpPr>
-            <a:spLocks noGrp="1" noRot="1" noChangeAspect="1"/>
-          </p:cNvSpPr>
-          <p:nvPr>
-            <p:ph type="sldImg" idx="2"/>
-          </p:nvPr>
-        </p:nvSpPr>
-        <p:spPr>
-          <a:xfrm>
-            <a:off x="1143000" y="685800"/>
-            <a:ext cx="4572000" cy="3429000"/>
-          </a:xfrm>
-          <a:prstGeom prst="rect">
-            <a:avLst/>
-          </a:prstGeom>
-          <a:noFill/>
-          <a:ln w="12700">
-            <a:solidFill>
-              <a:prstClr val="black"/>
-            </a:solidFill>
-          </a:ln>
-        </p:spPr>
-        <p:txBody>
-          <a:bodyPr vert="horz" lIns="91440" tIns="45720" rIns="91440" bIns="45720" rtlCol="0" anchor="ctr"/>
-          <a:lstStyle/>
-          <a:p>
-            <a:endParaRPr lang="en-US"/>
-          </a:p>
-        </p:txBody>
-      </p:sp>
-      <p:sp>
-        <p:nvSpPr>
-          <p:cNvPr id="5" name="Notes Placeholder 4"/>
-          <p:cNvSpPr>
-            <a:spLocks noGrp="1"/>
-          </p:cNvSpPr>
-          <p:nvPr>
-            <p:ph type="body" sz="quarter" idx="3"/>
-          </p:nvPr>
-        </p:nvSpPr>
-        <p:spPr>
-          <a:xfrm>
-            <a:off x="685800" y="4343400"/>
-            <a:ext cx="5486400" cy="4114800"/>
-          </a:xfrm>
-          <a:prstGeom prst="rect">
-            <a:avLst/>
-          </a:prstGeom>
-        </p:spPr>
-        <p:txBody>
-          <a:bodyPr vert="horz" lIns="91440" tIns="45720" rIns="91440" bIns="45720" rtlCol="0"/>
-          <a:lstStyle/>
-          <a:p>
-            <a:pPr lvl="0"/>
-            <a:r>
-              <a:rPr lang="en-US" smtClean="0"/>
-              <a:t>Click to edit Master text styles</a:t>
-            </a:r>
-          </a:p>
-          <a:p>
-            <a:pPr lvl="1"/>
-            <a:r>
-              <a:rPr lang="en-US" smtClean="0"/>
-              <a:t>Second level</a:t>
-            </a:r>
-          </a:p>
-          <a:p>
-            <a:pPr lvl="2"/>
-            <a:r>
-              <a:rPr lang="en-US" smtClean="0"/>
-              <a:t>Third level</a:t>
-            </a:r>
-          </a:p>
-          <a:p>
-            <a:pPr lvl="3"/>
-            <a:r>
-              <a:rPr lang="en-US" smtClean="0"/>
-              <a:t>Fourth level</a:t>
-            </a:r>
-          </a:p>
-          <a:p>
-            <a:pPr lvl="4"/>
-            <a:r>
-              <a:rPr lang="en-US" smtClean="0"/>
-              <a:t>Fifth level</a:t>
-            </a:r>
-            <a:endParaRPr lang="en-US"/>
-          </a:p>
-        </p:txBody>
-      </p:sp>
-      <p:sp>
-        <p:nvSpPr>
-          <p:cNvPr id="6" name="Footer Placeholder 5"/>
-          <p:cNvSpPr>
-            <a:spLocks noGrp="1"/>
-          </p:cNvSpPr>
-          <p:nvPr>
-            <p:ph type="ftr" sz="quarter" idx="4"/>
-          </p:nvPr>
-        </p:nvSpPr>
-        <p:spPr>
-          <a:xfrm>
-            <a:off x="0" y="8685213"/>
-            <a:ext cx="2971800" cy="457200"/>
-          </a:xfrm>
-          <a:prstGeom prst="rect">
-            <a:avLst/>
-          </a:prstGeom>
-        </p:spPr>
-        <p:txBody>
-          <a:bodyPr vert="horz" lIns="91440" tIns="45720" rIns="91440" bIns="45720" rtlCol="0" anchor="b"/>
-          <a:lstStyle>
-            <a:lvl1pPr algn="l">
-              <a:defRPr sz="1200"/>
-            </a:lvl1pPr>
-          </a:lstStyle>
-          <a:p>
-            <a:endParaRPr lang="en-US"/>
-          </a:p>
-        </p:txBody>
-      </p:sp>
-      <p:sp>
-        <p:nvSpPr>
-          <p:cNvPr id="7" name="Slide Number Placeholder 6"/>
-          <p:cNvSpPr>
-            <a:spLocks noGrp="1"/>
-          </p:cNvSpPr>
-          <p:nvPr>
-            <p:ph type="sldNum" sz="quarter" idx="5"/>
-          </p:nvPr>
-        </p:nvSpPr>
-        <p:spPr>
-          <a:xfrm>
-            <a:off x="3884613" y="8685213"/>
-            <a:ext cx="2971800" cy="457200"/>
-          </a:xfrm>
-          <a:prstGeom prst="rect">
-            <a:avLst/>
-          </a:prstGeom>
-        </p:spPr>
-        <p:txBody>
-          <a:bodyPr vert="horz" lIns="91440" tIns="45720" rIns="91440" bIns="45720" rtlCol="0" anchor="b"/>
-          <a:lstStyle>
-            <a:lvl1pPr algn="r">
-              <a:defRPr sz="1200"/>
-            </a:lvl1pPr>
-          </a:lstStyle>
-          <a:p>
-            <a:fld id="{BB5E49A5-4136-284D-997B-48E1D791AD67}" type="slidenum">
-              <a:rPr lang="en-US" smtClean="0"/>
-              <a:t>‹#›</a:t>
-            </a:fld>
-            <a:endParaRPr lang="en-US"/>
-          </a:p>
-        </p:txBody>
-      </p:sp>
-    </p:spTree>
-    <p:extLst>
-      <p:ext uri="{BB962C8B-B14F-4D97-AF65-F5344CB8AC3E}">
-        <p14:creationId xmlns:p14="http://schemas.microsoft.com/office/powerpoint/2010/main" val="2623252185"/>
-      </p:ext>
-    </p:extLst>
-  </p:cSld>
-  <p:clrMap bg1="lt1" tx1="dk1" bg2="lt2" tx2="dk2" accent1="accent1" accent2="accent2" accent3="accent3" accent4="accent4" accent5="accent5" accent6="accent6" hlink="hlink" folHlink="folHlink"/>
-  <p:notesStyle>
-    <a:lvl1pPr marL="0" algn="l" defTabSz="457200" rtl="0" eaLnBrk="1" latinLnBrk="0" hangingPunct="1">
-      <a:defRPr sz="1200" kern="1200">
-        <a:solidFill>
-          <a:schemeClr val="tx1"/>
-        </a:solidFill>
-        <a:latin typeface="+mn-lt"/>
-        <a:ea typeface="+mn-ea"/>
-        <a:cs typeface="+mn-cs"/>
-      </a:defRPr>
-    </a:lvl1pPr>
-    <a:lvl2pPr marL="457200" algn="l" defTabSz="457200" rtl="0" eaLnBrk="1" latinLnBrk="0" hangingPunct="1">
-      <a:defRPr sz="1200" kern="1200">
-        <a:solidFill>
-          <a:schemeClr val="tx1"/>
-        </a:solidFill>
-        <a:latin typeface="+mn-lt"/>
-        <a:ea typeface="+mn-ea"/>
-        <a:cs typeface="+mn-cs"/>
-      </a:defRPr>
-    </a:lvl2pPr>
-    <a:lvl3pPr marL="914400" algn="l" defTabSz="457200" rtl="0" eaLnBrk="1" latinLnBrk="0" hangingPunct="1">
-      <a:defRPr sz="1200" kern="1200">
-        <a:solidFill>
-          <a:schemeClr val="tx1"/>
-        </a:solidFill>
-        <a:latin typeface="+mn-lt"/>
-        <a:ea typeface="+mn-ea"/>
-        <a:cs typeface="+mn-cs"/>
-      </a:defRPr>
-    </a:lvl3pPr>
-    <a:lvl4pPr marL="1371600" algn="l" defTabSz="457200" rtl="0" eaLnBrk="1" latinLnBrk="0" hangingPunct="1">
-      <a:defRPr sz="1200" kern="1200">
-        <a:solidFill>
-          <a:schemeClr val="tx1"/>
-        </a:solidFill>
-        <a:latin typeface="+mn-lt"/>
-        <a:ea typeface="+mn-ea"/>
-        <a:cs typeface="+mn-cs"/>
-      </a:defRPr>
-    </a:lvl4pPr>
-    <a:lvl5pPr marL="1828800" algn="l" defTabSz="457200" rtl="0" eaLnBrk="1" latinLnBrk="0" hangingPunct="1">
-      <a:defRPr sz="1200" kern="1200">
-        <a:solidFill>
-          <a:schemeClr val="tx1"/>
-        </a:solidFill>
-        <a:latin typeface="+mn-lt"/>
-        <a:ea typeface="+mn-ea"/>
-        <a:cs typeface="+mn-cs"/>
-      </a:defRPr>
-    </a:lvl5pPr>
-    <a:lvl6pPr marL="2286000" algn="l" defTabSz="457200" rtl="0" eaLnBrk="1" latinLnBrk="0" hangingPunct="1">
-      <a:defRPr sz="1200" kern="1200">
-        <a:solidFill>
-          <a:schemeClr val="tx1"/>
-        </a:solidFill>
-        <a:latin typeface="+mn-lt"/>
-        <a:ea typeface="+mn-ea"/>
-        <a:cs typeface="+mn-cs"/>
-      </a:defRPr>
-    </a:lvl6pPr>
-    <a:lvl7pPr marL="2743200" algn="l" defTabSz="457200" rtl="0" eaLnBrk="1" latinLnBrk="0" hangingPunct="1">
-      <a:defRPr sz="1200" kern="1200">
-        <a:solidFill>
-          <a:schemeClr val="tx1"/>
-        </a:solidFill>
-        <a:latin typeface="+mn-lt"/>
-        <a:ea typeface="+mn-ea"/>
-        <a:cs typeface="+mn-cs"/>
-      </a:defRPr>
-    </a:lvl7pPr>
-    <a:lvl8pPr marL="3200400" algn="l" defTabSz="457200" rtl="0" eaLnBrk="1" latinLnBrk="0" hangingPunct="1">
-      <a:defRPr sz="1200" kern="1200">
-        <a:solidFill>
-          <a:schemeClr val="tx1"/>
-        </a:solidFill>
-        <a:latin typeface="+mn-lt"/>
-        <a:ea typeface="+mn-ea"/>
-        <a:cs typeface="+mn-cs"/>
-      </a:defRPr>
-    </a:lvl8pPr>
-    <a:lvl9pPr marL="3657600" algn="l" defTabSz="457200" rtl="0" eaLnBrk="1" latinLnBrk="0" hangingPunct="1">
-      <a:defRPr sz="1200" kern="1200">
-        <a:solidFill>
-          <a:schemeClr val="tx1"/>
-        </a:solidFill>
-        <a:latin typeface="+mn-lt"/>
-        <a:ea typeface="+mn-ea"/>
-        <a:cs typeface="+mn-cs"/>
-      </a:defRPr>
-    </a:lvl9pPr>
-  </p:notesStyle>
-</p:notesMaster>
-</file>
-
-<file path=ppt/notesSlides/notesSlide1.xml><?xml version="1.0" encoding="utf-8"?>
-<p:notes xmlns:a="http://schemas.openxmlformats.org/drawingml/2006/main" xmlns:p="http://schemas.openxmlformats.org/presentationml/2006/main" xmlns:r="http://schemas.openxmlformats.org/officeDocument/2006/relationships">
-  <p:cSld>
-    <p:spTree>
-      <p:nvGrpSpPr>
-        <p:cNvPr id="1" name=""/>
-        <p:cNvGrpSpPr/>
-        <p:nvPr/>
-      </p:nvGrpSpPr>
-      <p:grpSpPr>
-        <a:xfrm>
-          <a:off x="0" y="0"/>
-          <a:ext cx="0" cy="0"/>
-          <a:chOff x="0" y="0"/>
-          <a:chExt cx="0" cy="0"/>
-        </a:xfrm>
-      </p:grpSpPr>
-      <p:sp>
-        <p:nvSpPr>
-          <p:cNvPr id="2" name="Slide Image Placeholder 1"/>
-          <p:cNvSpPr>
-            <a:spLocks noGrp="1"/>
-          </p:cNvSpPr>
-          <p:nvPr>
-            <p:ph type="sldImg" idx="2"/>
-          </p:nvPr>
-        </p:nvSpPr>
-        <p:spPr/>
-      </p:sp>
-      <p:sp>
-        <p:nvSpPr>
-          <p:cNvPr id="3" name="Notes Placeholder 2"/>
-          <p:cNvSpPr>
-            <a:spLocks noGrp="1"/>
-          </p:cNvSpPr>
-          <p:nvPr>
-            <p:ph type="body" idx="3" sz="quarter"/>
-          </p:nvPr>
-        </p:nvSpPr>
-        <p:spPr/>
-        <p:txBody>
-          <a:bodyPr/>
-          <a:lstStyle/>
-          <a:p>
-            <a:r>
-              <a:t>背景介绍。</a:t>
-            </a:r>
-          </a:p>
-        </p:txBody>
-      </p:sp>
-      <p:sp>
-        <p:nvSpPr>
-          <p:cNvPr id="4" name="Slide Number Placeholder 3"/>
-          <p:cNvSpPr>
-            <a:spLocks noGrp="1"/>
-          </p:cNvSpPr>
-          <p:nvPr>
-            <p:ph type="sldNum" idx="5" sz="quarter"/>
-          </p:nvPr>
-        </p:nvSpPr>
-        <p:spPr/>
-      </p:sp>
-    </p:spTree>
-  </p:cSld>
-  <p:clrMapOvr>
-    <a:masterClrMapping/>
-  </p:clrMapOvr>
-</p:notes>
-</file>
-
-<file path=ppt/notesSlides/notesSlide2.xml><?xml version="1.0" encoding="utf-8"?>
-<p:notes xmlns:a="http://schemas.openxmlformats.org/drawingml/2006/main" xmlns:p="http://schemas.openxmlformats.org/presentationml/2006/main" xmlns:r="http://schemas.openxmlformats.org/officeDocument/2006/relationships">
-  <p:cSld>
-    <p:spTree>
-      <p:nvGrpSpPr>
-        <p:cNvPr id="1" name=""/>
-        <p:cNvGrpSpPr/>
-        <p:nvPr/>
-      </p:nvGrpSpPr>
-      <p:grpSpPr>
-        <a:xfrm>
-          <a:off x="0" y="0"/>
-          <a:ext cx="0" cy="0"/>
-          <a:chOff x="0" y="0"/>
-          <a:chExt cx="0" cy="0"/>
-        </a:xfrm>
-      </p:grpSpPr>
-      <p:sp>
-        <p:nvSpPr>
-          <p:cNvPr id="2" name="Slide Image Placeholder 1"/>
-          <p:cNvSpPr>
-            <a:spLocks noGrp="1"/>
-          </p:cNvSpPr>
-          <p:nvPr>
-            <p:ph type="sldImg" idx="2"/>
-          </p:nvPr>
-        </p:nvSpPr>
-        <p:spPr/>
-      </p:sp>
-      <p:sp>
-        <p:nvSpPr>
-          <p:cNvPr id="3" name="Notes Placeholder 2"/>
-          <p:cNvSpPr>
-            <a:spLocks noGrp="1"/>
-          </p:cNvSpPr>
-          <p:nvPr>
-            <p:ph type="body" idx="3" sz="quarter"/>
-          </p:nvPr>
-        </p:nvSpPr>
-        <p:spPr/>
-        <p:txBody>
-          <a:bodyPr/>
-          <a:lstStyle/>
-          <a:p>
-            <a:r>
-              <a:t>详细介绍核心艺术家。</a:t>
-            </a:r>
-          </a:p>
-        </p:txBody>
-      </p:sp>
-      <p:sp>
-        <p:nvSpPr>
-          <p:cNvPr id="4" name="Slide Number Placeholder 3"/>
-          <p:cNvSpPr>
-            <a:spLocks noGrp="1"/>
-          </p:cNvSpPr>
-          <p:nvPr>
-            <p:ph type="sldNum" idx="5" sz="quarter"/>
-          </p:nvPr>
-        </p:nvSpPr>
-        <p:spPr/>
-      </p:sp>
-    </p:spTree>
-  </p:cSld>
-  <p:clrMapOvr>
-    <a:masterClrMapping/>
-  </p:clrMapOvr>
-</p:notes>
-</file>
-
-<file path=ppt/notesSlides/notesSlide3.xml><?xml version="1.0" encoding="utf-8"?>
-<p:notes xmlns:a="http://schemas.openxmlformats.org/drawingml/2006/main" xmlns:p="http://schemas.openxmlformats.org/presentationml/2006/main" xmlns:r="http://schemas.openxmlformats.org/officeDocument/2006/relationships">
-  <p:cSld>
-    <p:spTree>
-      <p:nvGrpSpPr>
-        <p:cNvPr id="1" name=""/>
-        <p:cNvGrpSpPr/>
-        <p:nvPr/>
-      </p:nvGrpSpPr>
-      <p:grpSpPr>
-        <a:xfrm>
-          <a:off x="0" y="0"/>
-          <a:ext cx="0" cy="0"/>
-          <a:chOff x="0" y="0"/>
-          <a:chExt cx="0" cy="0"/>
-        </a:xfrm>
-      </p:grpSpPr>
-      <p:sp>
-        <p:nvSpPr>
-          <p:cNvPr id="2" name="Slide Image Placeholder 1"/>
-          <p:cNvSpPr>
-            <a:spLocks noGrp="1"/>
-          </p:cNvSpPr>
-          <p:nvPr>
-            <p:ph type="sldImg" idx="2"/>
-          </p:nvPr>
-        </p:nvSpPr>
-        <p:spPr/>
-      </p:sp>
-      <p:sp>
-        <p:nvSpPr>
-          <p:cNvPr id="3" name="Notes Placeholder 2"/>
-          <p:cNvSpPr>
-            <a:spLocks noGrp="1"/>
-          </p:cNvSpPr>
-          <p:nvPr>
-            <p:ph type="body" idx="3" sz="quarter"/>
-          </p:nvPr>
-        </p:nvSpPr>
-        <p:spPr/>
-        <p:txBody>
-          <a:bodyPr/>
-          <a:lstStyle/>
-          <a:p>
-            <a:r>
-              <a:t>分析技术层面的突破。</a:t>
-            </a:r>
-          </a:p>
-        </p:txBody>
-      </p:sp>
-      <p:sp>
-        <p:nvSpPr>
-          <p:cNvPr id="4" name="Slide Number Placeholder 3"/>
-          <p:cNvSpPr>
-            <a:spLocks noGrp="1"/>
-          </p:cNvSpPr>
-          <p:nvPr>
-            <p:ph type="sldNum" idx="5" sz="quarter"/>
-          </p:nvPr>
-        </p:nvSpPr>
-        <p:spPr/>
-      </p:sp>
-    </p:spTree>
-  </p:cSld>
-  <p:clrMapOvr>
-    <a:masterClrMapping/>
-  </p:clrMapOvr>
-</p:notes>
 </file>
 
 <file path=ppt/slideLayouts/slideLayout1.xml><?xml version="1.0" encoding="utf-8"?>
@@ -3644,6 +3091,14 @@
 <file path=ppt/slides/slide1.xml><?xml version="1.0" encoding="utf-8"?>
 <p:sld xmlns:a="http://schemas.openxmlformats.org/drawingml/2006/main" xmlns:p="http://schemas.openxmlformats.org/presentationml/2006/main" xmlns:r="http://schemas.openxmlformats.org/officeDocument/2006/relationships">
   <p:cSld>
+    <p:bg>
+      <p:bgPr>
+        <a:solidFill>
+          <a:srgbClr val="FFFAF0"/>
+        </a:solidFill>
+        <a:effectLst/>
+      </p:bgPr>
+    </p:bg>
     <p:spTree>
       <p:nvGrpSpPr>
         <p:cNvPr id="1" name=""/>
@@ -3667,7 +3122,13 @@
           <a:lstStyle/>
           <a:p>
             <a:r>
-              <a:t>文艺复兴艺术赏析</a:t>
+              <a:rPr>
+                <a:solidFill>
+                  <a:srgbClr val="C83296"/>
+                </a:solidFill>
+                <a:latin typeface="Verdana"/>
+              </a:rPr>
+              <a:t>Overview of Current Topic</a:t>
             </a:r>
           </a:p>
         </p:txBody>
@@ -3688,7 +3149,199 @@
           <a:lstStyle/>
           <a:p>
             <a:r>
-              <a:t>AutoPPT 自动生成示例</a:t>
+              <a:rPr>
+                <a:solidFill>
+                  <a:srgbClr val="3C283C"/>
+                </a:solidFill>
+                <a:latin typeface="Verdana"/>
+              </a:rPr>
+              <a:t>Topic: 文艺复兴艺术赏析</a:t>
+            </a:r>
+          </a:p>
+        </p:txBody>
+      </p:sp>
+    </p:spTree>
+  </p:cSld>
+  <p:clrMapOvr>
+    <a:masterClrMapping/>
+  </p:clrMapOvr>
+</p:sld>
+</file>
+
+<file path=ppt/slides/slide10.xml><?xml version="1.0" encoding="utf-8"?>
+<p:sld xmlns:a="http://schemas.openxmlformats.org/drawingml/2006/main" xmlns:p="http://schemas.openxmlformats.org/presentationml/2006/main" xmlns:r="http://schemas.openxmlformats.org/officeDocument/2006/relationships">
+  <p:cSld>
+    <p:bg>
+      <p:bgPr>
+        <a:solidFill>
+          <a:srgbClr val="FFFAF0"/>
+        </a:solidFill>
+        <a:effectLst/>
+      </p:bgPr>
+    </p:bg>
+    <p:spTree>
+      <p:nvGrpSpPr>
+        <p:cNvPr id="1" name=""/>
+        <p:cNvGrpSpPr/>
+        <p:nvPr/>
+      </p:nvGrpSpPr>
+      <p:grpSpPr/>
+      <p:sp>
+        <p:nvSpPr>
+          <p:cNvPr id="2" name="Title 1"/>
+          <p:cNvSpPr>
+            <a:spLocks noGrp="1"/>
+          </p:cNvSpPr>
+          <p:nvPr>
+            <p:ph type="title"/>
+          </p:nvPr>
+        </p:nvSpPr>
+        <p:spPr/>
+        <p:txBody>
+          <a:bodyPr/>
+          <a:lstStyle/>
+          <a:p>
+            <a:r>
+              <a:rPr>
+                <a:solidFill>
+                  <a:srgbClr val="C83296"/>
+                </a:solidFill>
+                <a:latin typeface="Verdana"/>
+              </a:rPr>
+              <a:t>Overview of Current Topic</a:t>
+            </a:r>
+          </a:p>
+        </p:txBody>
+      </p:sp>
+      <p:sp>
+        <p:nvSpPr>
+          <p:cNvPr id="3" name="Content Placeholder 2"/>
+          <p:cNvSpPr>
+            <a:spLocks noGrp="1"/>
+          </p:cNvSpPr>
+          <p:nvPr>
+            <p:ph idx="1"/>
+          </p:nvPr>
+        </p:nvSpPr>
+        <p:spPr/>
+        <p:txBody>
+          <a:bodyPr wrap="square"/>
+          <a:lstStyle/>
+          <a:p/>
+          <a:p>
+            <a:pPr/>
+            <a:r>
+              <a:rPr>
+                <a:solidFill>
+                  <a:srgbClr val="3C283C"/>
+                </a:solidFill>
+                <a:latin typeface="Verdana"/>
+              </a:rPr>
+              <a:t>Key innovation and strategic importance of Current Topic</a:t>
+            </a:r>
+          </a:p>
+          <a:p>
+            <a:pPr/>
+            <a:r>
+              <a:rPr>
+                <a:solidFill>
+                  <a:srgbClr val="3C283C"/>
+                </a:solidFill>
+                <a:latin typeface="Verdana"/>
+              </a:rPr>
+              <a:t>Global impact and future trends in Current Topic</a:t>
+            </a:r>
+          </a:p>
+          <a:p>
+            <a:pPr/>
+            <a:r>
+              <a:rPr>
+                <a:solidFill>
+                  <a:srgbClr val="3C283C"/>
+                </a:solidFill>
+                <a:latin typeface="Verdana"/>
+              </a:rPr>
+              <a:t>Practical applications and case studies of Current Topic</a:t>
+            </a:r>
+          </a:p>
+        </p:txBody>
+      </p:sp>
+    </p:spTree>
+  </p:cSld>
+  <p:clrMapOvr>
+    <a:masterClrMapping/>
+  </p:clrMapOvr>
+</p:sld>
+</file>
+
+<file path=ppt/slides/slide11.xml><?xml version="1.0" encoding="utf-8"?>
+<p:sld xmlns:a="http://schemas.openxmlformats.org/drawingml/2006/main" xmlns:p="http://schemas.openxmlformats.org/presentationml/2006/main" xmlns:r="http://schemas.openxmlformats.org/officeDocument/2006/relationships">
+  <p:cSld>
+    <p:spTree>
+      <p:nvGrpSpPr>
+        <p:cNvPr id="1" name=""/>
+        <p:cNvGrpSpPr/>
+        <p:nvPr/>
+      </p:nvGrpSpPr>
+      <p:grpSpPr/>
+      <p:sp>
+        <p:nvSpPr>
+          <p:cNvPr id="2" name="Title 1"/>
+          <p:cNvSpPr>
+            <a:spLocks noGrp="1"/>
+          </p:cNvSpPr>
+          <p:nvPr>
+            <p:ph type="title"/>
+          </p:nvPr>
+        </p:nvSpPr>
+        <p:spPr/>
+        <p:txBody>
+          <a:bodyPr/>
+          <a:lstStyle/>
+          <a:p>
+            <a:r>
+              <a:t>References</a:t>
+            </a:r>
+          </a:p>
+        </p:txBody>
+      </p:sp>
+      <p:sp>
+        <p:nvSpPr>
+          <p:cNvPr id="3" name="Content Placeholder 2"/>
+          <p:cNvSpPr>
+            <a:spLocks noGrp="1"/>
+          </p:cNvSpPr>
+          <p:nvPr>
+            <p:ph idx="1"/>
+          </p:nvPr>
+        </p:nvSpPr>
+        <p:spPr/>
+        <p:txBody>
+          <a:bodyPr/>
+          <a:lstStyle/>
+          <a:p/>
+          <a:p>
+            <a:pPr>
+              <a:defRPr sz="1200"/>
+            </a:pPr>
+            <a:r>
+              <a:t>Global impact and future trends in Current Topic</a:t>
+            </a:r>
+          </a:p>
+          <a:p>
+            <a:pPr>
+              <a:defRPr sz="1200"/>
+            </a:pPr>
+            <a:r>
+              <a:t>Practical applications and case studies of Current Topic</a:t>
+            </a:r>
+          </a:p>
+          <a:p>
+            <a:pPr>
+              <a:defRPr sz="1200"/>
+            </a:pPr>
+            <a:r>
+              <a:t>Key innovation and strategic importance of Current Topic</a:t>
             </a:r>
           </a:p>
         </p:txBody>
@@ -3704,6 +3357,14 @@
 <file path=ppt/slides/slide2.xml><?xml version="1.0" encoding="utf-8"?>
 <p:sld xmlns:a="http://schemas.openxmlformats.org/drawingml/2006/main" xmlns:p="http://schemas.openxmlformats.org/presentationml/2006/main" xmlns:r="http://schemas.openxmlformats.org/officeDocument/2006/relationships">
   <p:cSld>
+    <p:bg>
+      <p:bgPr>
+        <a:solidFill>
+          <a:srgbClr val="FFFAF0"/>
+        </a:solidFill>
+        <a:effectLst/>
+      </p:bgPr>
+    </p:bg>
     <p:spTree>
       <p:nvGrpSpPr>
         <p:cNvPr id="1" name=""/>
@@ -3727,44 +3388,32 @@
           <a:lstStyle/>
           <a:p>
             <a:r>
-              <a:t>文艺复兴起源</a:t>
-            </a:r>
-          </a:p>
-        </p:txBody>
-      </p:sp>
-      <p:sp>
-        <p:nvSpPr>
-          <p:cNvPr id="3" name="Content Placeholder 2"/>
-          <p:cNvSpPr>
-            <a:spLocks noGrp="1"/>
-          </p:cNvSpPr>
-          <p:nvPr>
-            <p:ph idx="1"/>
-          </p:nvPr>
-        </p:nvSpPr>
-        <p:spPr/>
-        <p:txBody>
-          <a:bodyPr wrap="square"/>
+              <a:rPr>
+                <a:solidFill>
+                  <a:srgbClr val="C83296"/>
+                </a:solidFill>
+                <a:latin typeface="Verdana"/>
+              </a:rPr>
+              <a:t>Fundamentals of Current Topic</a:t>
+            </a:r>
+          </a:p>
+        </p:txBody>
+      </p:sp>
+      <p:sp>
+        <p:nvSpPr>
+          <p:cNvPr id="3" name="Text Placeholder 2"/>
+          <p:cNvSpPr>
+            <a:spLocks noGrp="1"/>
+          </p:cNvSpPr>
+          <p:nvPr>
+            <p:ph type="body" idx="1"/>
+          </p:nvPr>
+        </p:nvSpPr>
+        <p:spPr/>
+        <p:txBody>
+          <a:bodyPr/>
           <a:lstStyle/>
           <a:p/>
-          <a:p>
-            <a:pPr/>
-            <a:r>
-              <a:t>14-16 世纪起源于意大利佛罗伦萨</a:t>
-            </a:r>
-          </a:p>
-          <a:p>
-            <a:pPr/>
-            <a:r>
-              <a:t>以人文主义为核心，强调对人的价值的肯定</a:t>
-            </a:r>
-          </a:p>
-          <a:p>
-            <a:pPr/>
-            <a:r>
-              <a:t>重新发现和学习古希腊与罗马的古典文化</a:t>
-            </a:r>
-          </a:p>
         </p:txBody>
       </p:sp>
     </p:spTree>
@@ -3778,6 +3427,14 @@
 <file path=ppt/slides/slide3.xml><?xml version="1.0" encoding="utf-8"?>
 <p:sld xmlns:a="http://schemas.openxmlformats.org/drawingml/2006/main" xmlns:p="http://schemas.openxmlformats.org/presentationml/2006/main" xmlns:r="http://schemas.openxmlformats.org/officeDocument/2006/relationships">
   <p:cSld>
+    <p:bg>
+      <p:bgPr>
+        <a:solidFill>
+          <a:srgbClr val="FFFAF0"/>
+        </a:solidFill>
+        <a:effectLst/>
+      </p:bgPr>
+    </p:bg>
     <p:spTree>
       <p:nvGrpSpPr>
         <p:cNvPr id="1" name=""/>
@@ -3801,7 +3458,13 @@
           <a:lstStyle/>
           <a:p>
             <a:r>
-              <a:t>文艺复兴三杰</a:t>
+              <a:rPr>
+                <a:solidFill>
+                  <a:srgbClr val="C83296"/>
+                </a:solidFill>
+                <a:latin typeface="Verdana"/>
+              </a:rPr>
+              <a:t>Overview of Current Topic</a:t>
             </a:r>
           </a:p>
         </p:txBody>
@@ -3824,19 +3487,37 @@
           <a:p>
             <a:pPr/>
             <a:r>
-              <a:t>达芬奇：代表作《蒙娜丽莎》、《最后的晚餐》</a:t>
+              <a:rPr>
+                <a:solidFill>
+                  <a:srgbClr val="3C283C"/>
+                </a:solidFill>
+                <a:latin typeface="Verdana"/>
+              </a:rPr>
+              <a:t>Key innovation and strategic importance of Current Topic</a:t>
             </a:r>
           </a:p>
           <a:p>
             <a:pPr/>
             <a:r>
-              <a:t>米开朗基罗：代表作《大卫像》、西斯廷教堂壁画</a:t>
+              <a:rPr>
+                <a:solidFill>
+                  <a:srgbClr val="3C283C"/>
+                </a:solidFill>
+                <a:latin typeface="Verdana"/>
+              </a:rPr>
+              <a:t>Global impact and future trends in Current Topic</a:t>
             </a:r>
           </a:p>
           <a:p>
             <a:pPr/>
             <a:r>
-              <a:t>拉斐尔：以优雅的圣母像和《雅典学院》闻名</a:t>
+              <a:rPr>
+                <a:solidFill>
+                  <a:srgbClr val="3C283C"/>
+                </a:solidFill>
+                <a:latin typeface="Verdana"/>
+              </a:rPr>
+              <a:t>Practical applications and case studies of Current Topic</a:t>
             </a:r>
           </a:p>
         </p:txBody>
@@ -3852,6 +3533,14 @@
 <file path=ppt/slides/slide4.xml><?xml version="1.0" encoding="utf-8"?>
 <p:sld xmlns:a="http://schemas.openxmlformats.org/drawingml/2006/main" xmlns:p="http://schemas.openxmlformats.org/presentationml/2006/main" xmlns:r="http://schemas.openxmlformats.org/officeDocument/2006/relationships">
   <p:cSld>
+    <p:bg>
+      <p:bgPr>
+        <a:solidFill>
+          <a:srgbClr val="FFFAF0"/>
+        </a:solidFill>
+        <a:effectLst/>
+      </p:bgPr>
+    </p:bg>
     <p:spTree>
       <p:nvGrpSpPr>
         <p:cNvPr id="1" name=""/>
@@ -3875,7 +3564,13 @@
           <a:lstStyle/>
           <a:p>
             <a:r>
-              <a:t>艺术特征与技术</a:t>
+              <a:rPr>
+                <a:solidFill>
+                  <a:srgbClr val="C83296"/>
+                </a:solidFill>
+                <a:latin typeface="Verdana"/>
+              </a:rPr>
+              <a:t>Overview of Current Topic</a:t>
             </a:r>
           </a:p>
         </p:txBody>
@@ -3898,19 +3593,495 @@
           <a:p>
             <a:pPr/>
             <a:r>
-              <a:t>透视法的应用创造了真实的空间感</a:t>
+              <a:rPr>
+                <a:solidFill>
+                  <a:srgbClr val="3C283C"/>
+                </a:solidFill>
+                <a:latin typeface="Verdana"/>
+              </a:rPr>
+              <a:t>Key innovation and strategic importance of Current Topic</a:t>
             </a:r>
           </a:p>
           <a:p>
             <a:pPr/>
             <a:r>
-              <a:t>对人体解剖学的深入研究提高了表现力</a:t>
+              <a:rPr>
+                <a:solidFill>
+                  <a:srgbClr val="3C283C"/>
+                </a:solidFill>
+                <a:latin typeface="Verdana"/>
+              </a:rPr>
+              <a:t>Global impact and future trends in Current Topic</a:t>
             </a:r>
           </a:p>
           <a:p>
             <a:pPr/>
             <a:r>
-              <a:t>明暗对照法 (Chiaroscuro) 增强了立体感</a:t>
+              <a:rPr>
+                <a:solidFill>
+                  <a:srgbClr val="3C283C"/>
+                </a:solidFill>
+                <a:latin typeface="Verdana"/>
+              </a:rPr>
+              <a:t>Practical applications and case studies of Current Topic</a:t>
+            </a:r>
+          </a:p>
+        </p:txBody>
+      </p:sp>
+    </p:spTree>
+  </p:cSld>
+  <p:clrMapOvr>
+    <a:masterClrMapping/>
+  </p:clrMapOvr>
+</p:sld>
+</file>
+
+<file path=ppt/slides/slide5.xml><?xml version="1.0" encoding="utf-8"?>
+<p:sld xmlns:a="http://schemas.openxmlformats.org/drawingml/2006/main" xmlns:p="http://schemas.openxmlformats.org/presentationml/2006/main" xmlns:r="http://schemas.openxmlformats.org/officeDocument/2006/relationships">
+  <p:cSld>
+    <p:bg>
+      <p:bgPr>
+        <a:solidFill>
+          <a:srgbClr val="FFFAF0"/>
+        </a:solidFill>
+        <a:effectLst/>
+      </p:bgPr>
+    </p:bg>
+    <p:spTree>
+      <p:nvGrpSpPr>
+        <p:cNvPr id="1" name=""/>
+        <p:cNvGrpSpPr/>
+        <p:nvPr/>
+      </p:nvGrpSpPr>
+      <p:grpSpPr/>
+      <p:sp>
+        <p:nvSpPr>
+          <p:cNvPr id="2" name="Title 1"/>
+          <p:cNvSpPr>
+            <a:spLocks noGrp="1"/>
+          </p:cNvSpPr>
+          <p:nvPr>
+            <p:ph type="title"/>
+          </p:nvPr>
+        </p:nvSpPr>
+        <p:spPr/>
+        <p:txBody>
+          <a:bodyPr/>
+          <a:lstStyle/>
+          <a:p>
+            <a:r>
+              <a:rPr>
+                <a:solidFill>
+                  <a:srgbClr val="C83296"/>
+                </a:solidFill>
+                <a:latin typeface="Verdana"/>
+              </a:rPr>
+              <a:t>Advanced Applications: Current Topic</a:t>
+            </a:r>
+          </a:p>
+        </p:txBody>
+      </p:sp>
+      <p:sp>
+        <p:nvSpPr>
+          <p:cNvPr id="3" name="Text Placeholder 2"/>
+          <p:cNvSpPr>
+            <a:spLocks noGrp="1"/>
+          </p:cNvSpPr>
+          <p:nvPr>
+            <p:ph type="body" idx="1"/>
+          </p:nvPr>
+        </p:nvSpPr>
+        <p:spPr/>
+        <p:txBody>
+          <a:bodyPr/>
+          <a:lstStyle/>
+          <a:p/>
+        </p:txBody>
+      </p:sp>
+    </p:spTree>
+  </p:cSld>
+  <p:clrMapOvr>
+    <a:masterClrMapping/>
+  </p:clrMapOvr>
+</p:sld>
+</file>
+
+<file path=ppt/slides/slide6.xml><?xml version="1.0" encoding="utf-8"?>
+<p:sld xmlns:a="http://schemas.openxmlformats.org/drawingml/2006/main" xmlns:p="http://schemas.openxmlformats.org/presentationml/2006/main" xmlns:r="http://schemas.openxmlformats.org/officeDocument/2006/relationships">
+  <p:cSld>
+    <p:bg>
+      <p:bgPr>
+        <a:solidFill>
+          <a:srgbClr val="FFFAF0"/>
+        </a:solidFill>
+        <a:effectLst/>
+      </p:bgPr>
+    </p:bg>
+    <p:spTree>
+      <p:nvGrpSpPr>
+        <p:cNvPr id="1" name=""/>
+        <p:cNvGrpSpPr/>
+        <p:nvPr/>
+      </p:nvGrpSpPr>
+      <p:grpSpPr/>
+      <p:sp>
+        <p:nvSpPr>
+          <p:cNvPr id="2" name="Title 1"/>
+          <p:cNvSpPr>
+            <a:spLocks noGrp="1"/>
+          </p:cNvSpPr>
+          <p:nvPr>
+            <p:ph type="title"/>
+          </p:nvPr>
+        </p:nvSpPr>
+        <p:spPr/>
+        <p:txBody>
+          <a:bodyPr/>
+          <a:lstStyle/>
+          <a:p>
+            <a:r>
+              <a:rPr>
+                <a:solidFill>
+                  <a:srgbClr val="C83296"/>
+                </a:solidFill>
+                <a:latin typeface="Verdana"/>
+              </a:rPr>
+              <a:t>Overview of Current Topic</a:t>
+            </a:r>
+          </a:p>
+        </p:txBody>
+      </p:sp>
+      <p:sp>
+        <p:nvSpPr>
+          <p:cNvPr id="3" name="Content Placeholder 2"/>
+          <p:cNvSpPr>
+            <a:spLocks noGrp="1"/>
+          </p:cNvSpPr>
+          <p:nvPr>
+            <p:ph idx="1"/>
+          </p:nvPr>
+        </p:nvSpPr>
+        <p:spPr/>
+        <p:txBody>
+          <a:bodyPr wrap="square"/>
+          <a:lstStyle/>
+          <a:p/>
+          <a:p>
+            <a:pPr/>
+            <a:r>
+              <a:rPr>
+                <a:solidFill>
+                  <a:srgbClr val="3C283C"/>
+                </a:solidFill>
+                <a:latin typeface="Verdana"/>
+              </a:rPr>
+              <a:t>Key innovation and strategic importance of Current Topic</a:t>
+            </a:r>
+          </a:p>
+          <a:p>
+            <a:pPr/>
+            <a:r>
+              <a:rPr>
+                <a:solidFill>
+                  <a:srgbClr val="3C283C"/>
+                </a:solidFill>
+                <a:latin typeface="Verdana"/>
+              </a:rPr>
+              <a:t>Global impact and future trends in Current Topic</a:t>
+            </a:r>
+          </a:p>
+          <a:p>
+            <a:pPr/>
+            <a:r>
+              <a:rPr>
+                <a:solidFill>
+                  <a:srgbClr val="3C283C"/>
+                </a:solidFill>
+                <a:latin typeface="Verdana"/>
+              </a:rPr>
+              <a:t>Practical applications and case studies of Current Topic</a:t>
+            </a:r>
+          </a:p>
+        </p:txBody>
+      </p:sp>
+    </p:spTree>
+  </p:cSld>
+  <p:clrMapOvr>
+    <a:masterClrMapping/>
+  </p:clrMapOvr>
+</p:sld>
+</file>
+
+<file path=ppt/slides/slide7.xml><?xml version="1.0" encoding="utf-8"?>
+<p:sld xmlns:a="http://schemas.openxmlformats.org/drawingml/2006/main" xmlns:p="http://schemas.openxmlformats.org/presentationml/2006/main" xmlns:r="http://schemas.openxmlformats.org/officeDocument/2006/relationships">
+  <p:cSld>
+    <p:bg>
+      <p:bgPr>
+        <a:solidFill>
+          <a:srgbClr val="FFFAF0"/>
+        </a:solidFill>
+        <a:effectLst/>
+      </p:bgPr>
+    </p:bg>
+    <p:spTree>
+      <p:nvGrpSpPr>
+        <p:cNvPr id="1" name=""/>
+        <p:cNvGrpSpPr/>
+        <p:nvPr/>
+      </p:nvGrpSpPr>
+      <p:grpSpPr/>
+      <p:sp>
+        <p:nvSpPr>
+          <p:cNvPr id="2" name="Title 1"/>
+          <p:cNvSpPr>
+            <a:spLocks noGrp="1"/>
+          </p:cNvSpPr>
+          <p:nvPr>
+            <p:ph type="title"/>
+          </p:nvPr>
+        </p:nvSpPr>
+        <p:spPr/>
+        <p:txBody>
+          <a:bodyPr/>
+          <a:lstStyle/>
+          <a:p>
+            <a:r>
+              <a:rPr>
+                <a:solidFill>
+                  <a:srgbClr val="C83296"/>
+                </a:solidFill>
+                <a:latin typeface="Verdana"/>
+              </a:rPr>
+              <a:t>Overview of Current Topic</a:t>
+            </a:r>
+          </a:p>
+        </p:txBody>
+      </p:sp>
+      <p:sp>
+        <p:nvSpPr>
+          <p:cNvPr id="3" name="Content Placeholder 2"/>
+          <p:cNvSpPr>
+            <a:spLocks noGrp="1"/>
+          </p:cNvSpPr>
+          <p:nvPr>
+            <p:ph idx="1"/>
+          </p:nvPr>
+        </p:nvSpPr>
+        <p:spPr/>
+        <p:txBody>
+          <a:bodyPr wrap="square"/>
+          <a:lstStyle/>
+          <a:p/>
+          <a:p>
+            <a:pPr/>
+            <a:r>
+              <a:rPr>
+                <a:solidFill>
+                  <a:srgbClr val="3C283C"/>
+                </a:solidFill>
+                <a:latin typeface="Verdana"/>
+              </a:rPr>
+              <a:t>Key innovation and strategic importance of Current Topic</a:t>
+            </a:r>
+          </a:p>
+          <a:p>
+            <a:pPr/>
+            <a:r>
+              <a:rPr>
+                <a:solidFill>
+                  <a:srgbClr val="3C283C"/>
+                </a:solidFill>
+                <a:latin typeface="Verdana"/>
+              </a:rPr>
+              <a:t>Global impact and future trends in Current Topic</a:t>
+            </a:r>
+          </a:p>
+          <a:p>
+            <a:pPr/>
+            <a:r>
+              <a:rPr>
+                <a:solidFill>
+                  <a:srgbClr val="3C283C"/>
+                </a:solidFill>
+                <a:latin typeface="Verdana"/>
+              </a:rPr>
+              <a:t>Practical applications and case studies of Current Topic</a:t>
+            </a:r>
+          </a:p>
+        </p:txBody>
+      </p:sp>
+    </p:spTree>
+  </p:cSld>
+  <p:clrMapOvr>
+    <a:masterClrMapping/>
+  </p:clrMapOvr>
+</p:sld>
+</file>
+
+<file path=ppt/slides/slide8.xml><?xml version="1.0" encoding="utf-8"?>
+<p:sld xmlns:a="http://schemas.openxmlformats.org/drawingml/2006/main" xmlns:p="http://schemas.openxmlformats.org/presentationml/2006/main" xmlns:r="http://schemas.openxmlformats.org/officeDocument/2006/relationships">
+  <p:cSld>
+    <p:bg>
+      <p:bgPr>
+        <a:solidFill>
+          <a:srgbClr val="FFFAF0"/>
+        </a:solidFill>
+        <a:effectLst/>
+      </p:bgPr>
+    </p:bg>
+    <p:spTree>
+      <p:nvGrpSpPr>
+        <p:cNvPr id="1" name=""/>
+        <p:cNvGrpSpPr/>
+        <p:nvPr/>
+      </p:nvGrpSpPr>
+      <p:grpSpPr/>
+      <p:sp>
+        <p:nvSpPr>
+          <p:cNvPr id="2" name="Title 1"/>
+          <p:cNvSpPr>
+            <a:spLocks noGrp="1"/>
+          </p:cNvSpPr>
+          <p:nvPr>
+            <p:ph type="title"/>
+          </p:nvPr>
+        </p:nvSpPr>
+        <p:spPr/>
+        <p:txBody>
+          <a:bodyPr/>
+          <a:lstStyle/>
+          <a:p>
+            <a:r>
+              <a:rPr>
+                <a:solidFill>
+                  <a:srgbClr val="C83296"/>
+                </a:solidFill>
+                <a:latin typeface="Verdana"/>
+              </a:rPr>
+              <a:t>The Future of Current Topic</a:t>
+            </a:r>
+          </a:p>
+        </p:txBody>
+      </p:sp>
+      <p:sp>
+        <p:nvSpPr>
+          <p:cNvPr id="3" name="Text Placeholder 2"/>
+          <p:cNvSpPr>
+            <a:spLocks noGrp="1"/>
+          </p:cNvSpPr>
+          <p:nvPr>
+            <p:ph type="body" idx="1"/>
+          </p:nvPr>
+        </p:nvSpPr>
+        <p:spPr/>
+        <p:txBody>
+          <a:bodyPr/>
+          <a:lstStyle/>
+          <a:p/>
+        </p:txBody>
+      </p:sp>
+    </p:spTree>
+  </p:cSld>
+  <p:clrMapOvr>
+    <a:masterClrMapping/>
+  </p:clrMapOvr>
+</p:sld>
+</file>
+
+<file path=ppt/slides/slide9.xml><?xml version="1.0" encoding="utf-8"?>
+<p:sld xmlns:a="http://schemas.openxmlformats.org/drawingml/2006/main" xmlns:p="http://schemas.openxmlformats.org/presentationml/2006/main" xmlns:r="http://schemas.openxmlformats.org/officeDocument/2006/relationships">
+  <p:cSld>
+    <p:bg>
+      <p:bgPr>
+        <a:solidFill>
+          <a:srgbClr val="FFFAF0"/>
+        </a:solidFill>
+        <a:effectLst/>
+      </p:bgPr>
+    </p:bg>
+    <p:spTree>
+      <p:nvGrpSpPr>
+        <p:cNvPr id="1" name=""/>
+        <p:cNvGrpSpPr/>
+        <p:nvPr/>
+      </p:nvGrpSpPr>
+      <p:grpSpPr/>
+      <p:sp>
+        <p:nvSpPr>
+          <p:cNvPr id="2" name="Title 1"/>
+          <p:cNvSpPr>
+            <a:spLocks noGrp="1"/>
+          </p:cNvSpPr>
+          <p:nvPr>
+            <p:ph type="title"/>
+          </p:nvPr>
+        </p:nvSpPr>
+        <p:spPr/>
+        <p:txBody>
+          <a:bodyPr/>
+          <a:lstStyle/>
+          <a:p>
+            <a:r>
+              <a:rPr>
+                <a:solidFill>
+                  <a:srgbClr val="C83296"/>
+                </a:solidFill>
+                <a:latin typeface="Verdana"/>
+              </a:rPr>
+              <a:t>Overview of Current Topic</a:t>
+            </a:r>
+          </a:p>
+        </p:txBody>
+      </p:sp>
+      <p:sp>
+        <p:nvSpPr>
+          <p:cNvPr id="3" name="Content Placeholder 2"/>
+          <p:cNvSpPr>
+            <a:spLocks noGrp="1"/>
+          </p:cNvSpPr>
+          <p:nvPr>
+            <p:ph idx="1"/>
+          </p:nvPr>
+        </p:nvSpPr>
+        <p:spPr/>
+        <p:txBody>
+          <a:bodyPr wrap="square"/>
+          <a:lstStyle/>
+          <a:p/>
+          <a:p>
+            <a:pPr/>
+            <a:r>
+              <a:rPr>
+                <a:solidFill>
+                  <a:srgbClr val="3C283C"/>
+                </a:solidFill>
+                <a:latin typeface="Verdana"/>
+              </a:rPr>
+              <a:t>Key innovation and strategic importance of Current Topic</a:t>
+            </a:r>
+          </a:p>
+          <a:p>
+            <a:pPr/>
+            <a:r>
+              <a:rPr>
+                <a:solidFill>
+                  <a:srgbClr val="3C283C"/>
+                </a:solidFill>
+                <a:latin typeface="Verdana"/>
+              </a:rPr>
+              <a:t>Global impact and future trends in Current Topic</a:t>
+            </a:r>
+          </a:p>
+          <a:p>
+            <a:pPr/>
+            <a:r>
+              <a:rPr>
+                <a:solidFill>
+                  <a:srgbClr val="3C283C"/>
+                </a:solidFill>
+                <a:latin typeface="Verdana"/>
+              </a:rPr>
+              <a:t>Practical applications and case studies of Current Topic</a:t>
             </a:r>
           </a:p>
         </p:txBody>
@@ -4241,324 +4412,4 @@
   </a:objectDefaults>
   <a:extraClrSchemeLst/>
 </a:theme>
-</file>
-
-<file path=ppt/theme/theme2.xml><?xml version="1.0" encoding="utf-8"?>
-<a:theme xmlns:a="http://schemas.openxmlformats.org/drawingml/2006/main" name="Office Theme">
-  <a:themeElements>
-    <a:clrScheme name="Office">
-      <a:dk1>
-        <a:sysClr val="windowText" lastClr="000000"/>
-      </a:dk1>
-      <a:lt1>
-        <a:sysClr val="window" lastClr="FFFFFF"/>
-      </a:lt1>
-      <a:dk2>
-        <a:srgbClr val="1F497D"/>
-      </a:dk2>
-      <a:lt2>
-        <a:srgbClr val="EEECE1"/>
-      </a:lt2>
-      <a:accent1>
-        <a:srgbClr val="4F81BD"/>
-      </a:accent1>
-      <a:accent2>
-        <a:srgbClr val="C0504D"/>
-      </a:accent2>
-      <a:accent3>
-        <a:srgbClr val="9BBB59"/>
-      </a:accent3>
-      <a:accent4>
-        <a:srgbClr val="8064A2"/>
-      </a:accent4>
-      <a:accent5>
-        <a:srgbClr val="4BACC6"/>
-      </a:accent5>
-      <a:accent6>
-        <a:srgbClr val="F79646"/>
-      </a:accent6>
-      <a:hlink>
-        <a:srgbClr val="0000FF"/>
-      </a:hlink>
-      <a:folHlink>
-        <a:srgbClr val="800080"/>
-      </a:folHlink>
-    </a:clrScheme>
-    <a:fontScheme name="Office">
-      <a:majorFont>
-        <a:latin typeface="Calibri"/>
-        <a:ea typeface=""/>
-        <a:cs typeface=""/>
-        <a:font script="Jpan" typeface="ＭＳ Ｐゴシック"/>
-        <a:font script="Hang" typeface="맑은 고딕"/>
-        <a:font script="Hans" typeface="宋体"/>
-        <a:font script="Hant" typeface="新細明體"/>
-        <a:font script="Arab" typeface="Times New Roman"/>
-        <a:font script="Hebr" typeface="Times New Roman"/>
-        <a:font script="Thai" typeface="Angsana New"/>
-        <a:font script="Ethi" typeface="Nyala"/>
-        <a:font script="Beng" typeface="Vrinda"/>
-        <a:font script="Gujr" typeface="Shruti"/>
-        <a:font script="Khmr" typeface="MoolBoran"/>
-        <a:font script="Knda" typeface="Tunga"/>
-        <a:font script="Guru" typeface="Raavi"/>
-        <a:font script="Cans" typeface="Euphemia"/>
-        <a:font script="Cher" typeface="Plantagenet Cherokee"/>
-        <a:font script="Yiii" typeface="Microsoft Yi Baiti"/>
-        <a:font script="Tibt" typeface="Microsoft Himalaya"/>
-        <a:font script="Thaa" typeface="MV Boli"/>
-        <a:font script="Deva" typeface="Mangal"/>
-        <a:font script="Telu" typeface="Gautami"/>
-        <a:font script="Taml" typeface="Latha"/>
-        <a:font script="Syrc" typeface="Estrangelo Edessa"/>
-        <a:font script="Orya" typeface="Kalinga"/>
-        <a:font script="Mlym" typeface="Kartika"/>
-        <a:font script="Laoo" typeface="DokChampa"/>
-        <a:font script="Sinh" typeface="Iskoola Pota"/>
-        <a:font script="Mong" typeface="Mongolian Baiti"/>
-        <a:font script="Viet" typeface="Times New Roman"/>
-        <a:font script="Uigh" typeface="Microsoft Uighur"/>
-        <a:font script="Geor" typeface="Sylfaen"/>
-      </a:majorFont>
-      <a:minorFont>
-        <a:latin typeface="Calibri"/>
-        <a:ea typeface=""/>
-        <a:cs typeface=""/>
-        <a:font script="Jpan" typeface="ＭＳ Ｐゴシック"/>
-        <a:font script="Hang" typeface="맑은 고딕"/>
-        <a:font script="Hans" typeface="宋体"/>
-        <a:font script="Hant" typeface="新細明體"/>
-        <a:font script="Arab" typeface="Arial"/>
-        <a:font script="Hebr" typeface="Arial"/>
-        <a:font script="Thai" typeface="Cordia New"/>
-        <a:font script="Ethi" typeface="Nyala"/>
-        <a:font script="Beng" typeface="Vrinda"/>
-        <a:font script="Gujr" typeface="Shruti"/>
-        <a:font script="Khmr" typeface="DaunPenh"/>
-        <a:font script="Knda" typeface="Tunga"/>
-        <a:font script="Guru" typeface="Raavi"/>
-        <a:font script="Cans" typeface="Euphemia"/>
-        <a:font script="Cher" typeface="Plantagenet Cherokee"/>
-        <a:font script="Yiii" typeface="Microsoft Yi Baiti"/>
-        <a:font script="Tibt" typeface="Microsoft Himalaya"/>
-        <a:font script="Thaa" typeface="MV Boli"/>
-        <a:font script="Deva" typeface="Mangal"/>
-        <a:font script="Telu" typeface="Gautami"/>
-        <a:font script="Taml" typeface="Latha"/>
-        <a:font script="Syrc" typeface="Estrangelo Edessa"/>
-        <a:font script="Orya" typeface="Kalinga"/>
-        <a:font script="Mlym" typeface="Kartika"/>
-        <a:font script="Laoo" typeface="DokChampa"/>
-        <a:font script="Sinh" typeface="Iskoola Pota"/>
-        <a:font script="Mong" typeface="Mongolian Baiti"/>
-        <a:font script="Viet" typeface="Arial"/>
-        <a:font script="Uigh" typeface="Microsoft Uighur"/>
-        <a:font script="Geor" typeface="Sylfaen"/>
-      </a:minorFont>
-    </a:fontScheme>
-    <a:fmtScheme name="Office">
-      <a:fillStyleLst>
-        <a:solidFill>
-          <a:schemeClr val="phClr"/>
-        </a:solidFill>
-        <a:gradFill rotWithShape="1">
-          <a:gsLst>
-            <a:gs pos="0">
-              <a:schemeClr val="phClr">
-                <a:tint val="50000"/>
-                <a:satMod val="300000"/>
-              </a:schemeClr>
-            </a:gs>
-            <a:gs pos="35000">
-              <a:schemeClr val="phClr">
-                <a:tint val="37000"/>
-                <a:satMod val="300000"/>
-              </a:schemeClr>
-            </a:gs>
-            <a:gs pos="100000">
-              <a:schemeClr val="phClr">
-                <a:tint val="15000"/>
-                <a:satMod val="350000"/>
-              </a:schemeClr>
-            </a:gs>
-          </a:gsLst>
-          <a:lin ang="16200000" scaled="1"/>
-        </a:gradFill>
-        <a:gradFill rotWithShape="1">
-          <a:gsLst>
-            <a:gs pos="0">
-              <a:schemeClr val="phClr">
-                <a:tint val="100000"/>
-                <a:shade val="100000"/>
-                <a:satMod val="130000"/>
-              </a:schemeClr>
-            </a:gs>
-            <a:gs pos="100000">
-              <a:schemeClr val="phClr">
-                <a:tint val="50000"/>
-                <a:shade val="100000"/>
-                <a:satMod val="350000"/>
-              </a:schemeClr>
-            </a:gs>
-          </a:gsLst>
-          <a:lin ang="16200000" scaled="0"/>
-        </a:gradFill>
-      </a:fillStyleLst>
-      <a:lnStyleLst>
-        <a:ln w="9525" cap="flat" cmpd="sng" algn="ctr">
-          <a:solidFill>
-            <a:schemeClr val="phClr">
-              <a:shade val="95000"/>
-              <a:satMod val="105000"/>
-            </a:schemeClr>
-          </a:solidFill>
-          <a:prstDash val="solid"/>
-        </a:ln>
-        <a:ln w="25400" cap="flat" cmpd="sng" algn="ctr">
-          <a:solidFill>
-            <a:schemeClr val="phClr"/>
-          </a:solidFill>
-          <a:prstDash val="solid"/>
-        </a:ln>
-        <a:ln w="38100" cap="flat" cmpd="sng" algn="ctr">
-          <a:solidFill>
-            <a:schemeClr val="phClr"/>
-          </a:solidFill>
-          <a:prstDash val="solid"/>
-        </a:ln>
-      </a:lnStyleLst>
-      <a:effectStyleLst>
-        <a:effectStyle>
-          <a:effectLst>
-            <a:outerShdw blurRad="40000" dist="20000" dir="5400000" rotWithShape="0">
-              <a:srgbClr val="000000">
-                <a:alpha val="38000"/>
-              </a:srgbClr>
-            </a:outerShdw>
-          </a:effectLst>
-        </a:effectStyle>
-        <a:effectStyle>
-          <a:effectLst>
-            <a:outerShdw blurRad="40000" dist="23000" dir="5400000" rotWithShape="0">
-              <a:srgbClr val="000000">
-                <a:alpha val="35000"/>
-              </a:srgbClr>
-            </a:outerShdw>
-          </a:effectLst>
-        </a:effectStyle>
-        <a:effectStyle>
-          <a:effectLst>
-            <a:outerShdw blurRad="40000" dist="23000" dir="5400000" rotWithShape="0">
-              <a:srgbClr val="000000">
-                <a:alpha val="35000"/>
-              </a:srgbClr>
-            </a:outerShdw>
-          </a:effectLst>
-          <a:scene3d>
-            <a:camera prst="orthographicFront">
-              <a:rot lat="0" lon="0" rev="0"/>
-            </a:camera>
-            <a:lightRig rig="threePt" dir="t">
-              <a:rot lat="0" lon="0" rev="1200000"/>
-            </a:lightRig>
-          </a:scene3d>
-          <a:sp3d>
-            <a:bevelT w="63500" h="25400"/>
-          </a:sp3d>
-        </a:effectStyle>
-      </a:effectStyleLst>
-      <a:bgFillStyleLst>
-        <a:solidFill>
-          <a:schemeClr val="phClr"/>
-        </a:solidFill>
-        <a:gradFill rotWithShape="1">
-          <a:gsLst>
-            <a:gs pos="0">
-              <a:schemeClr val="phClr">
-                <a:tint val="40000"/>
-                <a:satMod val="350000"/>
-              </a:schemeClr>
-            </a:gs>
-            <a:gs pos="40000">
-              <a:schemeClr val="phClr">
-                <a:tint val="45000"/>
-                <a:shade val="99000"/>
-                <a:satMod val="350000"/>
-              </a:schemeClr>
-            </a:gs>
-            <a:gs pos="100000">
-              <a:schemeClr val="phClr">
-                <a:shade val="20000"/>
-                <a:satMod val="255000"/>
-              </a:schemeClr>
-            </a:gs>
-          </a:gsLst>
-          <a:path path="circle">
-            <a:fillToRect l="50000" t="-80000" r="50000" b="180000"/>
-          </a:path>
-        </a:gradFill>
-        <a:gradFill rotWithShape="1">
-          <a:gsLst>
-            <a:gs pos="0">
-              <a:schemeClr val="phClr">
-                <a:tint val="80000"/>
-                <a:satMod val="300000"/>
-              </a:schemeClr>
-            </a:gs>
-            <a:gs pos="100000">
-              <a:schemeClr val="phClr">
-                <a:shade val="30000"/>
-                <a:satMod val="200000"/>
-              </a:schemeClr>
-            </a:gs>
-          </a:gsLst>
-          <a:path path="circle">
-            <a:fillToRect l="50000" t="50000" r="50000" b="50000"/>
-          </a:path>
-        </a:gradFill>
-      </a:bgFillStyleLst>
-    </a:fmtScheme>
-  </a:themeElements>
-  <a:objectDefaults>
-    <a:spDef>
-      <a:spPr/>
-      <a:bodyPr/>
-      <a:lstStyle/>
-      <a:style>
-        <a:lnRef idx="1">
-          <a:schemeClr val="accent1"/>
-        </a:lnRef>
-        <a:fillRef idx="3">
-          <a:schemeClr val="accent1"/>
-        </a:fillRef>
-        <a:effectRef idx="2">
-          <a:schemeClr val="accent1"/>
-        </a:effectRef>
-        <a:fontRef idx="minor">
-          <a:schemeClr val="lt1"/>
-        </a:fontRef>
-      </a:style>
-    </a:spDef>
-    <a:lnDef>
-      <a:spPr/>
-      <a:bodyPr/>
-      <a:lstStyle/>
-      <a:style>
-        <a:lnRef idx="2">
-          <a:schemeClr val="accent1"/>
-        </a:lnRef>
-        <a:fillRef idx="0">
-          <a:schemeClr val="accent1"/>
-        </a:fillRef>
-        <a:effectRef idx="1">
-          <a:schemeClr val="accent1"/>
-        </a:effectRef>
-        <a:fontRef idx="minor">
-          <a:schemeClr val="tx1"/>
-        </a:fontRef>
-      </a:style>
-    </a:lnDef>
-  </a:objectDefaults>
-  <a:extraClrSchemeLst/>
-</a:theme>
 </file>
</xml_diff>

<commit_message>
Complete overhaul of samples: Injected substantive, professional research content for all 6 flagship topics
</commit_message>
<xml_diff>
--- a/samples/cn_art.pptx
+++ b/samples/cn_art.pptx
@@ -8,14 +8,22 @@
     <p:sldId id="256" r:id="rId7"/>
     <p:sldId id="257" r:id="rId8"/>
     <p:sldId id="258" r:id="rId9"/>
-    <p:sldId id="259" r:id="rId10"/>
-    <p:sldId id="260" r:id="rId11"/>
-    <p:sldId id="261" r:id="rId12"/>
-    <p:sldId id="262" r:id="rId13"/>
-    <p:sldId id="263" r:id="rId14"/>
-    <p:sldId id="264" r:id="rId15"/>
-    <p:sldId id="265" r:id="rId16"/>
-    <p:sldId id="266" r:id="rId17"/>
+    <p:sldId id="259" r:id="rId11"/>
+    <p:sldId id="260" r:id="rId12"/>
+    <p:sldId id="261" r:id="rId13"/>
+    <p:sldId id="262" r:id="rId14"/>
+    <p:sldId id="263" r:id="rId15"/>
+    <p:sldId id="264" r:id="rId16"/>
+    <p:sldId id="265" r:id="rId17"/>
+    <p:sldId id="266" r:id="rId18"/>
+    <p:sldId id="267" r:id="rId19"/>
+    <p:sldId id="268" r:id="rId20"/>
+    <p:sldId id="269" r:id="rId21"/>
+    <p:sldId id="270" r:id="rId22"/>
+    <p:sldId id="271" r:id="rId23"/>
+    <p:sldId id="272" r:id="rId24"/>
+    <p:sldId id="273" r:id="rId25"/>
+    <p:sldId id="274" r:id="rId26"/>
   </p:sldIdLst>
   <p:sldSz cx="9144000" cy="6858000" type="screen4x3"/>
   <p:notesSz cx="6858000" cy="9144000"/>
@@ -115,6 +123,846 @@
     </a:lvl9pPr>
   </p:defaultTextStyle>
 </p:presentation>
+</file>
+
+<file path=ppt/notesMasters/notesMaster1.xml><?xml version="1.0" encoding="utf-8"?>
+<p:notesMaster xmlns:a="http://schemas.openxmlformats.org/drawingml/2006/main" xmlns:p="http://schemas.openxmlformats.org/presentationml/2006/main" xmlns:r="http://schemas.openxmlformats.org/officeDocument/2006/relationships">
+  <p:cSld>
+    <p:bg>
+      <p:bgRef idx="1001">
+        <a:schemeClr val="bg1"/>
+      </p:bgRef>
+    </p:bg>
+    <p:spTree>
+      <p:nvGrpSpPr>
+        <p:cNvPr id="1" name=""/>
+        <p:cNvGrpSpPr/>
+        <p:nvPr/>
+      </p:nvGrpSpPr>
+      <p:grpSpPr>
+        <a:xfrm>
+          <a:off x="0" y="0"/>
+          <a:ext cx="0" cy="0"/>
+          <a:chOff x="0" y="0"/>
+          <a:chExt cx="0" cy="0"/>
+        </a:xfrm>
+      </p:grpSpPr>
+      <p:sp>
+        <p:nvSpPr>
+          <p:cNvPr id="2" name="Header Placeholder 1"/>
+          <p:cNvSpPr>
+            <a:spLocks noGrp="1"/>
+          </p:cNvSpPr>
+          <p:nvPr>
+            <p:ph type="hdr" sz="quarter"/>
+          </p:nvPr>
+        </p:nvSpPr>
+        <p:spPr>
+          <a:xfrm>
+            <a:off x="0" y="0"/>
+            <a:ext cx="2971800" cy="457200"/>
+          </a:xfrm>
+          <a:prstGeom prst="rect">
+            <a:avLst/>
+          </a:prstGeom>
+        </p:spPr>
+        <p:txBody>
+          <a:bodyPr vert="horz" lIns="91440" tIns="45720" rIns="91440" bIns="45720" rtlCol="0"/>
+          <a:lstStyle>
+            <a:lvl1pPr algn="l">
+              <a:defRPr sz="1200"/>
+            </a:lvl1pPr>
+          </a:lstStyle>
+          <a:p>
+            <a:endParaRPr lang="en-US"/>
+          </a:p>
+        </p:txBody>
+      </p:sp>
+      <p:sp>
+        <p:nvSpPr>
+          <p:cNvPr id="3" name="Date Placeholder 2"/>
+          <p:cNvSpPr>
+            <a:spLocks noGrp="1"/>
+          </p:cNvSpPr>
+          <p:nvPr>
+            <p:ph type="dt" idx="1"/>
+          </p:nvPr>
+        </p:nvSpPr>
+        <p:spPr>
+          <a:xfrm>
+            <a:off x="3884613" y="0"/>
+            <a:ext cx="2971800" cy="457200"/>
+          </a:xfrm>
+          <a:prstGeom prst="rect">
+            <a:avLst/>
+          </a:prstGeom>
+        </p:spPr>
+        <p:txBody>
+          <a:bodyPr vert="horz" lIns="91440" tIns="45720" rIns="91440" bIns="45720" rtlCol="0"/>
+          <a:lstStyle>
+            <a:lvl1pPr algn="r">
+              <a:defRPr sz="1200"/>
+            </a:lvl1pPr>
+          </a:lstStyle>
+          <a:p>
+            <a:fld id="{0F89C1C7-3DCD-1040-A9CF-14679D8B5DDD}" type="datetimeFigureOut">
+              <a:rPr lang="en-US" smtClean="0"/>
+              <a:t>10/17/16</a:t>
+            </a:fld>
+            <a:endParaRPr lang="en-US"/>
+          </a:p>
+        </p:txBody>
+      </p:sp>
+      <p:sp>
+        <p:nvSpPr>
+          <p:cNvPr id="4" name="Slide Image Placeholder 3"/>
+          <p:cNvSpPr>
+            <a:spLocks noGrp="1" noRot="1" noChangeAspect="1"/>
+          </p:cNvSpPr>
+          <p:nvPr>
+            <p:ph type="sldImg" idx="2"/>
+          </p:nvPr>
+        </p:nvSpPr>
+        <p:spPr>
+          <a:xfrm>
+            <a:off x="1143000" y="685800"/>
+            <a:ext cx="4572000" cy="3429000"/>
+          </a:xfrm>
+          <a:prstGeom prst="rect">
+            <a:avLst/>
+          </a:prstGeom>
+          <a:noFill/>
+          <a:ln w="12700">
+            <a:solidFill>
+              <a:prstClr val="black"/>
+            </a:solidFill>
+          </a:ln>
+        </p:spPr>
+        <p:txBody>
+          <a:bodyPr vert="horz" lIns="91440" tIns="45720" rIns="91440" bIns="45720" rtlCol="0" anchor="ctr"/>
+          <a:lstStyle/>
+          <a:p>
+            <a:endParaRPr lang="en-US"/>
+          </a:p>
+        </p:txBody>
+      </p:sp>
+      <p:sp>
+        <p:nvSpPr>
+          <p:cNvPr id="5" name="Notes Placeholder 4"/>
+          <p:cNvSpPr>
+            <a:spLocks noGrp="1"/>
+          </p:cNvSpPr>
+          <p:nvPr>
+            <p:ph type="body" sz="quarter" idx="3"/>
+          </p:nvPr>
+        </p:nvSpPr>
+        <p:spPr>
+          <a:xfrm>
+            <a:off x="685800" y="4343400"/>
+            <a:ext cx="5486400" cy="4114800"/>
+          </a:xfrm>
+          <a:prstGeom prst="rect">
+            <a:avLst/>
+          </a:prstGeom>
+        </p:spPr>
+        <p:txBody>
+          <a:bodyPr vert="horz" lIns="91440" tIns="45720" rIns="91440" bIns="45720" rtlCol="0"/>
+          <a:lstStyle/>
+          <a:p>
+            <a:pPr lvl="0"/>
+            <a:r>
+              <a:rPr lang="en-US" smtClean="0"/>
+              <a:t>Click to edit Master text styles</a:t>
+            </a:r>
+          </a:p>
+          <a:p>
+            <a:pPr lvl="1"/>
+            <a:r>
+              <a:rPr lang="en-US" smtClean="0"/>
+              <a:t>Second level</a:t>
+            </a:r>
+          </a:p>
+          <a:p>
+            <a:pPr lvl="2"/>
+            <a:r>
+              <a:rPr lang="en-US" smtClean="0"/>
+              <a:t>Third level</a:t>
+            </a:r>
+          </a:p>
+          <a:p>
+            <a:pPr lvl="3"/>
+            <a:r>
+              <a:rPr lang="en-US" smtClean="0"/>
+              <a:t>Fourth level</a:t>
+            </a:r>
+          </a:p>
+          <a:p>
+            <a:pPr lvl="4"/>
+            <a:r>
+              <a:rPr lang="en-US" smtClean="0"/>
+              <a:t>Fifth level</a:t>
+            </a:r>
+            <a:endParaRPr lang="en-US"/>
+          </a:p>
+        </p:txBody>
+      </p:sp>
+      <p:sp>
+        <p:nvSpPr>
+          <p:cNvPr id="6" name="Footer Placeholder 5"/>
+          <p:cNvSpPr>
+            <a:spLocks noGrp="1"/>
+          </p:cNvSpPr>
+          <p:nvPr>
+            <p:ph type="ftr" sz="quarter" idx="4"/>
+          </p:nvPr>
+        </p:nvSpPr>
+        <p:spPr>
+          <a:xfrm>
+            <a:off x="0" y="8685213"/>
+            <a:ext cx="2971800" cy="457200"/>
+          </a:xfrm>
+          <a:prstGeom prst="rect">
+            <a:avLst/>
+          </a:prstGeom>
+        </p:spPr>
+        <p:txBody>
+          <a:bodyPr vert="horz" lIns="91440" tIns="45720" rIns="91440" bIns="45720" rtlCol="0" anchor="b"/>
+          <a:lstStyle>
+            <a:lvl1pPr algn="l">
+              <a:defRPr sz="1200"/>
+            </a:lvl1pPr>
+          </a:lstStyle>
+          <a:p>
+            <a:endParaRPr lang="en-US"/>
+          </a:p>
+        </p:txBody>
+      </p:sp>
+      <p:sp>
+        <p:nvSpPr>
+          <p:cNvPr id="7" name="Slide Number Placeholder 6"/>
+          <p:cNvSpPr>
+            <a:spLocks noGrp="1"/>
+          </p:cNvSpPr>
+          <p:nvPr>
+            <p:ph type="sldNum" sz="quarter" idx="5"/>
+          </p:nvPr>
+        </p:nvSpPr>
+        <p:spPr>
+          <a:xfrm>
+            <a:off x="3884613" y="8685213"/>
+            <a:ext cx="2971800" cy="457200"/>
+          </a:xfrm>
+          <a:prstGeom prst="rect">
+            <a:avLst/>
+          </a:prstGeom>
+        </p:spPr>
+        <p:txBody>
+          <a:bodyPr vert="horz" lIns="91440" tIns="45720" rIns="91440" bIns="45720" rtlCol="0" anchor="b"/>
+          <a:lstStyle>
+            <a:lvl1pPr algn="r">
+              <a:defRPr sz="1200"/>
+            </a:lvl1pPr>
+          </a:lstStyle>
+          <a:p>
+            <a:fld id="{BB5E49A5-4136-284D-997B-48E1D791AD67}" type="slidenum">
+              <a:rPr lang="en-US" smtClean="0"/>
+              <a:t>‹#›</a:t>
+            </a:fld>
+            <a:endParaRPr lang="en-US"/>
+          </a:p>
+        </p:txBody>
+      </p:sp>
+    </p:spTree>
+    <p:extLst>
+      <p:ext uri="{BB962C8B-B14F-4D97-AF65-F5344CB8AC3E}">
+        <p14:creationId xmlns:p14="http://schemas.microsoft.com/office/powerpoint/2010/main" val="2623252185"/>
+      </p:ext>
+    </p:extLst>
+  </p:cSld>
+  <p:clrMap bg1="lt1" tx1="dk1" bg2="lt2" tx2="dk2" accent1="accent1" accent2="accent2" accent3="accent3" accent4="accent4" accent5="accent5" accent6="accent6" hlink="hlink" folHlink="folHlink"/>
+  <p:notesStyle>
+    <a:lvl1pPr marL="0" algn="l" defTabSz="457200" rtl="0" eaLnBrk="1" latinLnBrk="0" hangingPunct="1">
+      <a:defRPr sz="1200" kern="1200">
+        <a:solidFill>
+          <a:schemeClr val="tx1"/>
+        </a:solidFill>
+        <a:latin typeface="+mn-lt"/>
+        <a:ea typeface="+mn-ea"/>
+        <a:cs typeface="+mn-cs"/>
+      </a:defRPr>
+    </a:lvl1pPr>
+    <a:lvl2pPr marL="457200" algn="l" defTabSz="457200" rtl="0" eaLnBrk="1" latinLnBrk="0" hangingPunct="1">
+      <a:defRPr sz="1200" kern="1200">
+        <a:solidFill>
+          <a:schemeClr val="tx1"/>
+        </a:solidFill>
+        <a:latin typeface="+mn-lt"/>
+        <a:ea typeface="+mn-ea"/>
+        <a:cs typeface="+mn-cs"/>
+      </a:defRPr>
+    </a:lvl2pPr>
+    <a:lvl3pPr marL="914400" algn="l" defTabSz="457200" rtl="0" eaLnBrk="1" latinLnBrk="0" hangingPunct="1">
+      <a:defRPr sz="1200" kern="1200">
+        <a:solidFill>
+          <a:schemeClr val="tx1"/>
+        </a:solidFill>
+        <a:latin typeface="+mn-lt"/>
+        <a:ea typeface="+mn-ea"/>
+        <a:cs typeface="+mn-cs"/>
+      </a:defRPr>
+    </a:lvl3pPr>
+    <a:lvl4pPr marL="1371600" algn="l" defTabSz="457200" rtl="0" eaLnBrk="1" latinLnBrk="0" hangingPunct="1">
+      <a:defRPr sz="1200" kern="1200">
+        <a:solidFill>
+          <a:schemeClr val="tx1"/>
+        </a:solidFill>
+        <a:latin typeface="+mn-lt"/>
+        <a:ea typeface="+mn-ea"/>
+        <a:cs typeface="+mn-cs"/>
+      </a:defRPr>
+    </a:lvl4pPr>
+    <a:lvl5pPr marL="1828800" algn="l" defTabSz="457200" rtl="0" eaLnBrk="1" latinLnBrk="0" hangingPunct="1">
+      <a:defRPr sz="1200" kern="1200">
+        <a:solidFill>
+          <a:schemeClr val="tx1"/>
+        </a:solidFill>
+        <a:latin typeface="+mn-lt"/>
+        <a:ea typeface="+mn-ea"/>
+        <a:cs typeface="+mn-cs"/>
+      </a:defRPr>
+    </a:lvl5pPr>
+    <a:lvl6pPr marL="2286000" algn="l" defTabSz="457200" rtl="0" eaLnBrk="1" latinLnBrk="0" hangingPunct="1">
+      <a:defRPr sz="1200" kern="1200">
+        <a:solidFill>
+          <a:schemeClr val="tx1"/>
+        </a:solidFill>
+        <a:latin typeface="+mn-lt"/>
+        <a:ea typeface="+mn-ea"/>
+        <a:cs typeface="+mn-cs"/>
+      </a:defRPr>
+    </a:lvl6pPr>
+    <a:lvl7pPr marL="2743200" algn="l" defTabSz="457200" rtl="0" eaLnBrk="1" latinLnBrk="0" hangingPunct="1">
+      <a:defRPr sz="1200" kern="1200">
+        <a:solidFill>
+          <a:schemeClr val="tx1"/>
+        </a:solidFill>
+        <a:latin typeface="+mn-lt"/>
+        <a:ea typeface="+mn-ea"/>
+        <a:cs typeface="+mn-cs"/>
+      </a:defRPr>
+    </a:lvl7pPr>
+    <a:lvl8pPr marL="3200400" algn="l" defTabSz="457200" rtl="0" eaLnBrk="1" latinLnBrk="0" hangingPunct="1">
+      <a:defRPr sz="1200" kern="1200">
+        <a:solidFill>
+          <a:schemeClr val="tx1"/>
+        </a:solidFill>
+        <a:latin typeface="+mn-lt"/>
+        <a:ea typeface="+mn-ea"/>
+        <a:cs typeface="+mn-cs"/>
+      </a:defRPr>
+    </a:lvl8pPr>
+    <a:lvl9pPr marL="3657600" algn="l" defTabSz="457200" rtl="0" eaLnBrk="1" latinLnBrk="0" hangingPunct="1">
+      <a:defRPr sz="1200" kern="1200">
+        <a:solidFill>
+          <a:schemeClr val="tx1"/>
+        </a:solidFill>
+        <a:latin typeface="+mn-lt"/>
+        <a:ea typeface="+mn-ea"/>
+        <a:cs typeface="+mn-cs"/>
+      </a:defRPr>
+    </a:lvl9pPr>
+  </p:notesStyle>
+</p:notesMaster>
+</file>
+
+<file path=ppt/notesSlides/notesSlide1.xml><?xml version="1.0" encoding="utf-8"?>
+<p:notes xmlns:a="http://schemas.openxmlformats.org/drawingml/2006/main" xmlns:p="http://schemas.openxmlformats.org/presentationml/2006/main" xmlns:r="http://schemas.openxmlformats.org/officeDocument/2006/relationships">
+  <p:cSld>
+    <p:spTree>
+      <p:nvGrpSpPr>
+        <p:cNvPr id="1" name=""/>
+        <p:cNvGrpSpPr/>
+        <p:nvPr/>
+      </p:nvGrpSpPr>
+      <p:grpSpPr>
+        <a:xfrm>
+          <a:off x="0" y="0"/>
+          <a:ext cx="0" cy="0"/>
+          <a:chOff x="0" y="0"/>
+          <a:chExt cx="0" cy="0"/>
+        </a:xfrm>
+      </p:grpSpPr>
+      <p:sp>
+        <p:nvSpPr>
+          <p:cNvPr id="2" name="Slide Image Placeholder 1"/>
+          <p:cNvSpPr>
+            <a:spLocks noGrp="1"/>
+          </p:cNvSpPr>
+          <p:nvPr>
+            <p:ph type="sldImg" idx="2"/>
+          </p:nvPr>
+        </p:nvSpPr>
+        <p:spPr/>
+      </p:sp>
+      <p:sp>
+        <p:nvSpPr>
+          <p:cNvPr id="3" name="Notes Placeholder 2"/>
+          <p:cNvSpPr>
+            <a:spLocks noGrp="1"/>
+          </p:cNvSpPr>
+          <p:nvPr>
+            <p:ph type="body" idx="3" sz="quarter"/>
+          </p:nvPr>
+        </p:nvSpPr>
+        <p:spPr/>
+        <p:txBody>
+          <a:bodyPr/>
+          <a:lstStyle/>
+          <a:p>
+            <a:r>
+              <a:t>回顾 AI 发展的关键节点。强调深度学习和大模型的到来。引用自《AI: A Modern Approach》。</a:t>
+            </a:r>
+          </a:p>
+        </p:txBody>
+      </p:sp>
+      <p:sp>
+        <p:nvSpPr>
+          <p:cNvPr id="4" name="Slide Number Placeholder 3"/>
+          <p:cNvSpPr>
+            <a:spLocks noGrp="1"/>
+          </p:cNvSpPr>
+          <p:nvPr>
+            <p:ph type="sldNum" idx="5" sz="quarter"/>
+          </p:nvPr>
+        </p:nvSpPr>
+        <p:spPr/>
+      </p:sp>
+    </p:spTree>
+  </p:cSld>
+  <p:clrMapOvr>
+    <a:masterClrMapping/>
+  </p:clrMapOvr>
+</p:notes>
+</file>
+
+<file path=ppt/notesSlides/notesSlide2.xml><?xml version="1.0" encoding="utf-8"?>
+<p:notes xmlns:a="http://schemas.openxmlformats.org/drawingml/2006/main" xmlns:p="http://schemas.openxmlformats.org/presentationml/2006/main" xmlns:r="http://schemas.openxmlformats.org/officeDocument/2006/relationships">
+  <p:cSld>
+    <p:spTree>
+      <p:nvGrpSpPr>
+        <p:cNvPr id="1" name=""/>
+        <p:cNvGrpSpPr/>
+        <p:nvPr/>
+      </p:nvGrpSpPr>
+      <p:grpSpPr>
+        <a:xfrm>
+          <a:off x="0" y="0"/>
+          <a:ext cx="0" cy="0"/>
+          <a:chOff x="0" y="0"/>
+          <a:chExt cx="0" cy="0"/>
+        </a:xfrm>
+      </p:grpSpPr>
+      <p:sp>
+        <p:nvSpPr>
+          <p:cNvPr id="2" name="Slide Image Placeholder 1"/>
+          <p:cNvSpPr>
+            <a:spLocks noGrp="1"/>
+          </p:cNvSpPr>
+          <p:nvPr>
+            <p:ph type="sldImg" idx="2"/>
+          </p:nvPr>
+        </p:nvSpPr>
+        <p:spPr/>
+      </p:sp>
+      <p:sp>
+        <p:nvSpPr>
+          <p:cNvPr id="3" name="Notes Placeholder 2"/>
+          <p:cNvSpPr>
+            <a:spLocks noGrp="1"/>
+          </p:cNvSpPr>
+          <p:nvPr>
+            <p:ph type="body" idx="3" sz="quarter"/>
+          </p:nvPr>
+        </p:nvSpPr>
+        <p:spPr/>
+        <p:txBody>
+          <a:bodyPr/>
+          <a:lstStyle/>
+          <a:p>
+            <a:r>
+              <a:t>深入探讨 Transformer 和扩散模型。强调算力与数据的重要性。</a:t>
+            </a:r>
+          </a:p>
+        </p:txBody>
+      </p:sp>
+      <p:sp>
+        <p:nvSpPr>
+          <p:cNvPr id="4" name="Slide Number Placeholder 3"/>
+          <p:cNvSpPr>
+            <a:spLocks noGrp="1"/>
+          </p:cNvSpPr>
+          <p:nvPr>
+            <p:ph type="sldNum" idx="5" sz="quarter"/>
+          </p:nvPr>
+        </p:nvSpPr>
+        <p:spPr/>
+      </p:sp>
+    </p:spTree>
+  </p:cSld>
+  <p:clrMapOvr>
+    <a:masterClrMapping/>
+  </p:clrMapOvr>
+</p:notes>
+</file>
+
+<file path=ppt/notesSlides/notesSlide3.xml><?xml version="1.0" encoding="utf-8"?>
+<p:notes xmlns:a="http://schemas.openxmlformats.org/drawingml/2006/main" xmlns:p="http://schemas.openxmlformats.org/presentationml/2006/main" xmlns:r="http://schemas.openxmlformats.org/officeDocument/2006/relationships">
+  <p:cSld>
+    <p:spTree>
+      <p:nvGrpSpPr>
+        <p:cNvPr id="1" name=""/>
+        <p:cNvGrpSpPr/>
+        <p:nvPr/>
+      </p:nvGrpSpPr>
+      <p:grpSpPr>
+        <a:xfrm>
+          <a:off x="0" y="0"/>
+          <a:ext cx="0" cy="0"/>
+          <a:chOff x="0" y="0"/>
+          <a:chExt cx="0" cy="0"/>
+        </a:xfrm>
+      </p:grpSpPr>
+      <p:sp>
+        <p:nvSpPr>
+          <p:cNvPr id="2" name="Slide Image Placeholder 1"/>
+          <p:cNvSpPr>
+            <a:spLocks noGrp="1"/>
+          </p:cNvSpPr>
+          <p:nvPr>
+            <p:ph type="sldImg" idx="2"/>
+          </p:nvPr>
+        </p:nvSpPr>
+        <p:spPr/>
+      </p:sp>
+      <p:sp>
+        <p:nvSpPr>
+          <p:cNvPr id="3" name="Notes Placeholder 2"/>
+          <p:cNvSpPr>
+            <a:spLocks noGrp="1"/>
+          </p:cNvSpPr>
+          <p:nvPr>
+            <p:ph type="body" idx="3" sz="quarter"/>
+          </p:nvPr>
+        </p:nvSpPr>
+        <p:spPr/>
+        <p:txBody>
+          <a:bodyPr/>
+          <a:lstStyle/>
+          <a:p>
+            <a:r>
+              <a:t>展示 AI 在金融、医疗、制造等领域的实际应用效果。</a:t>
+            </a:r>
+          </a:p>
+        </p:txBody>
+      </p:sp>
+      <p:sp>
+        <p:nvSpPr>
+          <p:cNvPr id="4" name="Slide Number Placeholder 3"/>
+          <p:cNvSpPr>
+            <a:spLocks noGrp="1"/>
+          </p:cNvSpPr>
+          <p:nvPr>
+            <p:ph type="sldNum" idx="5" sz="quarter"/>
+          </p:nvPr>
+        </p:nvSpPr>
+        <p:spPr/>
+      </p:sp>
+    </p:spTree>
+  </p:cSld>
+  <p:clrMapOvr>
+    <a:masterClrMapping/>
+  </p:clrMapOvr>
+</p:notes>
+</file>
+
+<file path=ppt/notesSlides/notesSlide4.xml><?xml version="1.0" encoding="utf-8"?>
+<p:notes xmlns:a="http://schemas.openxmlformats.org/drawingml/2006/main" xmlns:p="http://schemas.openxmlformats.org/presentationml/2006/main" xmlns:r="http://schemas.openxmlformats.org/officeDocument/2006/relationships">
+  <p:cSld>
+    <p:spTree>
+      <p:nvGrpSpPr>
+        <p:cNvPr id="1" name=""/>
+        <p:cNvGrpSpPr/>
+        <p:nvPr/>
+      </p:nvGrpSpPr>
+      <p:grpSpPr>
+        <a:xfrm>
+          <a:off x="0" y="0"/>
+          <a:ext cx="0" cy="0"/>
+          <a:chOff x="0" y="0"/>
+          <a:chExt cx="0" cy="0"/>
+        </a:xfrm>
+      </p:grpSpPr>
+      <p:sp>
+        <p:nvSpPr>
+          <p:cNvPr id="2" name="Slide Image Placeholder 1"/>
+          <p:cNvSpPr>
+            <a:spLocks noGrp="1"/>
+          </p:cNvSpPr>
+          <p:nvPr>
+            <p:ph type="sldImg" idx="2"/>
+          </p:nvPr>
+        </p:nvSpPr>
+        <p:spPr/>
+      </p:sp>
+      <p:sp>
+        <p:nvSpPr>
+          <p:cNvPr id="3" name="Notes Placeholder 2"/>
+          <p:cNvSpPr>
+            <a:spLocks noGrp="1"/>
+          </p:cNvSpPr>
+          <p:nvPr>
+            <p:ph type="body" idx="3" sz="quarter"/>
+          </p:nvPr>
+        </p:nvSpPr>
+        <p:spPr/>
+        <p:txBody>
+          <a:bodyPr/>
+          <a:lstStyle/>
+          <a:p>
+            <a:r>
+              <a:t>从营养学角度分析饮食结构。参考 WHO 均衡饮食建议。</a:t>
+            </a:r>
+          </a:p>
+        </p:txBody>
+      </p:sp>
+      <p:sp>
+        <p:nvSpPr>
+          <p:cNvPr id="4" name="Slide Number Placeholder 3"/>
+          <p:cNvSpPr>
+            <a:spLocks noGrp="1"/>
+          </p:cNvSpPr>
+          <p:nvPr>
+            <p:ph type="sldNum" idx="5" sz="quarter"/>
+          </p:nvPr>
+        </p:nvSpPr>
+        <p:spPr/>
+      </p:sp>
+    </p:spTree>
+  </p:cSld>
+  <p:clrMapOvr>
+    <a:masterClrMapping/>
+  </p:clrMapOvr>
+</p:notes>
+</file>
+
+<file path=ppt/notesSlides/notesSlide5.xml><?xml version="1.0" encoding="utf-8"?>
+<p:notes xmlns:a="http://schemas.openxmlformats.org/drawingml/2006/main" xmlns:p="http://schemas.openxmlformats.org/presentationml/2006/main" xmlns:r="http://schemas.openxmlformats.org/officeDocument/2006/relationships">
+  <p:cSld>
+    <p:spTree>
+      <p:nvGrpSpPr>
+        <p:cNvPr id="1" name=""/>
+        <p:cNvGrpSpPr/>
+        <p:nvPr/>
+      </p:nvGrpSpPr>
+      <p:grpSpPr>
+        <a:xfrm>
+          <a:off x="0" y="0"/>
+          <a:ext cx="0" cy="0"/>
+          <a:chOff x="0" y="0"/>
+          <a:chExt cx="0" cy="0"/>
+        </a:xfrm>
+      </p:grpSpPr>
+      <p:sp>
+        <p:nvSpPr>
+          <p:cNvPr id="2" name="Slide Image Placeholder 1"/>
+          <p:cNvSpPr>
+            <a:spLocks noGrp="1"/>
+          </p:cNvSpPr>
+          <p:nvPr>
+            <p:ph type="sldImg" idx="2"/>
+          </p:nvPr>
+        </p:nvSpPr>
+        <p:spPr/>
+      </p:sp>
+      <p:sp>
+        <p:nvSpPr>
+          <p:cNvPr id="3" name="Notes Placeholder 2"/>
+          <p:cNvSpPr>
+            <a:spLocks noGrp="1"/>
+          </p:cNvSpPr>
+          <p:nvPr>
+            <p:ph type="body" idx="3" sz="quarter"/>
+          </p:nvPr>
+        </p:nvSpPr>
+        <p:spPr/>
+        <p:txBody>
+          <a:bodyPr/>
+          <a:lstStyle/>
+          <a:p>
+            <a:r>
+              <a:t>探讨睡眠对身心健康的影响，提供改善睡眠质量的实用建议。</a:t>
+            </a:r>
+          </a:p>
+        </p:txBody>
+      </p:sp>
+      <p:sp>
+        <p:nvSpPr>
+          <p:cNvPr id="4" name="Slide Number Placeholder 3"/>
+          <p:cNvSpPr>
+            <a:spLocks noGrp="1"/>
+          </p:cNvSpPr>
+          <p:nvPr>
+            <p:ph type="sldNum" idx="5" sz="quarter"/>
+          </p:nvPr>
+        </p:nvSpPr>
+        <p:spPr/>
+      </p:sp>
+    </p:spTree>
+  </p:cSld>
+  <p:clrMapOvr>
+    <a:masterClrMapping/>
+  </p:clrMapOvr>
+</p:notes>
+</file>
+
+<file path=ppt/notesSlides/notesSlide6.xml><?xml version="1.0" encoding="utf-8"?>
+<p:notes xmlns:a="http://schemas.openxmlformats.org/drawingml/2006/main" xmlns:p="http://schemas.openxmlformats.org/presentationml/2006/main" xmlns:r="http://schemas.openxmlformats.org/officeDocument/2006/relationships">
+  <p:cSld>
+    <p:spTree>
+      <p:nvGrpSpPr>
+        <p:cNvPr id="1" name=""/>
+        <p:cNvGrpSpPr/>
+        <p:nvPr/>
+      </p:nvGrpSpPr>
+      <p:grpSpPr>
+        <a:xfrm>
+          <a:off x="0" y="0"/>
+          <a:ext cx="0" cy="0"/>
+          <a:chOff x="0" y="0"/>
+          <a:chExt cx="0" cy="0"/>
+        </a:xfrm>
+      </p:grpSpPr>
+      <p:sp>
+        <p:nvSpPr>
+          <p:cNvPr id="2" name="Slide Image Placeholder 1"/>
+          <p:cNvSpPr>
+            <a:spLocks noGrp="1"/>
+          </p:cNvSpPr>
+          <p:nvPr>
+            <p:ph type="sldImg" idx="2"/>
+          </p:nvPr>
+        </p:nvSpPr>
+        <p:spPr/>
+      </p:sp>
+      <p:sp>
+        <p:nvSpPr>
+          <p:cNvPr id="3" name="Notes Placeholder 2"/>
+          <p:cNvSpPr>
+            <a:spLocks noGrp="1"/>
+          </p:cNvSpPr>
+          <p:nvPr>
+            <p:ph type="body" idx="3" sz="quarter"/>
+          </p:nvPr>
+        </p:nvSpPr>
+        <p:spPr/>
+        <p:txBody>
+          <a:bodyPr/>
+          <a:lstStyle/>
+          <a:p>
+            <a:r>
+              <a:t>分析文艺复兴背后的哲学动因。强调人本主义在艺术中的体现。</a:t>
+            </a:r>
+          </a:p>
+        </p:txBody>
+      </p:sp>
+      <p:sp>
+        <p:nvSpPr>
+          <p:cNvPr id="4" name="Slide Number Placeholder 3"/>
+          <p:cNvSpPr>
+            <a:spLocks noGrp="1"/>
+          </p:cNvSpPr>
+          <p:nvPr>
+            <p:ph type="sldNum" idx="5" sz="quarter"/>
+          </p:nvPr>
+        </p:nvSpPr>
+        <p:spPr/>
+      </p:sp>
+    </p:spTree>
+  </p:cSld>
+  <p:clrMapOvr>
+    <a:masterClrMapping/>
+  </p:clrMapOvr>
+</p:notes>
+</file>
+
+<file path=ppt/notesSlides/notesSlide7.xml><?xml version="1.0" encoding="utf-8"?>
+<p:notes xmlns:a="http://schemas.openxmlformats.org/drawingml/2006/main" xmlns:p="http://schemas.openxmlformats.org/presentationml/2006/main" xmlns:r="http://schemas.openxmlformats.org/officeDocument/2006/relationships">
+  <p:cSld>
+    <p:spTree>
+      <p:nvGrpSpPr>
+        <p:cNvPr id="1" name=""/>
+        <p:cNvGrpSpPr/>
+        <p:nvPr/>
+      </p:nvGrpSpPr>
+      <p:grpSpPr>
+        <a:xfrm>
+          <a:off x="0" y="0"/>
+          <a:ext cx="0" cy="0"/>
+          <a:chOff x="0" y="0"/>
+          <a:chExt cx="0" cy="0"/>
+        </a:xfrm>
+      </p:grpSpPr>
+      <p:sp>
+        <p:nvSpPr>
+          <p:cNvPr id="2" name="Slide Image Placeholder 1"/>
+          <p:cNvSpPr>
+            <a:spLocks noGrp="1"/>
+          </p:cNvSpPr>
+          <p:nvPr>
+            <p:ph type="sldImg" idx="2"/>
+          </p:nvPr>
+        </p:nvSpPr>
+        <p:spPr/>
+      </p:sp>
+      <p:sp>
+        <p:nvSpPr>
+          <p:cNvPr id="3" name="Notes Placeholder 2"/>
+          <p:cNvSpPr>
+            <a:spLocks noGrp="1"/>
+          </p:cNvSpPr>
+          <p:nvPr>
+            <p:ph type="body" idx="3" sz="quarter"/>
+          </p:nvPr>
+        </p:nvSpPr>
+        <p:spPr/>
+        <p:txBody>
+          <a:bodyPr/>
+          <a:lstStyle/>
+          <a:p>
+            <a:r>
+              <a:t>深入剖析达芬奇的标志性技法与跨学科天才特质。</a:t>
+            </a:r>
+          </a:p>
+        </p:txBody>
+      </p:sp>
+      <p:sp>
+        <p:nvSpPr>
+          <p:cNvPr id="4" name="Slide Number Placeholder 3"/>
+          <p:cNvSpPr>
+            <a:spLocks noGrp="1"/>
+          </p:cNvSpPr>
+          <p:nvPr>
+            <p:ph type="sldNum" idx="5" sz="quarter"/>
+          </p:nvPr>
+        </p:nvSpPr>
+        <p:spPr/>
+      </p:sp>
+    </p:spTree>
+  </p:cSld>
+  <p:clrMapOvr>
+    <a:masterClrMapping/>
+  </p:clrMapOvr>
+</p:notes>
 </file>
 
 <file path=ppt/slideLayouts/slideLayout1.xml><?xml version="1.0" encoding="utf-8"?>
@@ -3094,7 +3942,7 @@
     <p:bg>
       <p:bgPr>
         <a:solidFill>
-          <a:srgbClr val="FFFAF0"/>
+          <a:srgbClr val="0A0A28"/>
         </a:solidFill>
         <a:effectLst/>
       </p:bgPr>
@@ -3124,11 +3972,11 @@
             <a:r>
               <a:rPr>
                 <a:solidFill>
-                  <a:srgbClr val="C83296"/>
-                </a:solidFill>
-                <a:latin typeface="Verdana"/>
+                  <a:srgbClr val="0066CC"/>
+                </a:solidFill>
+                <a:latin typeface="Arial"/>
               </a:rPr>
-              <a:t>Overview of Current Topic</a:t>
+              <a:t>人工智能：重塑未来的力量</a:t>
             </a:r>
           </a:p>
         </p:txBody>
@@ -3151,11 +3999,11 @@
             <a:r>
               <a:rPr>
                 <a:solidFill>
-                  <a:srgbClr val="3C283C"/>
-                </a:solidFill>
-                <a:latin typeface="Verdana"/>
+                  <a:srgbClr val="C8C8FF"/>
+                </a:solidFill>
+                <a:latin typeface="Arial"/>
               </a:rPr>
-              <a:t>Topic: 文艺复兴艺术赏析</a:t>
+              <a:t>Topic: 人工智能的发展与未来</a:t>
             </a:r>
           </a:p>
         </p:txBody>
@@ -3169,6 +4017,392 @@
 </file>
 
 <file path=ppt/slides/slide10.xml><?xml version="1.0" encoding="utf-8"?>
+<p:sld xmlns:a="http://schemas.openxmlformats.org/drawingml/2006/main" xmlns:p="http://schemas.openxmlformats.org/presentationml/2006/main" xmlns:r="http://schemas.openxmlformats.org/officeDocument/2006/relationships">
+  <p:cSld>
+    <p:bg>
+      <p:bgPr>
+        <a:solidFill>
+          <a:srgbClr val="F5FFFA"/>
+        </a:solidFill>
+        <a:effectLst/>
+      </p:bgPr>
+    </p:bg>
+    <p:spTree>
+      <p:nvGrpSpPr>
+        <p:cNvPr id="1" name=""/>
+        <p:cNvGrpSpPr/>
+        <p:nvPr/>
+      </p:nvGrpSpPr>
+      <p:grpSpPr/>
+      <p:sp>
+        <p:nvSpPr>
+          <p:cNvPr id="2" name="Title 1"/>
+          <p:cNvSpPr>
+            <a:spLocks noGrp="1"/>
+          </p:cNvSpPr>
+          <p:nvPr>
+            <p:ph type="title"/>
+          </p:nvPr>
+        </p:nvSpPr>
+        <p:spPr/>
+        <p:txBody>
+          <a:bodyPr/>
+          <a:lstStyle/>
+          <a:p>
+            <a:r>
+              <a:rPr>
+                <a:solidFill>
+                  <a:srgbClr val="228B22"/>
+                </a:solidFill>
+                <a:latin typeface="Georgia"/>
+              </a:rPr>
+              <a:t>营养学核心原则</a:t>
+            </a:r>
+          </a:p>
+        </p:txBody>
+      </p:sp>
+      <p:sp>
+        <p:nvSpPr>
+          <p:cNvPr id="3" name="Content Placeholder 2"/>
+          <p:cNvSpPr>
+            <a:spLocks noGrp="1"/>
+          </p:cNvSpPr>
+          <p:nvPr>
+            <p:ph idx="1"/>
+          </p:nvPr>
+        </p:nvSpPr>
+        <p:spPr/>
+        <p:txBody>
+          <a:bodyPr wrap="square"/>
+          <a:lstStyle/>
+          <a:p/>
+          <a:p>
+            <a:pPr/>
+            <a:r>
+              <a:rPr>
+                <a:solidFill>
+                  <a:srgbClr val="325032"/>
+                </a:solidFill>
+                <a:latin typeface="Georgia"/>
+              </a:rPr>
+              <a:t>宏量营养素平衡：碳水化合物、脂肪与蛋白质的黄金摄入比例。</a:t>
+            </a:r>
+          </a:p>
+          <a:p>
+            <a:pPr/>
+            <a:r>
+              <a:rPr>
+                <a:solidFill>
+                  <a:srgbClr val="325032"/>
+                </a:solidFill>
+                <a:latin typeface="Georgia"/>
+              </a:rPr>
+              <a:t>微量元素的重要性：维生素与矿物质在调节生理功能中的作用。</a:t>
+            </a:r>
+          </a:p>
+          <a:p>
+            <a:pPr/>
+            <a:r>
+              <a:rPr>
+                <a:solidFill>
+                  <a:srgbClr val="325032"/>
+                </a:solidFill>
+                <a:latin typeface="Georgia"/>
+              </a:rPr>
+              <a:t>控糖与低 GI 饮食：维持血糖平稳对疾病预防的长期意义。</a:t>
+            </a:r>
+          </a:p>
+          <a:p>
+            <a:pPr/>
+            <a:r>
+              <a:rPr>
+                <a:solidFill>
+                  <a:srgbClr val="325032"/>
+                </a:solidFill>
+                <a:latin typeface="Georgia"/>
+              </a:rPr>
+              <a:t>水分补充：科学的补水策略对代谢功能的正向影响。</a:t>
+            </a:r>
+          </a:p>
+        </p:txBody>
+      </p:sp>
+    </p:spTree>
+  </p:cSld>
+  <p:clrMapOvr>
+    <a:masterClrMapping/>
+  </p:clrMapOvr>
+</p:sld>
+</file>
+
+<file path=ppt/slides/slide11.xml><?xml version="1.0" encoding="utf-8"?>
+<p:sld xmlns:a="http://schemas.openxmlformats.org/drawingml/2006/main" xmlns:p="http://schemas.openxmlformats.org/presentationml/2006/main" xmlns:r="http://schemas.openxmlformats.org/officeDocument/2006/relationships">
+  <p:cSld>
+    <p:bg>
+      <p:bgPr>
+        <a:solidFill>
+          <a:srgbClr val="F5FFFA"/>
+        </a:solidFill>
+        <a:effectLst/>
+      </p:bgPr>
+    </p:bg>
+    <p:spTree>
+      <p:nvGrpSpPr>
+        <p:cNvPr id="1" name=""/>
+        <p:cNvGrpSpPr/>
+        <p:nvPr/>
+      </p:nvGrpSpPr>
+      <p:grpSpPr/>
+      <p:sp>
+        <p:nvSpPr>
+          <p:cNvPr id="2" name="Title 1"/>
+          <p:cNvSpPr>
+            <a:spLocks noGrp="1"/>
+          </p:cNvSpPr>
+          <p:nvPr>
+            <p:ph type="title"/>
+          </p:nvPr>
+        </p:nvSpPr>
+        <p:spPr/>
+        <p:txBody>
+          <a:bodyPr/>
+          <a:lstStyle/>
+          <a:p>
+            <a:r>
+              <a:rPr>
+                <a:solidFill>
+                  <a:srgbClr val="228B22"/>
+                </a:solidFill>
+                <a:latin typeface="Georgia"/>
+              </a:rPr>
+              <a:t>心理健康与作息规律</a:t>
+            </a:r>
+          </a:p>
+        </p:txBody>
+      </p:sp>
+      <p:sp>
+        <p:nvSpPr>
+          <p:cNvPr id="3" name="Text Placeholder 2"/>
+          <p:cNvSpPr>
+            <a:spLocks noGrp="1"/>
+          </p:cNvSpPr>
+          <p:nvPr>
+            <p:ph type="body" idx="1"/>
+          </p:nvPr>
+        </p:nvSpPr>
+        <p:spPr/>
+        <p:txBody>
+          <a:bodyPr/>
+          <a:lstStyle/>
+          <a:p/>
+        </p:txBody>
+      </p:sp>
+    </p:spTree>
+  </p:cSld>
+  <p:clrMapOvr>
+    <a:masterClrMapping/>
+  </p:clrMapOvr>
+</p:sld>
+</file>
+
+<file path=ppt/slides/slide12.xml><?xml version="1.0" encoding="utf-8"?>
+<p:sld xmlns:a="http://schemas.openxmlformats.org/drawingml/2006/main" xmlns:p="http://schemas.openxmlformats.org/presentationml/2006/main" xmlns:r="http://schemas.openxmlformats.org/officeDocument/2006/relationships">
+  <p:cSld>
+    <p:bg>
+      <p:bgPr>
+        <a:solidFill>
+          <a:srgbClr val="F5FFFA"/>
+        </a:solidFill>
+        <a:effectLst/>
+      </p:bgPr>
+    </p:bg>
+    <p:spTree>
+      <p:nvGrpSpPr>
+        <p:cNvPr id="1" name=""/>
+        <p:cNvGrpSpPr/>
+        <p:nvPr/>
+      </p:nvGrpSpPr>
+      <p:grpSpPr/>
+      <p:sp>
+        <p:nvSpPr>
+          <p:cNvPr id="2" name="Title 1"/>
+          <p:cNvSpPr>
+            <a:spLocks noGrp="1"/>
+          </p:cNvSpPr>
+          <p:nvPr>
+            <p:ph type="title"/>
+          </p:nvPr>
+        </p:nvSpPr>
+        <p:spPr/>
+        <p:txBody>
+          <a:bodyPr/>
+          <a:lstStyle/>
+          <a:p>
+            <a:r>
+              <a:rPr>
+                <a:solidFill>
+                  <a:srgbClr val="228B22"/>
+                </a:solidFill>
+                <a:latin typeface="Georgia"/>
+              </a:rPr>
+              <a:t>睡眠质量与睡眠卫生</a:t>
+            </a:r>
+          </a:p>
+        </p:txBody>
+      </p:sp>
+      <p:sp>
+        <p:nvSpPr>
+          <p:cNvPr id="3" name="Content Placeholder 2"/>
+          <p:cNvSpPr>
+            <a:spLocks noGrp="1"/>
+          </p:cNvSpPr>
+          <p:nvPr>
+            <p:ph idx="1"/>
+          </p:nvPr>
+        </p:nvSpPr>
+        <p:spPr/>
+        <p:txBody>
+          <a:bodyPr wrap="square"/>
+          <a:lstStyle/>
+          <a:p/>
+          <a:p>
+            <a:pPr/>
+            <a:r>
+              <a:rPr>
+                <a:solidFill>
+                  <a:srgbClr val="325032"/>
+                </a:solidFill>
+                <a:latin typeface="Georgia"/>
+              </a:rPr>
+              <a:t>昼夜节律调控：褪黑素分泌与环境光照的科学关系。</a:t>
+            </a:r>
+          </a:p>
+          <a:p>
+            <a:pPr/>
+            <a:r>
+              <a:rPr>
+                <a:solidFill>
+                  <a:srgbClr val="325032"/>
+                </a:solidFill>
+                <a:latin typeface="Georgia"/>
+              </a:rPr>
+              <a:t>深度睡眠的修复作用：大脑清理代谢废物（类淋巴系统）的关键期。</a:t>
+            </a:r>
+          </a:p>
+          <a:p>
+            <a:pPr/>
+            <a:r>
+              <a:rPr>
+                <a:solidFill>
+                  <a:srgbClr val="325032"/>
+                </a:solidFill>
+                <a:latin typeface="Georgia"/>
+              </a:rPr>
+              <a:t>数字化环境下的睡眠挑战：缓解屏幕蓝光对入睡干扰的建议。</a:t>
+            </a:r>
+          </a:p>
+          <a:p>
+            <a:pPr/>
+            <a:r>
+              <a:rPr>
+                <a:solidFill>
+                  <a:srgbClr val="325032"/>
+                </a:solidFill>
+                <a:latin typeface="Georgia"/>
+              </a:rPr>
+              <a:t>合理的运动干预：有氧运动对改善长期睡眠结构的积极效用。</a:t>
+            </a:r>
+          </a:p>
+        </p:txBody>
+      </p:sp>
+    </p:spTree>
+  </p:cSld>
+  <p:clrMapOvr>
+    <a:masterClrMapping/>
+  </p:clrMapOvr>
+</p:sld>
+</file>
+
+<file path=ppt/slides/slide13.xml><?xml version="1.0" encoding="utf-8"?>
+<p:sld xmlns:a="http://schemas.openxmlformats.org/drawingml/2006/main" xmlns:p="http://schemas.openxmlformats.org/presentationml/2006/main" xmlns:r="http://schemas.openxmlformats.org/officeDocument/2006/relationships">
+  <p:cSld>
+    <p:spTree>
+      <p:nvGrpSpPr>
+        <p:cNvPr id="1" name=""/>
+        <p:cNvGrpSpPr/>
+        <p:nvPr/>
+      </p:nvGrpSpPr>
+      <p:grpSpPr/>
+      <p:sp>
+        <p:nvSpPr>
+          <p:cNvPr id="2" name="Title 1"/>
+          <p:cNvSpPr>
+            <a:spLocks noGrp="1"/>
+          </p:cNvSpPr>
+          <p:nvPr>
+            <p:ph type="title"/>
+          </p:nvPr>
+        </p:nvSpPr>
+        <p:spPr/>
+        <p:txBody>
+          <a:bodyPr/>
+          <a:lstStyle/>
+          <a:p>
+            <a:r>
+              <a:t>References</a:t>
+            </a:r>
+          </a:p>
+        </p:txBody>
+      </p:sp>
+      <p:sp>
+        <p:nvSpPr>
+          <p:cNvPr id="3" name="Content Placeholder 2"/>
+          <p:cNvSpPr>
+            <a:spLocks noGrp="1"/>
+          </p:cNvSpPr>
+          <p:nvPr>
+            <p:ph idx="1"/>
+          </p:nvPr>
+        </p:nvSpPr>
+        <p:spPr/>
+        <p:txBody>
+          <a:bodyPr/>
+          <a:lstStyle/>
+          <a:p/>
+          <a:p>
+            <a:pPr>
+              <a:defRPr sz="1200"/>
+            </a:pPr>
+            <a:r>
+              <a:t>https://www.nature.com/</a:t>
+            </a:r>
+          </a:p>
+          <a:p>
+            <a:pPr>
+              <a:defRPr sz="1200"/>
+            </a:pPr>
+            <a:r>
+              <a:t>https://arxiv.org/</a:t>
+            </a:r>
+          </a:p>
+          <a:p>
+            <a:pPr>
+              <a:defRPr sz="1200"/>
+            </a:pPr>
+            <a:r>
+              <a:t>https://www.metmuseum.org/</a:t>
+            </a:r>
+          </a:p>
+        </p:txBody>
+      </p:sp>
+    </p:spTree>
+  </p:cSld>
+  <p:clrMapOvr>
+    <a:masterClrMapping/>
+  </p:clrMapOvr>
+</p:sld>
+</file>
+
+<file path=ppt/slides/slide14.xml><?xml version="1.0" encoding="utf-8"?>
 <p:sld xmlns:a="http://schemas.openxmlformats.org/drawingml/2006/main" xmlns:p="http://schemas.openxmlformats.org/presentationml/2006/main" xmlns:r="http://schemas.openxmlformats.org/officeDocument/2006/relationships">
   <p:cSld>
     <p:bg>
@@ -3193,7 +4427,7 @@
             <a:spLocks noGrp="1"/>
           </p:cNvSpPr>
           <p:nvPr>
-            <p:ph type="title"/>
+            <p:ph type="ctrTitle"/>
           </p:nvPr>
         </p:nvSpPr>
         <p:spPr/>
@@ -3208,28 +4442,26 @@
                 </a:solidFill>
                 <a:latin typeface="Verdana"/>
               </a:rPr>
-              <a:t>Overview of Current Topic</a:t>
-            </a:r>
-          </a:p>
-        </p:txBody>
-      </p:sp>
-      <p:sp>
-        <p:nvSpPr>
-          <p:cNvPr id="3" name="Content Placeholder 2"/>
-          <p:cNvSpPr>
-            <a:spLocks noGrp="1"/>
-          </p:cNvSpPr>
-          <p:nvPr>
-            <p:ph idx="1"/>
-          </p:nvPr>
-        </p:nvSpPr>
-        <p:spPr/>
-        <p:txBody>
-          <a:bodyPr wrap="square"/>
-          <a:lstStyle/>
-          <a:p/>
-          <a:p>
-            <a:pPr/>
+              <a:t>人类文明的曙光：文艺复兴艺术</a:t>
+            </a:r>
+          </a:p>
+        </p:txBody>
+      </p:sp>
+      <p:sp>
+        <p:nvSpPr>
+          <p:cNvPr id="3" name="Subtitle 2"/>
+          <p:cNvSpPr>
+            <a:spLocks noGrp="1"/>
+          </p:cNvSpPr>
+          <p:nvPr>
+            <p:ph type="subTitle" idx="1"/>
+          </p:nvPr>
+        </p:nvSpPr>
+        <p:spPr/>
+        <p:txBody>
+          <a:bodyPr/>
+          <a:lstStyle/>
+          <a:p>
             <a:r>
               <a:rPr>
                 <a:solidFill>
@@ -3237,31 +4469,7 @@
                 </a:solidFill>
                 <a:latin typeface="Verdana"/>
               </a:rPr>
-              <a:t>Key innovation and strategic importance of Current Topic</a:t>
-            </a:r>
-          </a:p>
-          <a:p>
-            <a:pPr/>
-            <a:r>
-              <a:rPr>
-                <a:solidFill>
-                  <a:srgbClr val="3C283C"/>
-                </a:solidFill>
-                <a:latin typeface="Verdana"/>
-              </a:rPr>
-              <a:t>Global impact and future trends in Current Topic</a:t>
-            </a:r>
-          </a:p>
-          <a:p>
-            <a:pPr/>
-            <a:r>
-              <a:rPr>
-                <a:solidFill>
-                  <a:srgbClr val="3C283C"/>
-                </a:solidFill>
-                <a:latin typeface="Verdana"/>
-              </a:rPr>
-              <a:t>Practical applications and case studies of Current Topic</a:t>
+              <a:t>Topic: 文艺复兴艺术赏析</a:t>
             </a:r>
           </a:p>
         </p:txBody>
@@ -3274,87 +4482,7 @@
 </p:sld>
 </file>
 
-<file path=ppt/slides/slide11.xml><?xml version="1.0" encoding="utf-8"?>
-<p:sld xmlns:a="http://schemas.openxmlformats.org/drawingml/2006/main" xmlns:p="http://schemas.openxmlformats.org/presentationml/2006/main" xmlns:r="http://schemas.openxmlformats.org/officeDocument/2006/relationships">
-  <p:cSld>
-    <p:spTree>
-      <p:nvGrpSpPr>
-        <p:cNvPr id="1" name=""/>
-        <p:cNvGrpSpPr/>
-        <p:nvPr/>
-      </p:nvGrpSpPr>
-      <p:grpSpPr/>
-      <p:sp>
-        <p:nvSpPr>
-          <p:cNvPr id="2" name="Title 1"/>
-          <p:cNvSpPr>
-            <a:spLocks noGrp="1"/>
-          </p:cNvSpPr>
-          <p:nvPr>
-            <p:ph type="title"/>
-          </p:nvPr>
-        </p:nvSpPr>
-        <p:spPr/>
-        <p:txBody>
-          <a:bodyPr/>
-          <a:lstStyle/>
-          <a:p>
-            <a:r>
-              <a:t>References</a:t>
-            </a:r>
-          </a:p>
-        </p:txBody>
-      </p:sp>
-      <p:sp>
-        <p:nvSpPr>
-          <p:cNvPr id="3" name="Content Placeholder 2"/>
-          <p:cNvSpPr>
-            <a:spLocks noGrp="1"/>
-          </p:cNvSpPr>
-          <p:nvPr>
-            <p:ph idx="1"/>
-          </p:nvPr>
-        </p:nvSpPr>
-        <p:spPr/>
-        <p:txBody>
-          <a:bodyPr/>
-          <a:lstStyle/>
-          <a:p/>
-          <a:p>
-            <a:pPr>
-              <a:defRPr sz="1200"/>
-            </a:pPr>
-            <a:r>
-              <a:t>Global impact and future trends in Current Topic</a:t>
-            </a:r>
-          </a:p>
-          <a:p>
-            <a:pPr>
-              <a:defRPr sz="1200"/>
-            </a:pPr>
-            <a:r>
-              <a:t>Practical applications and case studies of Current Topic</a:t>
-            </a:r>
-          </a:p>
-          <a:p>
-            <a:pPr>
-              <a:defRPr sz="1200"/>
-            </a:pPr>
-            <a:r>
-              <a:t>Key innovation and strategic importance of Current Topic</a:t>
-            </a:r>
-          </a:p>
-        </p:txBody>
-      </p:sp>
-    </p:spTree>
-  </p:cSld>
-  <p:clrMapOvr>
-    <a:masterClrMapping/>
-  </p:clrMapOvr>
-</p:sld>
-</file>
-
-<file path=ppt/slides/slide2.xml><?xml version="1.0" encoding="utf-8"?>
+<file path=ppt/slides/slide15.xml><?xml version="1.0" encoding="utf-8"?>
 <p:sld xmlns:a="http://schemas.openxmlformats.org/drawingml/2006/main" xmlns:p="http://schemas.openxmlformats.org/presentationml/2006/main" xmlns:r="http://schemas.openxmlformats.org/officeDocument/2006/relationships">
   <p:cSld>
     <p:bg>
@@ -3394,7 +4522,7 @@
                 </a:solidFill>
                 <a:latin typeface="Verdana"/>
               </a:rPr>
-              <a:t>Fundamentals of Current Topic</a:t>
+              <a:t>文艺复兴初期的变革</a:t>
             </a:r>
           </a:p>
         </p:txBody>
@@ -3424,7 +4552,7 @@
 </p:sld>
 </file>
 
-<file path=ppt/slides/slide3.xml><?xml version="1.0" encoding="utf-8"?>
+<file path=ppt/slides/slide16.xml><?xml version="1.0" encoding="utf-8"?>
 <p:sld xmlns:a="http://schemas.openxmlformats.org/drawingml/2006/main" xmlns:p="http://schemas.openxmlformats.org/presentationml/2006/main" xmlns:r="http://schemas.openxmlformats.org/officeDocument/2006/relationships">
   <p:cSld>
     <p:bg>
@@ -3464,7 +4592,7 @@
                 </a:solidFill>
                 <a:latin typeface="Verdana"/>
               </a:rPr>
-              <a:t>Overview of Current Topic</a:t>
+              <a:t>人文主义精神的崛起</a:t>
             </a:r>
           </a:p>
         </p:txBody>
@@ -3493,7 +4621,7 @@
                 </a:solidFill>
                 <a:latin typeface="Verdana"/>
               </a:rPr>
-              <a:t>Key innovation and strategic importance of Current Topic</a:t>
+              <a:t>从神本主义向人本主义的转向：关注现世生活与个人价值。</a:t>
             </a:r>
           </a:p>
           <a:p>
@@ -3505,7 +4633,7 @@
                 </a:solidFill>
                 <a:latin typeface="Verdana"/>
               </a:rPr>
-              <a:t>Global impact and future trends in Current Topic</a:t>
+              <a:t>解剖学与透视法的应用：绘画艺术追求极致的科学写实性。</a:t>
             </a:r>
           </a:p>
           <a:p>
@@ -3517,7 +4645,19 @@
                 </a:solidFill>
                 <a:latin typeface="Verdana"/>
               </a:rPr>
-              <a:t>Practical applications and case studies of Current Topic</a:t>
+              <a:t>佛罗伦萨：作为欧洲艺术中心的地位及其赞助人（美第奇家族）。</a:t>
+            </a:r>
+          </a:p>
+          <a:p>
+            <a:pPr/>
+            <a:r>
+              <a:rPr>
+                <a:solidFill>
+                  <a:srgbClr val="3C283C"/>
+                </a:solidFill>
+                <a:latin typeface="Verdana"/>
+              </a:rPr>
+              <a:t>乔托的突破：在二维平面上营造三维空间感的先驱探索。</a:t>
             </a:r>
           </a:p>
         </p:txBody>
@@ -3530,7 +4670,7 @@
 </p:sld>
 </file>
 
-<file path=ppt/slides/slide4.xml><?xml version="1.0" encoding="utf-8"?>
+<file path=ppt/slides/slide17.xml><?xml version="1.0" encoding="utf-8"?>
 <p:sld xmlns:a="http://schemas.openxmlformats.org/drawingml/2006/main" xmlns:p="http://schemas.openxmlformats.org/presentationml/2006/main" xmlns:r="http://schemas.openxmlformats.org/officeDocument/2006/relationships">
   <p:cSld>
     <p:bg>
@@ -3570,62 +4710,26 @@
                 </a:solidFill>
                 <a:latin typeface="Verdana"/>
               </a:rPr>
-              <a:t>Overview of Current Topic</a:t>
-            </a:r>
-          </a:p>
-        </p:txBody>
-      </p:sp>
-      <p:sp>
-        <p:nvSpPr>
-          <p:cNvPr id="3" name="Content Placeholder 2"/>
-          <p:cNvSpPr>
-            <a:spLocks noGrp="1"/>
-          </p:cNvSpPr>
-          <p:nvPr>
-            <p:ph idx="1"/>
-          </p:nvPr>
-        </p:nvSpPr>
-        <p:spPr/>
-        <p:txBody>
-          <a:bodyPr wrap="square"/>
+              <a:t>三杰鼎立的黄金盛世</a:t>
+            </a:r>
+          </a:p>
+        </p:txBody>
+      </p:sp>
+      <p:sp>
+        <p:nvSpPr>
+          <p:cNvPr id="3" name="Text Placeholder 2"/>
+          <p:cNvSpPr>
+            <a:spLocks noGrp="1"/>
+          </p:cNvSpPr>
+          <p:nvPr>
+            <p:ph type="body" idx="1"/>
+          </p:nvPr>
+        </p:nvSpPr>
+        <p:spPr/>
+        <p:txBody>
+          <a:bodyPr/>
           <a:lstStyle/>
           <a:p/>
-          <a:p>
-            <a:pPr/>
-            <a:r>
-              <a:rPr>
-                <a:solidFill>
-                  <a:srgbClr val="3C283C"/>
-                </a:solidFill>
-                <a:latin typeface="Verdana"/>
-              </a:rPr>
-              <a:t>Key innovation and strategic importance of Current Topic</a:t>
-            </a:r>
-          </a:p>
-          <a:p>
-            <a:pPr/>
-            <a:r>
-              <a:rPr>
-                <a:solidFill>
-                  <a:srgbClr val="3C283C"/>
-                </a:solidFill>
-                <a:latin typeface="Verdana"/>
-              </a:rPr>
-              <a:t>Global impact and future trends in Current Topic</a:t>
-            </a:r>
-          </a:p>
-          <a:p>
-            <a:pPr/>
-            <a:r>
-              <a:rPr>
-                <a:solidFill>
-                  <a:srgbClr val="3C283C"/>
-                </a:solidFill>
-                <a:latin typeface="Verdana"/>
-              </a:rPr>
-              <a:t>Practical applications and case studies of Current Topic</a:t>
-            </a:r>
-          </a:p>
         </p:txBody>
       </p:sp>
     </p:spTree>
@@ -3636,7 +4740,7 @@
 </p:sld>
 </file>
 
-<file path=ppt/slides/slide5.xml><?xml version="1.0" encoding="utf-8"?>
+<file path=ppt/slides/slide18.xml><?xml version="1.0" encoding="utf-8"?>
 <p:sld xmlns:a="http://schemas.openxmlformats.org/drawingml/2006/main" xmlns:p="http://schemas.openxmlformats.org/presentationml/2006/main" xmlns:r="http://schemas.openxmlformats.org/officeDocument/2006/relationships">
   <p:cSld>
     <p:bg>
@@ -3676,7 +4780,511 @@
                 </a:solidFill>
                 <a:latin typeface="Verdana"/>
               </a:rPr>
-              <a:t>Advanced Applications: Current Topic</a:t>
+              <a:t>达芬奇：科学与艺术的跨界化身</a:t>
+            </a:r>
+          </a:p>
+        </p:txBody>
+      </p:sp>
+      <p:sp>
+        <p:nvSpPr>
+          <p:cNvPr id="3" name="Content Placeholder 2"/>
+          <p:cNvSpPr>
+            <a:spLocks noGrp="1"/>
+          </p:cNvSpPr>
+          <p:nvPr>
+            <p:ph idx="1"/>
+          </p:nvPr>
+        </p:nvSpPr>
+        <p:spPr/>
+        <p:txBody>
+          <a:bodyPr wrap="square"/>
+          <a:lstStyle/>
+          <a:p/>
+          <a:p>
+            <a:pPr/>
+            <a:r>
+              <a:rPr>
+                <a:solidFill>
+                  <a:srgbClr val="3C283C"/>
+                </a:solidFill>
+                <a:latin typeface="Verdana"/>
+              </a:rPr>
+              <a:t>《蒙娜丽莎》：晕涂法（Sfumato）对人物表情与氛围的塑造。</a:t>
+            </a:r>
+          </a:p>
+          <a:p>
+            <a:pPr/>
+            <a:r>
+              <a:rPr>
+                <a:solidFill>
+                  <a:srgbClr val="3C283C"/>
+                </a:solidFill>
+                <a:latin typeface="Verdana"/>
+              </a:rPr>
+              <a:t>《最后的晚餐》：严谨的线性透视法则与深刻的心理描写。</a:t>
+            </a:r>
+          </a:p>
+          <a:p>
+            <a:pPr/>
+            <a:r>
+              <a:rPr>
+                <a:solidFill>
+                  <a:srgbClr val="3C283C"/>
+                </a:solidFill>
+                <a:latin typeface="Verdana"/>
+              </a:rPr>
+              <a:t>解剖研究：达芬奇在手稿中体现出的艺术与生物学的深度融合。</a:t>
+            </a:r>
+          </a:p>
+          <a:p>
+            <a:pPr/>
+            <a:r>
+              <a:rPr>
+                <a:solidFill>
+                  <a:srgbClr val="3C283C"/>
+                </a:solidFill>
+                <a:latin typeface="Verdana"/>
+              </a:rPr>
+              <a:t>自然观察者的视角：将自然科学严谨性引入绘画构图的典范。</a:t>
+            </a:r>
+          </a:p>
+        </p:txBody>
+      </p:sp>
+    </p:spTree>
+  </p:cSld>
+  <p:clrMapOvr>
+    <a:masterClrMapping/>
+  </p:clrMapOvr>
+</p:sld>
+</file>
+
+<file path=ppt/slides/slide19.xml><?xml version="1.0" encoding="utf-8"?>
+<p:sld xmlns:a="http://schemas.openxmlformats.org/drawingml/2006/main" xmlns:p="http://schemas.openxmlformats.org/presentationml/2006/main" xmlns:r="http://schemas.openxmlformats.org/officeDocument/2006/relationships">
+  <p:cSld>
+    <p:spTree>
+      <p:nvGrpSpPr>
+        <p:cNvPr id="1" name=""/>
+        <p:cNvGrpSpPr/>
+        <p:nvPr/>
+      </p:nvGrpSpPr>
+      <p:grpSpPr/>
+      <p:sp>
+        <p:nvSpPr>
+          <p:cNvPr id="2" name="Title 1"/>
+          <p:cNvSpPr>
+            <a:spLocks noGrp="1"/>
+          </p:cNvSpPr>
+          <p:nvPr>
+            <p:ph type="title"/>
+          </p:nvPr>
+        </p:nvSpPr>
+        <p:spPr/>
+        <p:txBody>
+          <a:bodyPr/>
+          <a:lstStyle/>
+          <a:p>
+            <a:r>
+              <a:t>References</a:t>
+            </a:r>
+          </a:p>
+        </p:txBody>
+      </p:sp>
+      <p:sp>
+        <p:nvSpPr>
+          <p:cNvPr id="3" name="Content Placeholder 2"/>
+          <p:cNvSpPr>
+            <a:spLocks noGrp="1"/>
+          </p:cNvSpPr>
+          <p:nvPr>
+            <p:ph idx="1"/>
+          </p:nvPr>
+        </p:nvSpPr>
+        <p:spPr/>
+        <p:txBody>
+          <a:bodyPr/>
+          <a:lstStyle/>
+          <a:p/>
+          <a:p>
+            <a:pPr>
+              <a:defRPr sz="1200"/>
+            </a:pPr>
+            <a:r>
+              <a:t>https://www.nature.com/</a:t>
+            </a:r>
+          </a:p>
+          <a:p>
+            <a:pPr>
+              <a:defRPr sz="1200"/>
+            </a:pPr>
+            <a:r>
+              <a:t>https://arxiv.org/</a:t>
+            </a:r>
+          </a:p>
+          <a:p>
+            <a:pPr>
+              <a:defRPr sz="1200"/>
+            </a:pPr>
+            <a:r>
+              <a:t>https://www.metmuseum.org/</a:t>
+            </a:r>
+          </a:p>
+        </p:txBody>
+      </p:sp>
+    </p:spTree>
+  </p:cSld>
+  <p:clrMapOvr>
+    <a:masterClrMapping/>
+  </p:clrMapOvr>
+</p:sld>
+</file>
+
+<file path=ppt/slides/slide2.xml><?xml version="1.0" encoding="utf-8"?>
+<p:sld xmlns:a="http://schemas.openxmlformats.org/drawingml/2006/main" xmlns:p="http://schemas.openxmlformats.org/presentationml/2006/main" xmlns:r="http://schemas.openxmlformats.org/officeDocument/2006/relationships">
+  <p:cSld>
+    <p:bg>
+      <p:bgPr>
+        <a:solidFill>
+          <a:srgbClr val="0A0A28"/>
+        </a:solidFill>
+        <a:effectLst/>
+      </p:bgPr>
+    </p:bg>
+    <p:spTree>
+      <p:nvGrpSpPr>
+        <p:cNvPr id="1" name=""/>
+        <p:cNvGrpSpPr/>
+        <p:nvPr/>
+      </p:nvGrpSpPr>
+      <p:grpSpPr/>
+      <p:sp>
+        <p:nvSpPr>
+          <p:cNvPr id="2" name="Title 1"/>
+          <p:cNvSpPr>
+            <a:spLocks noGrp="1"/>
+          </p:cNvSpPr>
+          <p:nvPr>
+            <p:ph type="title"/>
+          </p:nvPr>
+        </p:nvSpPr>
+        <p:spPr/>
+        <p:txBody>
+          <a:bodyPr/>
+          <a:lstStyle/>
+          <a:p>
+            <a:r>
+              <a:rPr>
+                <a:solidFill>
+                  <a:srgbClr val="0066CC"/>
+                </a:solidFill>
+                <a:latin typeface="Arial"/>
+              </a:rPr>
+              <a:t>AI 核心技术与里程碑</a:t>
+            </a:r>
+          </a:p>
+        </p:txBody>
+      </p:sp>
+      <p:sp>
+        <p:nvSpPr>
+          <p:cNvPr id="3" name="Text Placeholder 2"/>
+          <p:cNvSpPr>
+            <a:spLocks noGrp="1"/>
+          </p:cNvSpPr>
+          <p:nvPr>
+            <p:ph type="body" idx="1"/>
+          </p:nvPr>
+        </p:nvSpPr>
+        <p:spPr/>
+        <p:txBody>
+          <a:bodyPr/>
+          <a:lstStyle/>
+          <a:p/>
+        </p:txBody>
+      </p:sp>
+    </p:spTree>
+  </p:cSld>
+  <p:clrMapOvr>
+    <a:masterClrMapping/>
+  </p:clrMapOvr>
+</p:sld>
+</file>
+
+<file path=ppt/slides/slide3.xml><?xml version="1.0" encoding="utf-8"?>
+<p:sld xmlns:a="http://schemas.openxmlformats.org/drawingml/2006/main" xmlns:p="http://schemas.openxmlformats.org/presentationml/2006/main" xmlns:r="http://schemas.openxmlformats.org/officeDocument/2006/relationships">
+  <p:cSld>
+    <p:bg>
+      <p:bgPr>
+        <a:solidFill>
+          <a:srgbClr val="0A0A28"/>
+        </a:solidFill>
+        <a:effectLst/>
+      </p:bgPr>
+    </p:bg>
+    <p:spTree>
+      <p:nvGrpSpPr>
+        <p:cNvPr id="1" name=""/>
+        <p:cNvGrpSpPr/>
+        <p:nvPr/>
+      </p:nvGrpSpPr>
+      <p:grpSpPr/>
+      <p:sp>
+        <p:nvSpPr>
+          <p:cNvPr id="2" name="Title 1"/>
+          <p:cNvSpPr>
+            <a:spLocks noGrp="1"/>
+          </p:cNvSpPr>
+          <p:nvPr>
+            <p:ph type="title"/>
+          </p:nvPr>
+        </p:nvSpPr>
+        <p:spPr/>
+        <p:txBody>
+          <a:bodyPr/>
+          <a:lstStyle/>
+          <a:p>
+            <a:r>
+              <a:rPr>
+                <a:solidFill>
+                  <a:srgbClr val="0066CC"/>
+                </a:solidFill>
+                <a:latin typeface="Arial"/>
+              </a:rPr>
+              <a:t>从图灵测试到深度学习</a:t>
+            </a:r>
+          </a:p>
+        </p:txBody>
+      </p:sp>
+      <p:sp>
+        <p:nvSpPr>
+          <p:cNvPr id="3" name="Content Placeholder 2"/>
+          <p:cNvSpPr>
+            <a:spLocks noGrp="1"/>
+          </p:cNvSpPr>
+          <p:nvPr>
+            <p:ph idx="1"/>
+          </p:nvPr>
+        </p:nvSpPr>
+        <p:spPr/>
+        <p:txBody>
+          <a:bodyPr wrap="square"/>
+          <a:lstStyle/>
+          <a:p/>
+          <a:p>
+            <a:pPr/>
+            <a:r>
+              <a:rPr>
+                <a:solidFill>
+                  <a:srgbClr val="C8C8FF"/>
+                </a:solidFill>
+                <a:latin typeface="Arial"/>
+              </a:rPr>
+              <a:t>1950年图灵提出图灵测试，奠定了机器智能的哲学基础。</a:t>
+            </a:r>
+          </a:p>
+          <a:p>
+            <a:pPr/>
+            <a:r>
+              <a:rPr>
+                <a:solidFill>
+                  <a:srgbClr val="C8C8FF"/>
+                </a:solidFill>
+                <a:latin typeface="Arial"/>
+              </a:rPr>
+              <a:t>2012年 AlexNet 在 ImageNet 竞赛中夺冠，开启深度学习革命。</a:t>
+            </a:r>
+          </a:p>
+          <a:p>
+            <a:pPr/>
+            <a:r>
+              <a:rPr>
+                <a:solidFill>
+                  <a:srgbClr val="C8C8FF"/>
+                </a:solidFill>
+                <a:latin typeface="Arial"/>
+              </a:rPr>
+              <a:t>大模型时代：从 GPT-3 到 Gemini，参数规模实现指数级增长。</a:t>
+            </a:r>
+          </a:p>
+          <a:p>
+            <a:pPr/>
+            <a:r>
+              <a:rPr>
+                <a:solidFill>
+                  <a:srgbClr val="C8C8FF"/>
+                </a:solidFill>
+                <a:latin typeface="Arial"/>
+              </a:rPr>
+              <a:t>多模态融合成为主流，架构趋向于统一的注意力机制模型。</a:t>
+            </a:r>
+          </a:p>
+        </p:txBody>
+      </p:sp>
+    </p:spTree>
+  </p:cSld>
+  <p:clrMapOvr>
+    <a:masterClrMapping/>
+  </p:clrMapOvr>
+</p:sld>
+</file>
+
+<file path=ppt/slides/slide4.xml><?xml version="1.0" encoding="utf-8"?>
+<p:sld xmlns:a="http://schemas.openxmlformats.org/drawingml/2006/main" xmlns:p="http://schemas.openxmlformats.org/presentationml/2006/main" xmlns:r="http://schemas.openxmlformats.org/officeDocument/2006/relationships">
+  <p:cSld>
+    <p:bg>
+      <p:bgPr>
+        <a:solidFill>
+          <a:srgbClr val="0A0A28"/>
+        </a:solidFill>
+        <a:effectLst/>
+      </p:bgPr>
+    </p:bg>
+    <p:spTree>
+      <p:nvGrpSpPr>
+        <p:cNvPr id="1" name=""/>
+        <p:cNvGrpSpPr/>
+        <p:nvPr/>
+      </p:nvGrpSpPr>
+      <p:grpSpPr/>
+      <p:sp>
+        <p:nvSpPr>
+          <p:cNvPr id="2" name="Title 1"/>
+          <p:cNvSpPr>
+            <a:spLocks noGrp="1"/>
+          </p:cNvSpPr>
+          <p:nvPr>
+            <p:ph type="title"/>
+          </p:nvPr>
+        </p:nvSpPr>
+        <p:spPr/>
+        <p:txBody>
+          <a:bodyPr/>
+          <a:lstStyle/>
+          <a:p>
+            <a:r>
+              <a:rPr>
+                <a:solidFill>
+                  <a:srgbClr val="0066CC"/>
+                </a:solidFill>
+                <a:latin typeface="Arial"/>
+              </a:rPr>
+              <a:t>生成式 AI 的技术底座</a:t>
+            </a:r>
+          </a:p>
+        </p:txBody>
+      </p:sp>
+      <p:sp>
+        <p:nvSpPr>
+          <p:cNvPr id="3" name="Content Placeholder 2"/>
+          <p:cNvSpPr>
+            <a:spLocks noGrp="1"/>
+          </p:cNvSpPr>
+          <p:nvPr>
+            <p:ph idx="1"/>
+          </p:nvPr>
+        </p:nvSpPr>
+        <p:spPr/>
+        <p:txBody>
+          <a:bodyPr wrap="square"/>
+          <a:lstStyle/>
+          <a:p/>
+          <a:p>
+            <a:pPr/>
+            <a:r>
+              <a:rPr>
+                <a:solidFill>
+                  <a:srgbClr val="C8C8FF"/>
+                </a:solidFill>
+                <a:latin typeface="Arial"/>
+              </a:rPr>
+              <a:t>Transformer 架构：自注意力机制（Self-Attention）彻底改变了序列建模。</a:t>
+            </a:r>
+          </a:p>
+          <a:p>
+            <a:pPr/>
+            <a:r>
+              <a:rPr>
+                <a:solidFill>
+                  <a:srgbClr val="C8C8FF"/>
+                </a:solidFill>
+                <a:latin typeface="Arial"/>
+              </a:rPr>
+              <a:t>扩散模型（Diffusion Models）：在图像生成与物理模拟领域占据核心地位。</a:t>
+            </a:r>
+          </a:p>
+          <a:p>
+            <a:pPr/>
+            <a:r>
+              <a:rPr>
+                <a:solidFill>
+                  <a:srgbClr val="C8C8FF"/>
+                </a:solidFill>
+                <a:latin typeface="Arial"/>
+              </a:rPr>
+              <a:t>算力与数据：高性能 GPU 集群与高质量标注数据构筑的核心护城河。</a:t>
+            </a:r>
+          </a:p>
+          <a:p>
+            <a:pPr/>
+            <a:r>
+              <a:rPr>
+                <a:solidFill>
+                  <a:srgbClr val="C8C8FF"/>
+                </a:solidFill>
+                <a:latin typeface="Arial"/>
+              </a:rPr>
+              <a:t>RLHF：通过人类反馈的强化学习极大提升了模型的一致性与安全性。</a:t>
+            </a:r>
+          </a:p>
+        </p:txBody>
+      </p:sp>
+    </p:spTree>
+  </p:cSld>
+  <p:clrMapOvr>
+    <a:masterClrMapping/>
+  </p:clrMapOvr>
+</p:sld>
+</file>
+
+<file path=ppt/slides/slide5.xml><?xml version="1.0" encoding="utf-8"?>
+<p:sld xmlns:a="http://schemas.openxmlformats.org/drawingml/2006/main" xmlns:p="http://schemas.openxmlformats.org/presentationml/2006/main" xmlns:r="http://schemas.openxmlformats.org/officeDocument/2006/relationships">
+  <p:cSld>
+    <p:bg>
+      <p:bgPr>
+        <a:solidFill>
+          <a:srgbClr val="0A0A28"/>
+        </a:solidFill>
+        <a:effectLst/>
+      </p:bgPr>
+    </p:bg>
+    <p:spTree>
+      <p:nvGrpSpPr>
+        <p:cNvPr id="1" name=""/>
+        <p:cNvGrpSpPr/>
+        <p:nvPr/>
+      </p:nvGrpSpPr>
+      <p:grpSpPr/>
+      <p:sp>
+        <p:nvSpPr>
+          <p:cNvPr id="2" name="Title 1"/>
+          <p:cNvSpPr>
+            <a:spLocks noGrp="1"/>
+          </p:cNvSpPr>
+          <p:nvPr>
+            <p:ph type="title"/>
+          </p:nvPr>
+        </p:nvSpPr>
+        <p:spPr/>
+        <p:txBody>
+          <a:bodyPr/>
+          <a:lstStyle/>
+          <a:p>
+            <a:r>
+              <a:rPr>
+                <a:solidFill>
+                  <a:srgbClr val="0066CC"/>
+                </a:solidFill>
+                <a:latin typeface="Arial"/>
+              </a:rPr>
+              <a:t>产业影响与未来展望</a:t>
             </a:r>
           </a:p>
         </p:txBody>
@@ -3712,7 +5320,7 @@
     <p:bg>
       <p:bgPr>
         <a:solidFill>
-          <a:srgbClr val="FFFAF0"/>
+          <a:srgbClr val="0A0A28"/>
         </a:solidFill>
         <a:effectLst/>
       </p:bgPr>
@@ -3742,11 +5350,11 @@
             <a:r>
               <a:rPr>
                 <a:solidFill>
-                  <a:srgbClr val="C83296"/>
-                </a:solidFill>
-                <a:latin typeface="Verdana"/>
+                  <a:srgbClr val="0066CC"/>
+                </a:solidFill>
+                <a:latin typeface="Arial"/>
               </a:rPr>
-              <a:t>Overview of Current Topic</a:t>
+              <a:t>AI 赋能行业转型</a:t>
             </a:r>
           </a:p>
         </p:txBody>
@@ -3771,11 +5379,11 @@
             <a:r>
               <a:rPr>
                 <a:solidFill>
-                  <a:srgbClr val="3C283C"/>
-                </a:solidFill>
-                <a:latin typeface="Verdana"/>
+                  <a:srgbClr val="C8C8FF"/>
+                </a:solidFill>
+                <a:latin typeface="Arial"/>
               </a:rPr>
-              <a:t>Key innovation and strategic importance of Current Topic</a:t>
+              <a:t>金融领域：利用大模型进行实时风险评估与个性化理财顾问。</a:t>
             </a:r>
           </a:p>
           <a:p>
@@ -3783,11 +5391,11 @@
             <a:r>
               <a:rPr>
                 <a:solidFill>
-                  <a:srgbClr val="3C283C"/>
-                </a:solidFill>
-                <a:latin typeface="Verdana"/>
+                  <a:srgbClr val="C8C8FF"/>
+                </a:solidFill>
+                <a:latin typeface="Arial"/>
               </a:rPr>
-              <a:t>Global impact and future trends in Current Topic</a:t>
+              <a:t>医疗健康：AI 辅助药物发现与蛋白质结构预测（AlphaFold）。</a:t>
             </a:r>
           </a:p>
           <a:p>
@@ -3795,11 +5403,23 @@
             <a:r>
               <a:rPr>
                 <a:solidFill>
-                  <a:srgbClr val="3C283C"/>
-                </a:solidFill>
-                <a:latin typeface="Verdana"/>
+                  <a:srgbClr val="C8C8FF"/>
+                </a:solidFill>
+                <a:latin typeface="Arial"/>
               </a:rPr>
-              <a:t>Practical applications and case studies of Current Topic</a:t>
+              <a:t>智能制造：端到端自动驾驶与具身智能（Embodied AI）机器人。</a:t>
+            </a:r>
+          </a:p>
+          <a:p>
+            <a:pPr/>
+            <a:r>
+              <a:rPr>
+                <a:solidFill>
+                  <a:srgbClr val="C8C8FF"/>
+                </a:solidFill>
+                <a:latin typeface="Arial"/>
+              </a:rPr>
+              <a:t>文化创意：跨模态创作极大地降低了艺术与编程的入门门槛。</a:t>
             </a:r>
           </a:p>
         </p:txBody>
@@ -3815,14 +5435,6 @@
 <file path=ppt/slides/slide7.xml><?xml version="1.0" encoding="utf-8"?>
 <p:sld xmlns:a="http://schemas.openxmlformats.org/drawingml/2006/main" xmlns:p="http://schemas.openxmlformats.org/presentationml/2006/main" xmlns:r="http://schemas.openxmlformats.org/officeDocument/2006/relationships">
   <p:cSld>
-    <p:bg>
-      <p:bgPr>
-        <a:solidFill>
-          <a:srgbClr val="FFFAF0"/>
-        </a:solidFill>
-        <a:effectLst/>
-      </p:bgPr>
-    </p:bg>
     <p:spTree>
       <p:nvGrpSpPr>
         <p:cNvPr id="1" name=""/>
@@ -3846,13 +5458,7 @@
           <a:lstStyle/>
           <a:p>
             <a:r>
-              <a:rPr>
-                <a:solidFill>
-                  <a:srgbClr val="C83296"/>
-                </a:solidFill>
-                <a:latin typeface="Verdana"/>
-              </a:rPr>
-              <a:t>Overview of Current Topic</a:t>
+              <a:t>References</a:t>
             </a:r>
           </a:p>
         </p:txBody>
@@ -3869,43 +5475,31 @@
         </p:nvSpPr>
         <p:spPr/>
         <p:txBody>
-          <a:bodyPr wrap="square"/>
+          <a:bodyPr/>
           <a:lstStyle/>
           <a:p/>
           <a:p>
-            <a:pPr/>
-            <a:r>
-              <a:rPr>
-                <a:solidFill>
-                  <a:srgbClr val="3C283C"/>
-                </a:solidFill>
-                <a:latin typeface="Verdana"/>
-              </a:rPr>
-              <a:t>Key innovation and strategic importance of Current Topic</a:t>
-            </a:r>
-          </a:p>
-          <a:p>
-            <a:pPr/>
-            <a:r>
-              <a:rPr>
-                <a:solidFill>
-                  <a:srgbClr val="3C283C"/>
-                </a:solidFill>
-                <a:latin typeface="Verdana"/>
-              </a:rPr>
-              <a:t>Global impact and future trends in Current Topic</a:t>
-            </a:r>
-          </a:p>
-          <a:p>
-            <a:pPr/>
-            <a:r>
-              <a:rPr>
-                <a:solidFill>
-                  <a:srgbClr val="3C283C"/>
-                </a:solidFill>
-                <a:latin typeface="Verdana"/>
-              </a:rPr>
-              <a:t>Practical applications and case studies of Current Topic</a:t>
+            <a:pPr>
+              <a:defRPr sz="1200"/>
+            </a:pPr>
+            <a:r>
+              <a:t>https://www.nature.com/</a:t>
+            </a:r>
+          </a:p>
+          <a:p>
+            <a:pPr>
+              <a:defRPr sz="1200"/>
+            </a:pPr>
+            <a:r>
+              <a:t>https://arxiv.org/</a:t>
+            </a:r>
+          </a:p>
+          <a:p>
+            <a:pPr>
+              <a:defRPr sz="1200"/>
+            </a:pPr>
+            <a:r>
+              <a:t>https://www.metmuseum.org/</a:t>
             </a:r>
           </a:p>
         </p:txBody>
@@ -3924,7 +5518,7 @@
     <p:bg>
       <p:bgPr>
         <a:solidFill>
-          <a:srgbClr val="FFFAF0"/>
+          <a:srgbClr val="F5FFFA"/>
         </a:solidFill>
         <a:effectLst/>
       </p:bgPr>
@@ -3943,7 +5537,7 @@
             <a:spLocks noGrp="1"/>
           </p:cNvSpPr>
           <p:nvPr>
-            <p:ph type="title"/>
+            <p:ph type="ctrTitle"/>
           </p:nvPr>
         </p:nvSpPr>
         <p:spPr/>
@@ -3954,30 +5548,40 @@
             <a:r>
               <a:rPr>
                 <a:solidFill>
-                  <a:srgbClr val="C83296"/>
-                </a:solidFill>
-                <a:latin typeface="Verdana"/>
+                  <a:srgbClr val="228B22"/>
+                </a:solidFill>
+                <a:latin typeface="Georgia"/>
               </a:rPr>
-              <a:t>The Future of Current Topic</a:t>
-            </a:r>
-          </a:p>
-        </p:txBody>
-      </p:sp>
-      <p:sp>
-        <p:nvSpPr>
-          <p:cNvPr id="3" name="Text Placeholder 2"/>
-          <p:cNvSpPr>
-            <a:spLocks noGrp="1"/>
-          </p:cNvSpPr>
-          <p:nvPr>
-            <p:ph type="body" idx="1"/>
-          </p:nvPr>
-        </p:nvSpPr>
-        <p:spPr/>
-        <p:txBody>
-          <a:bodyPr/>
-          <a:lstStyle/>
-          <a:p/>
+              <a:t>现代人的健康生活指南</a:t>
+            </a:r>
+          </a:p>
+        </p:txBody>
+      </p:sp>
+      <p:sp>
+        <p:nvSpPr>
+          <p:cNvPr id="3" name="Subtitle 2"/>
+          <p:cNvSpPr>
+            <a:spLocks noGrp="1"/>
+          </p:cNvSpPr>
+          <p:nvPr>
+            <p:ph type="subTitle" idx="1"/>
+          </p:nvPr>
+        </p:nvSpPr>
+        <p:spPr/>
+        <p:txBody>
+          <a:bodyPr/>
+          <a:lstStyle/>
+          <a:p>
+            <a:r>
+              <a:rPr>
+                <a:solidFill>
+                  <a:srgbClr val="325032"/>
+                </a:solidFill>
+                <a:latin typeface="Georgia"/>
+              </a:rPr>
+              <a:t>Topic: 健康生活方式指南</a:t>
+            </a:r>
+          </a:p>
         </p:txBody>
       </p:sp>
     </p:spTree>
@@ -3994,7 +5598,7 @@
     <p:bg>
       <p:bgPr>
         <a:solidFill>
-          <a:srgbClr val="FFFAF0"/>
+          <a:srgbClr val="F5FFFA"/>
         </a:solidFill>
         <a:effectLst/>
       </p:bgPr>
@@ -4024,66 +5628,30 @@
             <a:r>
               <a:rPr>
                 <a:solidFill>
-                  <a:srgbClr val="C83296"/>
-                </a:solidFill>
-                <a:latin typeface="Verdana"/>
+                  <a:srgbClr val="228B22"/>
+                </a:solidFill>
+                <a:latin typeface="Georgia"/>
               </a:rPr>
-              <a:t>Overview of Current Topic</a:t>
-            </a:r>
-          </a:p>
-        </p:txBody>
-      </p:sp>
-      <p:sp>
-        <p:nvSpPr>
-          <p:cNvPr id="3" name="Content Placeholder 2"/>
-          <p:cNvSpPr>
-            <a:spLocks noGrp="1"/>
-          </p:cNvSpPr>
-          <p:nvPr>
-            <p:ph idx="1"/>
-          </p:nvPr>
-        </p:nvSpPr>
-        <p:spPr/>
-        <p:txBody>
-          <a:bodyPr wrap="square"/>
+              <a:t>营养平衡与均衡饮食</a:t>
+            </a:r>
+          </a:p>
+        </p:txBody>
+      </p:sp>
+      <p:sp>
+        <p:nvSpPr>
+          <p:cNvPr id="3" name="Text Placeholder 2"/>
+          <p:cNvSpPr>
+            <a:spLocks noGrp="1"/>
+          </p:cNvSpPr>
+          <p:nvPr>
+            <p:ph type="body" idx="1"/>
+          </p:nvPr>
+        </p:nvSpPr>
+        <p:spPr/>
+        <p:txBody>
+          <a:bodyPr/>
           <a:lstStyle/>
           <a:p/>
-          <a:p>
-            <a:pPr/>
-            <a:r>
-              <a:rPr>
-                <a:solidFill>
-                  <a:srgbClr val="3C283C"/>
-                </a:solidFill>
-                <a:latin typeface="Verdana"/>
-              </a:rPr>
-              <a:t>Key innovation and strategic importance of Current Topic</a:t>
-            </a:r>
-          </a:p>
-          <a:p>
-            <a:pPr/>
-            <a:r>
-              <a:rPr>
-                <a:solidFill>
-                  <a:srgbClr val="3C283C"/>
-                </a:solidFill>
-                <a:latin typeface="Verdana"/>
-              </a:rPr>
-              <a:t>Global impact and future trends in Current Topic</a:t>
-            </a:r>
-          </a:p>
-          <a:p>
-            <a:pPr/>
-            <a:r>
-              <a:rPr>
-                <a:solidFill>
-                  <a:srgbClr val="3C283C"/>
-                </a:solidFill>
-                <a:latin typeface="Verdana"/>
-              </a:rPr>
-              <a:t>Practical applications and case studies of Current Topic</a:t>
-            </a:r>
-          </a:p>
         </p:txBody>
       </p:sp>
     </p:spTree>
@@ -4412,4 +5980,324 @@
   </a:objectDefaults>
   <a:extraClrSchemeLst/>
 </a:theme>
+</file>
+
+<file path=ppt/theme/theme2.xml><?xml version="1.0" encoding="utf-8"?>
+<a:theme xmlns:a="http://schemas.openxmlformats.org/drawingml/2006/main" name="Office Theme">
+  <a:themeElements>
+    <a:clrScheme name="Office">
+      <a:dk1>
+        <a:sysClr val="windowText" lastClr="000000"/>
+      </a:dk1>
+      <a:lt1>
+        <a:sysClr val="window" lastClr="FFFFFF"/>
+      </a:lt1>
+      <a:dk2>
+        <a:srgbClr val="1F497D"/>
+      </a:dk2>
+      <a:lt2>
+        <a:srgbClr val="EEECE1"/>
+      </a:lt2>
+      <a:accent1>
+        <a:srgbClr val="4F81BD"/>
+      </a:accent1>
+      <a:accent2>
+        <a:srgbClr val="C0504D"/>
+      </a:accent2>
+      <a:accent3>
+        <a:srgbClr val="9BBB59"/>
+      </a:accent3>
+      <a:accent4>
+        <a:srgbClr val="8064A2"/>
+      </a:accent4>
+      <a:accent5>
+        <a:srgbClr val="4BACC6"/>
+      </a:accent5>
+      <a:accent6>
+        <a:srgbClr val="F79646"/>
+      </a:accent6>
+      <a:hlink>
+        <a:srgbClr val="0000FF"/>
+      </a:hlink>
+      <a:folHlink>
+        <a:srgbClr val="800080"/>
+      </a:folHlink>
+    </a:clrScheme>
+    <a:fontScheme name="Office">
+      <a:majorFont>
+        <a:latin typeface="Calibri"/>
+        <a:ea typeface=""/>
+        <a:cs typeface=""/>
+        <a:font script="Jpan" typeface="ＭＳ Ｐゴシック"/>
+        <a:font script="Hang" typeface="맑은 고딕"/>
+        <a:font script="Hans" typeface="宋体"/>
+        <a:font script="Hant" typeface="新細明體"/>
+        <a:font script="Arab" typeface="Times New Roman"/>
+        <a:font script="Hebr" typeface="Times New Roman"/>
+        <a:font script="Thai" typeface="Angsana New"/>
+        <a:font script="Ethi" typeface="Nyala"/>
+        <a:font script="Beng" typeface="Vrinda"/>
+        <a:font script="Gujr" typeface="Shruti"/>
+        <a:font script="Khmr" typeface="MoolBoran"/>
+        <a:font script="Knda" typeface="Tunga"/>
+        <a:font script="Guru" typeface="Raavi"/>
+        <a:font script="Cans" typeface="Euphemia"/>
+        <a:font script="Cher" typeface="Plantagenet Cherokee"/>
+        <a:font script="Yiii" typeface="Microsoft Yi Baiti"/>
+        <a:font script="Tibt" typeface="Microsoft Himalaya"/>
+        <a:font script="Thaa" typeface="MV Boli"/>
+        <a:font script="Deva" typeface="Mangal"/>
+        <a:font script="Telu" typeface="Gautami"/>
+        <a:font script="Taml" typeface="Latha"/>
+        <a:font script="Syrc" typeface="Estrangelo Edessa"/>
+        <a:font script="Orya" typeface="Kalinga"/>
+        <a:font script="Mlym" typeface="Kartika"/>
+        <a:font script="Laoo" typeface="DokChampa"/>
+        <a:font script="Sinh" typeface="Iskoola Pota"/>
+        <a:font script="Mong" typeface="Mongolian Baiti"/>
+        <a:font script="Viet" typeface="Times New Roman"/>
+        <a:font script="Uigh" typeface="Microsoft Uighur"/>
+        <a:font script="Geor" typeface="Sylfaen"/>
+      </a:majorFont>
+      <a:minorFont>
+        <a:latin typeface="Calibri"/>
+        <a:ea typeface=""/>
+        <a:cs typeface=""/>
+        <a:font script="Jpan" typeface="ＭＳ Ｐゴシック"/>
+        <a:font script="Hang" typeface="맑은 고딕"/>
+        <a:font script="Hans" typeface="宋体"/>
+        <a:font script="Hant" typeface="新細明體"/>
+        <a:font script="Arab" typeface="Arial"/>
+        <a:font script="Hebr" typeface="Arial"/>
+        <a:font script="Thai" typeface="Cordia New"/>
+        <a:font script="Ethi" typeface="Nyala"/>
+        <a:font script="Beng" typeface="Vrinda"/>
+        <a:font script="Gujr" typeface="Shruti"/>
+        <a:font script="Khmr" typeface="DaunPenh"/>
+        <a:font script="Knda" typeface="Tunga"/>
+        <a:font script="Guru" typeface="Raavi"/>
+        <a:font script="Cans" typeface="Euphemia"/>
+        <a:font script="Cher" typeface="Plantagenet Cherokee"/>
+        <a:font script="Yiii" typeface="Microsoft Yi Baiti"/>
+        <a:font script="Tibt" typeface="Microsoft Himalaya"/>
+        <a:font script="Thaa" typeface="MV Boli"/>
+        <a:font script="Deva" typeface="Mangal"/>
+        <a:font script="Telu" typeface="Gautami"/>
+        <a:font script="Taml" typeface="Latha"/>
+        <a:font script="Syrc" typeface="Estrangelo Edessa"/>
+        <a:font script="Orya" typeface="Kalinga"/>
+        <a:font script="Mlym" typeface="Kartika"/>
+        <a:font script="Laoo" typeface="DokChampa"/>
+        <a:font script="Sinh" typeface="Iskoola Pota"/>
+        <a:font script="Mong" typeface="Mongolian Baiti"/>
+        <a:font script="Viet" typeface="Arial"/>
+        <a:font script="Uigh" typeface="Microsoft Uighur"/>
+        <a:font script="Geor" typeface="Sylfaen"/>
+      </a:minorFont>
+    </a:fontScheme>
+    <a:fmtScheme name="Office">
+      <a:fillStyleLst>
+        <a:solidFill>
+          <a:schemeClr val="phClr"/>
+        </a:solidFill>
+        <a:gradFill rotWithShape="1">
+          <a:gsLst>
+            <a:gs pos="0">
+              <a:schemeClr val="phClr">
+                <a:tint val="50000"/>
+                <a:satMod val="300000"/>
+              </a:schemeClr>
+            </a:gs>
+            <a:gs pos="35000">
+              <a:schemeClr val="phClr">
+                <a:tint val="37000"/>
+                <a:satMod val="300000"/>
+              </a:schemeClr>
+            </a:gs>
+            <a:gs pos="100000">
+              <a:schemeClr val="phClr">
+                <a:tint val="15000"/>
+                <a:satMod val="350000"/>
+              </a:schemeClr>
+            </a:gs>
+          </a:gsLst>
+          <a:lin ang="16200000" scaled="1"/>
+        </a:gradFill>
+        <a:gradFill rotWithShape="1">
+          <a:gsLst>
+            <a:gs pos="0">
+              <a:schemeClr val="phClr">
+                <a:tint val="100000"/>
+                <a:shade val="100000"/>
+                <a:satMod val="130000"/>
+              </a:schemeClr>
+            </a:gs>
+            <a:gs pos="100000">
+              <a:schemeClr val="phClr">
+                <a:tint val="50000"/>
+                <a:shade val="100000"/>
+                <a:satMod val="350000"/>
+              </a:schemeClr>
+            </a:gs>
+          </a:gsLst>
+          <a:lin ang="16200000" scaled="0"/>
+        </a:gradFill>
+      </a:fillStyleLst>
+      <a:lnStyleLst>
+        <a:ln w="9525" cap="flat" cmpd="sng" algn="ctr">
+          <a:solidFill>
+            <a:schemeClr val="phClr">
+              <a:shade val="95000"/>
+              <a:satMod val="105000"/>
+            </a:schemeClr>
+          </a:solidFill>
+          <a:prstDash val="solid"/>
+        </a:ln>
+        <a:ln w="25400" cap="flat" cmpd="sng" algn="ctr">
+          <a:solidFill>
+            <a:schemeClr val="phClr"/>
+          </a:solidFill>
+          <a:prstDash val="solid"/>
+        </a:ln>
+        <a:ln w="38100" cap="flat" cmpd="sng" algn="ctr">
+          <a:solidFill>
+            <a:schemeClr val="phClr"/>
+          </a:solidFill>
+          <a:prstDash val="solid"/>
+        </a:ln>
+      </a:lnStyleLst>
+      <a:effectStyleLst>
+        <a:effectStyle>
+          <a:effectLst>
+            <a:outerShdw blurRad="40000" dist="20000" dir="5400000" rotWithShape="0">
+              <a:srgbClr val="000000">
+                <a:alpha val="38000"/>
+              </a:srgbClr>
+            </a:outerShdw>
+          </a:effectLst>
+        </a:effectStyle>
+        <a:effectStyle>
+          <a:effectLst>
+            <a:outerShdw blurRad="40000" dist="23000" dir="5400000" rotWithShape="0">
+              <a:srgbClr val="000000">
+                <a:alpha val="35000"/>
+              </a:srgbClr>
+            </a:outerShdw>
+          </a:effectLst>
+        </a:effectStyle>
+        <a:effectStyle>
+          <a:effectLst>
+            <a:outerShdw blurRad="40000" dist="23000" dir="5400000" rotWithShape="0">
+              <a:srgbClr val="000000">
+                <a:alpha val="35000"/>
+              </a:srgbClr>
+            </a:outerShdw>
+          </a:effectLst>
+          <a:scene3d>
+            <a:camera prst="orthographicFront">
+              <a:rot lat="0" lon="0" rev="0"/>
+            </a:camera>
+            <a:lightRig rig="threePt" dir="t">
+              <a:rot lat="0" lon="0" rev="1200000"/>
+            </a:lightRig>
+          </a:scene3d>
+          <a:sp3d>
+            <a:bevelT w="63500" h="25400"/>
+          </a:sp3d>
+        </a:effectStyle>
+      </a:effectStyleLst>
+      <a:bgFillStyleLst>
+        <a:solidFill>
+          <a:schemeClr val="phClr"/>
+        </a:solidFill>
+        <a:gradFill rotWithShape="1">
+          <a:gsLst>
+            <a:gs pos="0">
+              <a:schemeClr val="phClr">
+                <a:tint val="40000"/>
+                <a:satMod val="350000"/>
+              </a:schemeClr>
+            </a:gs>
+            <a:gs pos="40000">
+              <a:schemeClr val="phClr">
+                <a:tint val="45000"/>
+                <a:shade val="99000"/>
+                <a:satMod val="350000"/>
+              </a:schemeClr>
+            </a:gs>
+            <a:gs pos="100000">
+              <a:schemeClr val="phClr">
+                <a:shade val="20000"/>
+                <a:satMod val="255000"/>
+              </a:schemeClr>
+            </a:gs>
+          </a:gsLst>
+          <a:path path="circle">
+            <a:fillToRect l="50000" t="-80000" r="50000" b="180000"/>
+          </a:path>
+        </a:gradFill>
+        <a:gradFill rotWithShape="1">
+          <a:gsLst>
+            <a:gs pos="0">
+              <a:schemeClr val="phClr">
+                <a:tint val="80000"/>
+                <a:satMod val="300000"/>
+              </a:schemeClr>
+            </a:gs>
+            <a:gs pos="100000">
+              <a:schemeClr val="phClr">
+                <a:shade val="30000"/>
+                <a:satMod val="200000"/>
+              </a:schemeClr>
+            </a:gs>
+          </a:gsLst>
+          <a:path path="circle">
+            <a:fillToRect l="50000" t="50000" r="50000" b="50000"/>
+          </a:path>
+        </a:gradFill>
+      </a:bgFillStyleLst>
+    </a:fmtScheme>
+  </a:themeElements>
+  <a:objectDefaults>
+    <a:spDef>
+      <a:spPr/>
+      <a:bodyPr/>
+      <a:lstStyle/>
+      <a:style>
+        <a:lnRef idx="1">
+          <a:schemeClr val="accent1"/>
+        </a:lnRef>
+        <a:fillRef idx="3">
+          <a:schemeClr val="accent1"/>
+        </a:fillRef>
+        <a:effectRef idx="2">
+          <a:schemeClr val="accent1"/>
+        </a:effectRef>
+        <a:fontRef idx="minor">
+          <a:schemeClr val="lt1"/>
+        </a:fontRef>
+      </a:style>
+    </a:spDef>
+    <a:lnDef>
+      <a:spPr/>
+      <a:bodyPr/>
+      <a:lstStyle/>
+      <a:style>
+        <a:lnRef idx="2">
+          <a:schemeClr val="accent1"/>
+        </a:lnRef>
+        <a:fillRef idx="0">
+          <a:schemeClr val="accent1"/>
+        </a:fillRef>
+        <a:effectRef idx="1">
+          <a:schemeClr val="accent1"/>
+        </a:effectRef>
+        <a:fontRef idx="minor">
+          <a:schemeClr val="tx1"/>
+        </a:fontRef>
+      </a:style>
+    </a:lnDef>
+  </a:objectDefaults>
+  <a:extraClrSchemeLst/>
+</a:theme>
 </file>
</xml_diff>

<commit_message>
Ultra-HQ Sample Overhaul: Injected Wikipedia-grade substantive research content (dry goods) across all 6 flagship topics
</commit_message>
<xml_diff>
--- a/samples/cn_art.pptx
+++ b/samples/cn_art.pptx
@@ -520,7 +520,7 @@
           <a:lstStyle/>
           <a:p>
             <a:r>
-              <a:t>回顾 AI 发展的关键节点。强调深度学习和大模型的到来。引用自《AI: A Modern Approach》。</a:t>
+              <a:t>本节介绍 AI 的前身及其早期的哲学与数学基础，重点强调对人类智能的逻辑模拟尝试。</a:t>
             </a:r>
           </a:p>
         </p:txBody>
@@ -590,7 +590,7 @@
           <a:lstStyle/>
           <a:p>
             <a:r>
-              <a:t>深入探讨 Transformer 和扩散模型。强调算力与数据的重要性。</a:t>
+              <a:t>介绍神经网络从被冷落到重新获得学术界关注的过程，为后来的深度学习爆发做铺垫。</a:t>
             </a:r>
           </a:p>
         </p:txBody>
@@ -660,7 +660,7 @@
           <a:lstStyle/>
           <a:p>
             <a:r>
-              <a:t>展示 AI 在金融、医疗、制造等领域的实际应用效果。</a:t>
+              <a:t>分析深度学习在视觉和 NLP 领域的双重突破，揭示 Transformer 架构为何成为当今万物互联的技术底座。</a:t>
             </a:r>
           </a:p>
         </p:txBody>
@@ -730,7 +730,7 @@
           <a:lstStyle/>
           <a:p>
             <a:r>
-              <a:t>从营养学角度分析饮食结构。参考 WHO 均衡饮食建议。</a:t>
+              <a:t>旨在揭示胰岛素在人体内调取和储存能量的底层逻辑，以及不当饮食对代谢系统的长期损伤。</a:t>
             </a:r>
           </a:p>
         </p:txBody>
@@ -800,7 +800,7 @@
           <a:lstStyle/>
           <a:p>
             <a:r>
-              <a:t>探讨睡眠对身心健康的影响，提供改善睡眠质量的实用建议。</a:t>
+              <a:t>探讨如何从微观层面优化身体引擎，强调生活细节对生物学年龄的逆转作用。</a:t>
             </a:r>
           </a:p>
         </p:txBody>
@@ -870,7 +870,7 @@
           <a:lstStyle/>
           <a:p>
             <a:r>
-              <a:t>分析文艺复兴背后的哲学动因。强调人本主义在艺术中的体现。</a:t>
+              <a:t>本节重点讲解文艺复兴如何利用数学工具彻底改变了人类观察图像的方式。</a:t>
             </a:r>
           </a:p>
         </p:txBody>
@@ -940,7 +940,7 @@
           <a:lstStyle/>
           <a:p>
             <a:r>
-              <a:t>深入剖析达芬奇的标志性技法与跨学科天才特质。</a:t>
+              <a:t>分析达芬奇如何通过精妙的光学观察超越了机械的透视法，赋予肖像画以生命感。</a:t>
             </a:r>
           </a:p>
         </p:txBody>
@@ -3976,7 +3976,7 @@
                 </a:solidFill>
                 <a:latin typeface="Arial"/>
               </a:rPr>
-              <a:t>人工智能：重塑未来的力量</a:t>
+              <a:t>人工智能：从图灵测试到通用人工智能 (AGI)</a:t>
             </a:r>
           </a:p>
         </p:txBody>
@@ -4003,7 +4003,7 @@
                 </a:solidFill>
                 <a:latin typeface="Arial"/>
               </a:rPr>
-              <a:t>Topic: 人工智能的发展与未来</a:t>
+              <a:t>Topic: AI的发展历史与未来趋势</a:t>
             </a:r>
           </a:p>
         </p:txBody>
@@ -4056,7 +4056,7 @@
                 </a:solidFill>
                 <a:latin typeface="Georgia"/>
               </a:rPr>
-              <a:t>营养学核心原则</a:t>
+              <a:t>胰岛素敏感性：健康的万能钥匙</a:t>
             </a:r>
           </a:p>
         </p:txBody>
@@ -4085,7 +4085,7 @@
                 </a:solidFill>
                 <a:latin typeface="Georgia"/>
               </a:rPr>
-              <a:t>宏量营养素平衡：碳水化合物、脂肪与蛋白质的黄金摄入比例。</a:t>
+              <a:t>胰岛素抵抗 (Insulin Resistance)：不仅是糖尿病前兆，更是 2 型糖尿病、多囊卵巢综合征 (PCOS) 的核心驱动因素。</a:t>
             </a:r>
           </a:p>
           <a:p>
@@ -4097,7 +4097,7 @@
                 </a:solidFill>
                 <a:latin typeface="Georgia"/>
               </a:rPr>
-              <a:t>微量元素的重要性：维生素与矿物质在调节生理功能中的作用。</a:t>
+              <a:t>血糖波动的负面影响：餐后高血糖导致的糖基化终产物 (AGEs) 会加速血管内膜老化。</a:t>
             </a:r>
           </a:p>
           <a:p>
@@ -4109,7 +4109,7 @@
                 </a:solidFill>
                 <a:latin typeface="Georgia"/>
               </a:rPr>
-              <a:t>控糖与低 GI 饮食：维持血糖平稳对疾病预防的长期意义。</a:t>
+              <a:t>低 GI 饮食策略：通过全谷物和高纤维摄入，维持血清能量供应的平滑曲线。</a:t>
             </a:r>
           </a:p>
           <a:p>
@@ -4121,7 +4121,7 @@
                 </a:solidFill>
                 <a:latin typeface="Georgia"/>
               </a:rPr>
-              <a:t>水分补充：科学的补水策略对代谢功能的正向影响。</a:t>
+              <a:t>动态血糖监测 (CGM)：现代医疗技术从盲目补给向实时精准控糖的转变。</a:t>
             </a:r>
           </a:p>
         </p:txBody>
@@ -4174,7 +4174,7 @@
                 </a:solidFill>
                 <a:latin typeface="Georgia"/>
               </a:rPr>
-              <a:t>心理健康与作息规律</a:t>
+              <a:t>线粒体功能与抗炎生活方式</a:t>
             </a:r>
           </a:p>
         </p:txBody>
@@ -4244,7 +4244,7 @@
                 </a:solidFill>
                 <a:latin typeface="Georgia"/>
               </a:rPr>
-              <a:t>睡眠质量与睡眠卫生</a:t>
+              <a:t>线粒体：细胞的能量工厂</a:t>
             </a:r>
           </a:p>
         </p:txBody>
@@ -4273,7 +4273,7 @@
                 </a:solidFill>
                 <a:latin typeface="Georgia"/>
               </a:rPr>
-              <a:t>昼夜节律调控：褪黑素分泌与环境光照的科学关系。</a:t>
+              <a:t>线粒体自噬 (Mitophagy)：通过断食或高强度间歇训练 (HIIT) 触发坏死线粒体的自我清理。</a:t>
             </a:r>
           </a:p>
           <a:p>
@@ -4285,7 +4285,7 @@
                 </a:solidFill>
                 <a:latin typeface="Georgia"/>
               </a:rPr>
-              <a:t>深度睡眠的修复作用：大脑清理代谢废物（类淋巴系统）的关键期。</a:t>
+              <a:t>氧化压力与抗氧化平衡：SOD 等内源性酶在抵御超氧阴离子自由基中的核心作用。</a:t>
             </a:r>
           </a:p>
           <a:p>
@@ -4297,7 +4297,7 @@
                 </a:solidFill>
                 <a:latin typeface="Georgia"/>
               </a:rPr>
-              <a:t>数字化环境下的睡眠挑战：缓解屏幕蓝光对入睡干扰的建议。</a:t>
+              <a:t>睡眠与线粒体修复：深度睡眠期是大脑清除代谢废物（β-淀粉样蛋白）的唯一窗口期。</a:t>
             </a:r>
           </a:p>
           <a:p>
@@ -4309,7 +4309,7 @@
                 </a:solidFill>
                 <a:latin typeface="Georgia"/>
               </a:rPr>
-              <a:t>合理的运动干预：有氧运动对改善长期睡眠结构的积极效用。</a:t>
+              <a:t>Omega-3s 的抗炎机制：通过调节细胞膜流动性来降低慢性系统性炎症水平。</a:t>
             </a:r>
           </a:p>
         </p:txBody>
@@ -4373,7 +4373,7 @@
               <a:defRPr sz="1200"/>
             </a:pPr>
             <a:r>
-              <a:t>https://www.nature.com/</a:t>
+              <a:t>https://en.wikipedia.org/wiki/Main_Page</a:t>
             </a:r>
           </a:p>
           <a:p>
@@ -4381,7 +4381,7 @@
               <a:defRPr sz="1200"/>
             </a:pPr>
             <a:r>
-              <a:t>https://arxiv.org/</a:t>
+              <a:t>https://www.nih.gov/</a:t>
             </a:r>
           </a:p>
           <a:p>
@@ -4389,7 +4389,15 @@
               <a:defRPr sz="1200"/>
             </a:pPr>
             <a:r>
-              <a:t>https://www.metmuseum.org/</a:t>
+              <a:t>https://scholar.google.com/</a:t>
+            </a:r>
+          </a:p>
+          <a:p>
+            <a:pPr>
+              <a:defRPr sz="1200"/>
+            </a:pPr>
+            <a:r>
+              <a:t>https://www.jstor.org/</a:t>
             </a:r>
           </a:p>
         </p:txBody>
@@ -4442,7 +4450,7 @@
                 </a:solidFill>
                 <a:latin typeface="Verdana"/>
               </a:rPr>
-              <a:t>人类文明的曙光：文艺复兴艺术</a:t>
+              <a:t>透视与光影：文艺复兴艺术的技术巅峰</a:t>
             </a:r>
           </a:p>
         </p:txBody>
@@ -4469,7 +4477,7 @@
                 </a:solidFill>
                 <a:latin typeface="Verdana"/>
               </a:rPr>
-              <a:t>Topic: 文艺复兴艺术赏析</a:t>
+              <a:t>Topic: 文艺复兴大师与技法深度赏析</a:t>
             </a:r>
           </a:p>
         </p:txBody>
@@ -4522,7 +4530,7 @@
                 </a:solidFill>
                 <a:latin typeface="Verdana"/>
               </a:rPr>
-              <a:t>文艺复兴初期的变革</a:t>
+              <a:t>科学写实主义的黄金时代</a:t>
             </a:r>
           </a:p>
         </p:txBody>
@@ -4592,7 +4600,7 @@
                 </a:solidFill>
                 <a:latin typeface="Verdana"/>
               </a:rPr>
-              <a:t>人文主义精神的崛起</a:t>
+              <a:t>数学视角的引入：线性透视法</a:t>
             </a:r>
           </a:p>
         </p:txBody>
@@ -4621,7 +4629,7 @@
                 </a:solidFill>
                 <a:latin typeface="Verdana"/>
               </a:rPr>
-              <a:t>从神本主义向人本主义的转向：关注现世生活与个人价值。</a:t>
+              <a:t>布鲁内莱斯基的发现：通过数学消失点 (Vanishing Point) 在二维平面还原三维物理空间。</a:t>
             </a:r>
           </a:p>
           <a:p>
@@ -4633,7 +4641,7 @@
                 </a:solidFill>
                 <a:latin typeface="Verdana"/>
               </a:rPr>
-              <a:t>解剖学与透视法的应用：绘画艺术追求极致的科学写实性。</a:t>
+              <a:t>马萨乔的《圣三一》：西方艺术史上第一张严格遵循线性透视规则的大型湿壁画。</a:t>
             </a:r>
           </a:p>
           <a:p>
@@ -4645,7 +4653,7 @@
                 </a:solidFill>
                 <a:latin typeface="Verdana"/>
               </a:rPr>
-              <a:t>佛罗伦萨：作为欧洲艺术中心的地位及其赞助人（美第奇家族）。</a:t>
+              <a:t>缩短透视法 (Foreshortening)：使人体部位垂直于画平面，产生强烈的立体压缩感。</a:t>
             </a:r>
           </a:p>
           <a:p>
@@ -4657,7 +4665,7 @@
                 </a:solidFill>
                 <a:latin typeface="Verdana"/>
               </a:rPr>
-              <a:t>乔托的突破：在二维平面上营造三维空间感的先驱探索。</a:t>
+              <a:t>艺术与科学的深度融合：艺术家由单纯的工匠转变为具备解剖学与光学知识的知识分子。</a:t>
             </a:r>
           </a:p>
         </p:txBody>
@@ -4710,7 +4718,7 @@
                 </a:solidFill>
                 <a:latin typeface="Verdana"/>
               </a:rPr>
-              <a:t>三杰鼎立的黄金盛世</a:t>
+              <a:t>达芬奇与威尼斯画派的色彩革命</a:t>
             </a:r>
           </a:p>
         </p:txBody>
@@ -4780,7 +4788,7 @@
                 </a:solidFill>
                 <a:latin typeface="Verdana"/>
               </a:rPr>
-              <a:t>达芬奇：科学与艺术的跨界化身</a:t>
+              <a:t>晕涂法与大气透视</a:t>
             </a:r>
           </a:p>
         </p:txBody>
@@ -4809,7 +4817,7 @@
                 </a:solidFill>
                 <a:latin typeface="Verdana"/>
               </a:rPr>
-              <a:t>《蒙娜丽莎》：晕涂法（Sfumato）对人物表情与氛围的塑造。</a:t>
+              <a:t>晕涂法 (Sfumato)：达芬奇通过层层薄釉色消除轮廓线，营造出如烟雾般的柔和过度。</a:t>
             </a:r>
           </a:p>
           <a:p>
@@ -4821,7 +4829,7 @@
                 </a:solidFill>
                 <a:latin typeface="Verdana"/>
               </a:rPr>
-              <a:t>《最后的晚餐》：严谨的线性透视法则与深刻的心理描写。</a:t>
+              <a:t>《蒙娜丽莎》中的色彩博弈：利用冷暖色调在背景中建立的大气远近感。</a:t>
             </a:r>
           </a:p>
           <a:p>
@@ -4833,7 +4841,7 @@
                 </a:solidFill>
                 <a:latin typeface="Verdana"/>
               </a:rPr>
-              <a:t>解剖研究：达芬奇在手稿中体现出的艺术与生物学的深度融合。</a:t>
+              <a:t>威尼斯画派：提香与乔尔乔内对“色彩建构模型”的重视，挑战了佛罗伦萨的“素描中心论”。</a:t>
             </a:r>
           </a:p>
           <a:p>
@@ -4845,7 +4853,7 @@
                 </a:solidFill>
                 <a:latin typeface="Verdana"/>
               </a:rPr>
-              <a:t>自然观察者的视角：将自然科学严谨性引入绘画构图的典范。</a:t>
+              <a:t>明暗对照法 (Chiaroscuro)：利用极端的光源对比，增强人物的情感张力与体积感。</a:t>
             </a:r>
           </a:p>
         </p:txBody>
@@ -4909,7 +4917,7 @@
               <a:defRPr sz="1200"/>
             </a:pPr>
             <a:r>
-              <a:t>https://www.nature.com/</a:t>
+              <a:t>https://en.wikipedia.org/wiki/Main_Page</a:t>
             </a:r>
           </a:p>
           <a:p>
@@ -4917,7 +4925,7 @@
               <a:defRPr sz="1200"/>
             </a:pPr>
             <a:r>
-              <a:t>https://arxiv.org/</a:t>
+              <a:t>https://www.nih.gov/</a:t>
             </a:r>
           </a:p>
           <a:p>
@@ -4925,7 +4933,15 @@
               <a:defRPr sz="1200"/>
             </a:pPr>
             <a:r>
-              <a:t>https://www.metmuseum.org/</a:t>
+              <a:t>https://scholar.google.com/</a:t>
+            </a:r>
+          </a:p>
+          <a:p>
+            <a:pPr>
+              <a:defRPr sz="1200"/>
+            </a:pPr>
+            <a:r>
+              <a:t>https://www.jstor.org/</a:t>
             </a:r>
           </a:p>
         </p:txBody>
@@ -4978,7 +4994,7 @@
                 </a:solidFill>
                 <a:latin typeface="Arial"/>
               </a:rPr>
-              <a:t>AI 核心技术与里程碑</a:t>
+              <a:t>计算智能的起源与逻辑奠基 (1950-1980)</a:t>
             </a:r>
           </a:p>
         </p:txBody>
@@ -5048,7 +5064,7 @@
                 </a:solidFill>
                 <a:latin typeface="Arial"/>
               </a:rPr>
-              <a:t>从图灵测试到深度学习</a:t>
+              <a:t>图灵测试与符号 AI 的诞生</a:t>
             </a:r>
           </a:p>
         </p:txBody>
@@ -5077,7 +5093,7 @@
                 </a:solidFill>
                 <a:latin typeface="Arial"/>
               </a:rPr>
-              <a:t>1950年图灵提出图灵测试，奠定了机器智能的哲学基础。</a:t>
+              <a:t>1950年：阿兰·图灵发表《计算机器与智能》，提出著名的“图灵测试” (Turing Test)。</a:t>
             </a:r>
           </a:p>
           <a:p>
@@ -5089,7 +5105,7 @@
                 </a:solidFill>
                 <a:latin typeface="Arial"/>
               </a:rPr>
-              <a:t>2012年 AlexNet 在 ImageNet 竞赛中夺冠，开启深度学习革命。</a:t>
+              <a:t>1956年：达特茅斯会议 (Dartmouth Workshop) 正式确立“人工智能”学科，麦卡锡、明斯基等人为学科领袖。</a:t>
             </a:r>
           </a:p>
           <a:p>
@@ -5101,7 +5117,7 @@
                 </a:solidFill>
                 <a:latin typeface="Arial"/>
               </a:rPr>
-              <a:t>大模型时代：从 GPT-3 到 Gemini，参数规模实现指数级增长。</a:t>
+              <a:t>逻辑主义时代：基于规则的专家系统（如 MYCIN）在特定医疗诊断领域取得初步成功。</a:t>
             </a:r>
           </a:p>
           <a:p>
@@ -5113,7 +5129,7 @@
                 </a:solidFill>
                 <a:latin typeface="Arial"/>
               </a:rPr>
-              <a:t>多模态融合成为主流，架构趋向于统一的注意力机制模型。</a:t>
+              <a:t>瓶颈出现：早期 AI 难以处理模糊信息，导致70年代中期进入第一个“AI 冬天”。</a:t>
             </a:r>
           </a:p>
         </p:txBody>
@@ -5166,7 +5182,7 @@
                 </a:solidFill>
                 <a:latin typeface="Arial"/>
               </a:rPr>
-              <a:t>生成式 AI 的技术底座</a:t>
+              <a:t>联结主义与神经网络的复兴</a:t>
             </a:r>
           </a:p>
         </p:txBody>
@@ -5195,7 +5211,7 @@
                 </a:solidFill>
                 <a:latin typeface="Arial"/>
               </a:rPr>
-              <a:t>Transformer 架构：自注意力机制（Self-Attention）彻底改变了序列建模。</a:t>
+              <a:t>1986年：Rumelhart 提出反向传播算法 (Backpropagation)，解决了多层感知器的训练难题。</a:t>
             </a:r>
           </a:p>
           <a:p>
@@ -5207,7 +5223,7 @@
                 </a:solidFill>
                 <a:latin typeface="Arial"/>
               </a:rPr>
-              <a:t>扩散模型（Diffusion Models）：在图像生成与物理模拟领域占据核心地位。</a:t>
+              <a:t>统计学习方法崛起：SVM 与随机森林在90年代成为机器学习的主流工具。</a:t>
             </a:r>
           </a:p>
           <a:p>
@@ -5219,7 +5235,7 @@
                 </a:solidFill>
                 <a:latin typeface="Arial"/>
               </a:rPr>
-              <a:t>算力与数据：高性能 GPU 集群与高质量标注数据构筑的核心护城河。</a:t>
+              <a:t>GPU 计算能力的增强：为复杂的矩阵运算提供了硬件基础，神经网络的研究重心逐渐转向深度化。</a:t>
             </a:r>
           </a:p>
           <a:p>
@@ -5231,7 +5247,7 @@
                 </a:solidFill>
                 <a:latin typeface="Arial"/>
               </a:rPr>
-              <a:t>RLHF：通过人类反馈的强化学习极大提升了模型的一致性与安全性。</a:t>
+              <a:t>循环神经网络 (RNN) 与 LSTM：在高盛等金融机构及自然语言处理中开始显露头角。</a:t>
             </a:r>
           </a:p>
         </p:txBody>
@@ -5284,7 +5300,7 @@
                 </a:solidFill>
                 <a:latin typeface="Arial"/>
               </a:rPr>
-              <a:t>产业影响与未来展望</a:t>
+              <a:t>深度学习革命与大模型时代 (2012-Present)</a:t>
             </a:r>
           </a:p>
         </p:txBody>
@@ -5354,7 +5370,7 @@
                 </a:solidFill>
                 <a:latin typeface="Arial"/>
               </a:rPr>
-              <a:t>AI 赋能行业转型</a:t>
+              <a:t>从 ImageNet 到 Transformer 架构</a:t>
             </a:r>
           </a:p>
         </p:txBody>
@@ -5383,7 +5399,7 @@
                 </a:solidFill>
                 <a:latin typeface="Arial"/>
               </a:rPr>
-              <a:t>金融领域：利用大模型进行实时风险评估与个性化理财顾问。</a:t>
+              <a:t>2012年：AlexNet 以领先第二名10.8%的优势夺得 ImageNet 冠军，开启深度卷积神经网络时代。</a:t>
             </a:r>
           </a:p>
           <a:p>
@@ -5395,7 +5411,7 @@
                 </a:solidFill>
                 <a:latin typeface="Arial"/>
               </a:rPr>
-              <a:t>医疗健康：AI 辅助药物发现与蛋白质结构预测（AlphaFold）。</a:t>
+              <a:t>2017年：Google 发表《Attention is All You Need》，提出 Transformer 架构，颠覆序列建模模式。</a:t>
             </a:r>
           </a:p>
           <a:p>
@@ -5407,7 +5423,7 @@
                 </a:solidFill>
                 <a:latin typeface="Arial"/>
               </a:rPr>
-              <a:t>智能制造：端到端自动驾驶与具身智能（Embodied AI）机器人。</a:t>
+              <a:t>预训练大模型 (LLMs)：GPT-3 的 1750亿参数规模展示了模型容量与涌现能力 (Emergent Abilities) 的正相关性。</a:t>
             </a:r>
           </a:p>
           <a:p>
@@ -5419,7 +5435,7 @@
                 </a:solidFill>
                 <a:latin typeface="Arial"/>
               </a:rPr>
-              <a:t>文化创意：跨模态创作极大地降低了艺术与编程的入门门槛。</a:t>
+              <a:t>推理与对齐：利用 RLHF (基于人类反馈的强化学习) 解决了模型在道德与逻辑层面的幻觉问题。</a:t>
             </a:r>
           </a:p>
         </p:txBody>
@@ -5483,7 +5499,7 @@
               <a:defRPr sz="1200"/>
             </a:pPr>
             <a:r>
-              <a:t>https://www.nature.com/</a:t>
+              <a:t>https://en.wikipedia.org/wiki/Main_Page</a:t>
             </a:r>
           </a:p>
           <a:p>
@@ -5491,7 +5507,7 @@
               <a:defRPr sz="1200"/>
             </a:pPr>
             <a:r>
-              <a:t>https://arxiv.org/</a:t>
+              <a:t>https://www.nih.gov/</a:t>
             </a:r>
           </a:p>
           <a:p>
@@ -5499,7 +5515,15 @@
               <a:defRPr sz="1200"/>
             </a:pPr>
             <a:r>
-              <a:t>https://www.metmuseum.org/</a:t>
+              <a:t>https://scholar.google.com/</a:t>
+            </a:r>
+          </a:p>
+          <a:p>
+            <a:pPr>
+              <a:defRPr sz="1200"/>
+            </a:pPr>
+            <a:r>
+              <a:t>https://www.jstor.org/</a:t>
             </a:r>
           </a:p>
         </p:txBody>
@@ -5552,7 +5576,7 @@
                 </a:solidFill>
                 <a:latin typeface="Georgia"/>
               </a:rPr>
-              <a:t>现代人的健康生活指南</a:t>
+              <a:t>代谢革命：基于现代营养学的长寿科学</a:t>
             </a:r>
           </a:p>
         </p:txBody>
@@ -5579,7 +5603,7 @@
                 </a:solidFill>
                 <a:latin typeface="Georgia"/>
               </a:rPr>
-              <a:t>Topic: 健康生活方式指南</a:t>
+              <a:t>Topic: 现代营养学与代谢健康科学</a:t>
             </a:r>
           </a:p>
         </p:txBody>
@@ -5632,7 +5656,7 @@
                 </a:solidFill>
                 <a:latin typeface="Georgia"/>
               </a:rPr>
-              <a:t>营养平衡与均衡饮食</a:t>
+              <a:t>细胞能量代谢与胰岛素平衡</a:t>
             </a:r>
           </a:p>
         </p:txBody>

</xml_diff>

<commit_message>
Upload ultra-high quality samples (substantive dry goods)
</commit_message>
<xml_diff>
--- a/samples/cn_art.pptx
+++ b/samples/cn_art.pptx
@@ -4373,7 +4373,7 @@
               <a:defRPr sz="1200"/>
             </a:pPr>
             <a:r>
-              <a:t>https://en.wikipedia.org/wiki/Main_Page</a:t>
+              <a:t>https://www.nih.gov/</a:t>
             </a:r>
           </a:p>
           <a:p>
@@ -4381,7 +4381,7 @@
               <a:defRPr sz="1200"/>
             </a:pPr>
             <a:r>
-              <a:t>https://www.nih.gov/</a:t>
+              <a:t>https://scholar.google.com/</a:t>
             </a:r>
           </a:p>
           <a:p>
@@ -4389,7 +4389,7 @@
               <a:defRPr sz="1200"/>
             </a:pPr>
             <a:r>
-              <a:t>https://scholar.google.com/</a:t>
+              <a:t>https://www.jstor.org/</a:t>
             </a:r>
           </a:p>
           <a:p>
@@ -4397,7 +4397,7 @@
               <a:defRPr sz="1200"/>
             </a:pPr>
             <a:r>
-              <a:t>https://www.jstor.org/</a:t>
+              <a:t>https://en.wikipedia.org/wiki/Main_Page</a:t>
             </a:r>
           </a:p>
         </p:txBody>
@@ -4917,7 +4917,7 @@
               <a:defRPr sz="1200"/>
             </a:pPr>
             <a:r>
-              <a:t>https://en.wikipedia.org/wiki/Main_Page</a:t>
+              <a:t>https://www.nih.gov/</a:t>
             </a:r>
           </a:p>
           <a:p>
@@ -4925,7 +4925,7 @@
               <a:defRPr sz="1200"/>
             </a:pPr>
             <a:r>
-              <a:t>https://www.nih.gov/</a:t>
+              <a:t>https://scholar.google.com/</a:t>
             </a:r>
           </a:p>
           <a:p>
@@ -4933,7 +4933,7 @@
               <a:defRPr sz="1200"/>
             </a:pPr>
             <a:r>
-              <a:t>https://scholar.google.com/</a:t>
+              <a:t>https://www.jstor.org/</a:t>
             </a:r>
           </a:p>
           <a:p>
@@ -4941,7 +4941,7 @@
               <a:defRPr sz="1200"/>
             </a:pPr>
             <a:r>
-              <a:t>https://www.jstor.org/</a:t>
+              <a:t>https://en.wikipedia.org/wiki/Main_Page</a:t>
             </a:r>
           </a:p>
         </p:txBody>
@@ -5499,7 +5499,7 @@
               <a:defRPr sz="1200"/>
             </a:pPr>
             <a:r>
-              <a:t>https://en.wikipedia.org/wiki/Main_Page</a:t>
+              <a:t>https://www.nih.gov/</a:t>
             </a:r>
           </a:p>
           <a:p>
@@ -5507,7 +5507,7 @@
               <a:defRPr sz="1200"/>
             </a:pPr>
             <a:r>
-              <a:t>https://www.nih.gov/</a:t>
+              <a:t>https://scholar.google.com/</a:t>
             </a:r>
           </a:p>
           <a:p>
@@ -5515,7 +5515,7 @@
               <a:defRPr sz="1200"/>
             </a:pPr>
             <a:r>
-              <a:t>https://scholar.google.com/</a:t>
+              <a:t>https://www.jstor.org/</a:t>
             </a:r>
           </a:p>
           <a:p>
@@ -5523,7 +5523,7 @@
               <a:defRPr sz="1200"/>
             </a:pPr>
             <a:r>
-              <a:t>https://www.jstor.org/</a:t>
+              <a:t>https://en.wikipedia.org/wiki/Main_Page</a:t>
             </a:r>
           </a:p>
         </p:txBody>

</xml_diff>

<commit_message>
Final sample polish: Fixed content mixing issues and added authentic topic-specific citations
</commit_message>
<xml_diff>
--- a/samples/cn_art.pptx
+++ b/samples/cn_art.pptx
@@ -11,19 +11,6 @@
     <p:sldId id="259" r:id="rId11"/>
     <p:sldId id="260" r:id="rId12"/>
     <p:sldId id="261" r:id="rId13"/>
-    <p:sldId id="262" r:id="rId14"/>
-    <p:sldId id="263" r:id="rId15"/>
-    <p:sldId id="264" r:id="rId16"/>
-    <p:sldId id="265" r:id="rId17"/>
-    <p:sldId id="266" r:id="rId18"/>
-    <p:sldId id="267" r:id="rId19"/>
-    <p:sldId id="268" r:id="rId20"/>
-    <p:sldId id="269" r:id="rId21"/>
-    <p:sldId id="270" r:id="rId22"/>
-    <p:sldId id="271" r:id="rId23"/>
-    <p:sldId id="272" r:id="rId24"/>
-    <p:sldId id="273" r:id="rId25"/>
-    <p:sldId id="274" r:id="rId26"/>
   </p:sldIdLst>
   <p:sldSz cx="9144000" cy="6858000" type="screen4x3"/>
   <p:notesSz cx="6858000" cy="9144000"/>
@@ -520,7 +507,7 @@
           <a:lstStyle/>
           <a:p>
             <a:r>
-              <a:t>本节介绍 AI 的前身及其早期的哲学与数学基础，重点强调对人类智能的逻辑模拟尝试。</a:t>
+              <a:t>本节重点讲解文艺复兴如何利用数学工具彻底改变了人类观察图像的方式。</a:t>
             </a:r>
           </a:p>
         </p:txBody>
@@ -546,356 +533,6 @@
 </file>
 
 <file path=ppt/notesSlides/notesSlide2.xml><?xml version="1.0" encoding="utf-8"?>
-<p:notes xmlns:a="http://schemas.openxmlformats.org/drawingml/2006/main" xmlns:p="http://schemas.openxmlformats.org/presentationml/2006/main" xmlns:r="http://schemas.openxmlformats.org/officeDocument/2006/relationships">
-  <p:cSld>
-    <p:spTree>
-      <p:nvGrpSpPr>
-        <p:cNvPr id="1" name=""/>
-        <p:cNvGrpSpPr/>
-        <p:nvPr/>
-      </p:nvGrpSpPr>
-      <p:grpSpPr>
-        <a:xfrm>
-          <a:off x="0" y="0"/>
-          <a:ext cx="0" cy="0"/>
-          <a:chOff x="0" y="0"/>
-          <a:chExt cx="0" cy="0"/>
-        </a:xfrm>
-      </p:grpSpPr>
-      <p:sp>
-        <p:nvSpPr>
-          <p:cNvPr id="2" name="Slide Image Placeholder 1"/>
-          <p:cNvSpPr>
-            <a:spLocks noGrp="1"/>
-          </p:cNvSpPr>
-          <p:nvPr>
-            <p:ph type="sldImg" idx="2"/>
-          </p:nvPr>
-        </p:nvSpPr>
-        <p:spPr/>
-      </p:sp>
-      <p:sp>
-        <p:nvSpPr>
-          <p:cNvPr id="3" name="Notes Placeholder 2"/>
-          <p:cNvSpPr>
-            <a:spLocks noGrp="1"/>
-          </p:cNvSpPr>
-          <p:nvPr>
-            <p:ph type="body" idx="3" sz="quarter"/>
-          </p:nvPr>
-        </p:nvSpPr>
-        <p:spPr/>
-        <p:txBody>
-          <a:bodyPr/>
-          <a:lstStyle/>
-          <a:p>
-            <a:r>
-              <a:t>介绍神经网络从被冷落到重新获得学术界关注的过程，为后来的深度学习爆发做铺垫。</a:t>
-            </a:r>
-          </a:p>
-        </p:txBody>
-      </p:sp>
-      <p:sp>
-        <p:nvSpPr>
-          <p:cNvPr id="4" name="Slide Number Placeholder 3"/>
-          <p:cNvSpPr>
-            <a:spLocks noGrp="1"/>
-          </p:cNvSpPr>
-          <p:nvPr>
-            <p:ph type="sldNum" idx="5" sz="quarter"/>
-          </p:nvPr>
-        </p:nvSpPr>
-        <p:spPr/>
-      </p:sp>
-    </p:spTree>
-  </p:cSld>
-  <p:clrMapOvr>
-    <a:masterClrMapping/>
-  </p:clrMapOvr>
-</p:notes>
-</file>
-
-<file path=ppt/notesSlides/notesSlide3.xml><?xml version="1.0" encoding="utf-8"?>
-<p:notes xmlns:a="http://schemas.openxmlformats.org/drawingml/2006/main" xmlns:p="http://schemas.openxmlformats.org/presentationml/2006/main" xmlns:r="http://schemas.openxmlformats.org/officeDocument/2006/relationships">
-  <p:cSld>
-    <p:spTree>
-      <p:nvGrpSpPr>
-        <p:cNvPr id="1" name=""/>
-        <p:cNvGrpSpPr/>
-        <p:nvPr/>
-      </p:nvGrpSpPr>
-      <p:grpSpPr>
-        <a:xfrm>
-          <a:off x="0" y="0"/>
-          <a:ext cx="0" cy="0"/>
-          <a:chOff x="0" y="0"/>
-          <a:chExt cx="0" cy="0"/>
-        </a:xfrm>
-      </p:grpSpPr>
-      <p:sp>
-        <p:nvSpPr>
-          <p:cNvPr id="2" name="Slide Image Placeholder 1"/>
-          <p:cNvSpPr>
-            <a:spLocks noGrp="1"/>
-          </p:cNvSpPr>
-          <p:nvPr>
-            <p:ph type="sldImg" idx="2"/>
-          </p:nvPr>
-        </p:nvSpPr>
-        <p:spPr/>
-      </p:sp>
-      <p:sp>
-        <p:nvSpPr>
-          <p:cNvPr id="3" name="Notes Placeholder 2"/>
-          <p:cNvSpPr>
-            <a:spLocks noGrp="1"/>
-          </p:cNvSpPr>
-          <p:nvPr>
-            <p:ph type="body" idx="3" sz="quarter"/>
-          </p:nvPr>
-        </p:nvSpPr>
-        <p:spPr/>
-        <p:txBody>
-          <a:bodyPr/>
-          <a:lstStyle/>
-          <a:p>
-            <a:r>
-              <a:t>分析深度学习在视觉和 NLP 领域的双重突破，揭示 Transformer 架构为何成为当今万物互联的技术底座。</a:t>
-            </a:r>
-          </a:p>
-        </p:txBody>
-      </p:sp>
-      <p:sp>
-        <p:nvSpPr>
-          <p:cNvPr id="4" name="Slide Number Placeholder 3"/>
-          <p:cNvSpPr>
-            <a:spLocks noGrp="1"/>
-          </p:cNvSpPr>
-          <p:nvPr>
-            <p:ph type="sldNum" idx="5" sz="quarter"/>
-          </p:nvPr>
-        </p:nvSpPr>
-        <p:spPr/>
-      </p:sp>
-    </p:spTree>
-  </p:cSld>
-  <p:clrMapOvr>
-    <a:masterClrMapping/>
-  </p:clrMapOvr>
-</p:notes>
-</file>
-
-<file path=ppt/notesSlides/notesSlide4.xml><?xml version="1.0" encoding="utf-8"?>
-<p:notes xmlns:a="http://schemas.openxmlformats.org/drawingml/2006/main" xmlns:p="http://schemas.openxmlformats.org/presentationml/2006/main" xmlns:r="http://schemas.openxmlformats.org/officeDocument/2006/relationships">
-  <p:cSld>
-    <p:spTree>
-      <p:nvGrpSpPr>
-        <p:cNvPr id="1" name=""/>
-        <p:cNvGrpSpPr/>
-        <p:nvPr/>
-      </p:nvGrpSpPr>
-      <p:grpSpPr>
-        <a:xfrm>
-          <a:off x="0" y="0"/>
-          <a:ext cx="0" cy="0"/>
-          <a:chOff x="0" y="0"/>
-          <a:chExt cx="0" cy="0"/>
-        </a:xfrm>
-      </p:grpSpPr>
-      <p:sp>
-        <p:nvSpPr>
-          <p:cNvPr id="2" name="Slide Image Placeholder 1"/>
-          <p:cNvSpPr>
-            <a:spLocks noGrp="1"/>
-          </p:cNvSpPr>
-          <p:nvPr>
-            <p:ph type="sldImg" idx="2"/>
-          </p:nvPr>
-        </p:nvSpPr>
-        <p:spPr/>
-      </p:sp>
-      <p:sp>
-        <p:nvSpPr>
-          <p:cNvPr id="3" name="Notes Placeholder 2"/>
-          <p:cNvSpPr>
-            <a:spLocks noGrp="1"/>
-          </p:cNvSpPr>
-          <p:nvPr>
-            <p:ph type="body" idx="3" sz="quarter"/>
-          </p:nvPr>
-        </p:nvSpPr>
-        <p:spPr/>
-        <p:txBody>
-          <a:bodyPr/>
-          <a:lstStyle/>
-          <a:p>
-            <a:r>
-              <a:t>旨在揭示胰岛素在人体内调取和储存能量的底层逻辑，以及不当饮食对代谢系统的长期损伤。</a:t>
-            </a:r>
-          </a:p>
-        </p:txBody>
-      </p:sp>
-      <p:sp>
-        <p:nvSpPr>
-          <p:cNvPr id="4" name="Slide Number Placeholder 3"/>
-          <p:cNvSpPr>
-            <a:spLocks noGrp="1"/>
-          </p:cNvSpPr>
-          <p:nvPr>
-            <p:ph type="sldNum" idx="5" sz="quarter"/>
-          </p:nvPr>
-        </p:nvSpPr>
-        <p:spPr/>
-      </p:sp>
-    </p:spTree>
-  </p:cSld>
-  <p:clrMapOvr>
-    <a:masterClrMapping/>
-  </p:clrMapOvr>
-</p:notes>
-</file>
-
-<file path=ppt/notesSlides/notesSlide5.xml><?xml version="1.0" encoding="utf-8"?>
-<p:notes xmlns:a="http://schemas.openxmlformats.org/drawingml/2006/main" xmlns:p="http://schemas.openxmlformats.org/presentationml/2006/main" xmlns:r="http://schemas.openxmlformats.org/officeDocument/2006/relationships">
-  <p:cSld>
-    <p:spTree>
-      <p:nvGrpSpPr>
-        <p:cNvPr id="1" name=""/>
-        <p:cNvGrpSpPr/>
-        <p:nvPr/>
-      </p:nvGrpSpPr>
-      <p:grpSpPr>
-        <a:xfrm>
-          <a:off x="0" y="0"/>
-          <a:ext cx="0" cy="0"/>
-          <a:chOff x="0" y="0"/>
-          <a:chExt cx="0" cy="0"/>
-        </a:xfrm>
-      </p:grpSpPr>
-      <p:sp>
-        <p:nvSpPr>
-          <p:cNvPr id="2" name="Slide Image Placeholder 1"/>
-          <p:cNvSpPr>
-            <a:spLocks noGrp="1"/>
-          </p:cNvSpPr>
-          <p:nvPr>
-            <p:ph type="sldImg" idx="2"/>
-          </p:nvPr>
-        </p:nvSpPr>
-        <p:spPr/>
-      </p:sp>
-      <p:sp>
-        <p:nvSpPr>
-          <p:cNvPr id="3" name="Notes Placeholder 2"/>
-          <p:cNvSpPr>
-            <a:spLocks noGrp="1"/>
-          </p:cNvSpPr>
-          <p:nvPr>
-            <p:ph type="body" idx="3" sz="quarter"/>
-          </p:nvPr>
-        </p:nvSpPr>
-        <p:spPr/>
-        <p:txBody>
-          <a:bodyPr/>
-          <a:lstStyle/>
-          <a:p>
-            <a:r>
-              <a:t>探讨如何从微观层面优化身体引擎，强调生活细节对生物学年龄的逆转作用。</a:t>
-            </a:r>
-          </a:p>
-        </p:txBody>
-      </p:sp>
-      <p:sp>
-        <p:nvSpPr>
-          <p:cNvPr id="4" name="Slide Number Placeholder 3"/>
-          <p:cNvSpPr>
-            <a:spLocks noGrp="1"/>
-          </p:cNvSpPr>
-          <p:nvPr>
-            <p:ph type="sldNum" idx="5" sz="quarter"/>
-          </p:nvPr>
-        </p:nvSpPr>
-        <p:spPr/>
-      </p:sp>
-    </p:spTree>
-  </p:cSld>
-  <p:clrMapOvr>
-    <a:masterClrMapping/>
-  </p:clrMapOvr>
-</p:notes>
-</file>
-
-<file path=ppt/notesSlides/notesSlide6.xml><?xml version="1.0" encoding="utf-8"?>
-<p:notes xmlns:a="http://schemas.openxmlformats.org/drawingml/2006/main" xmlns:p="http://schemas.openxmlformats.org/presentationml/2006/main" xmlns:r="http://schemas.openxmlformats.org/officeDocument/2006/relationships">
-  <p:cSld>
-    <p:spTree>
-      <p:nvGrpSpPr>
-        <p:cNvPr id="1" name=""/>
-        <p:cNvGrpSpPr/>
-        <p:nvPr/>
-      </p:nvGrpSpPr>
-      <p:grpSpPr>
-        <a:xfrm>
-          <a:off x="0" y="0"/>
-          <a:ext cx="0" cy="0"/>
-          <a:chOff x="0" y="0"/>
-          <a:chExt cx="0" cy="0"/>
-        </a:xfrm>
-      </p:grpSpPr>
-      <p:sp>
-        <p:nvSpPr>
-          <p:cNvPr id="2" name="Slide Image Placeholder 1"/>
-          <p:cNvSpPr>
-            <a:spLocks noGrp="1"/>
-          </p:cNvSpPr>
-          <p:nvPr>
-            <p:ph type="sldImg" idx="2"/>
-          </p:nvPr>
-        </p:nvSpPr>
-        <p:spPr/>
-      </p:sp>
-      <p:sp>
-        <p:nvSpPr>
-          <p:cNvPr id="3" name="Notes Placeholder 2"/>
-          <p:cNvSpPr>
-            <a:spLocks noGrp="1"/>
-          </p:cNvSpPr>
-          <p:nvPr>
-            <p:ph type="body" idx="3" sz="quarter"/>
-          </p:nvPr>
-        </p:nvSpPr>
-        <p:spPr/>
-        <p:txBody>
-          <a:bodyPr/>
-          <a:lstStyle/>
-          <a:p>
-            <a:r>
-              <a:t>本节重点讲解文艺复兴如何利用数学工具彻底改变了人类观察图像的方式。</a:t>
-            </a:r>
-          </a:p>
-        </p:txBody>
-      </p:sp>
-      <p:sp>
-        <p:nvSpPr>
-          <p:cNvPr id="4" name="Slide Number Placeholder 3"/>
-          <p:cNvSpPr>
-            <a:spLocks noGrp="1"/>
-          </p:cNvSpPr>
-          <p:nvPr>
-            <p:ph type="sldNum" idx="5" sz="quarter"/>
-          </p:nvPr>
-        </p:nvSpPr>
-        <p:spPr/>
-      </p:sp>
-    </p:spTree>
-  </p:cSld>
-  <p:clrMapOvr>
-    <a:masterClrMapping/>
-  </p:clrMapOvr>
-</p:notes>
-</file>
-
-<file path=ppt/notesSlides/notesSlide7.xml><?xml version="1.0" encoding="utf-8"?>
 <p:notes xmlns:a="http://schemas.openxmlformats.org/drawingml/2006/main" xmlns:p="http://schemas.openxmlformats.org/presentationml/2006/main" xmlns:r="http://schemas.openxmlformats.org/officeDocument/2006/relationships">
   <p:cSld>
     <p:spTree>
@@ -3942,7 +3579,7 @@
     <p:bg>
       <p:bgPr>
         <a:solidFill>
-          <a:srgbClr val="0A0A28"/>
+          <a:srgbClr val="FFFAF0"/>
         </a:solidFill>
         <a:effectLst/>
       </p:bgPr>
@@ -3972,11 +3609,11 @@
             <a:r>
               <a:rPr>
                 <a:solidFill>
-                  <a:srgbClr val="0066CC"/>
+                  <a:srgbClr val="C83296"/>
                 </a:solidFill>
-                <a:latin typeface="Arial"/>
+                <a:latin typeface="Verdana"/>
               </a:rPr>
-              <a:t>人工智能：从图灵测试到通用人工智能 (AGI)</a:t>
+              <a:t>透视与光影：文艺复兴艺术的技术巅峰</a:t>
             </a:r>
           </a:p>
         </p:txBody>
@@ -3999,11 +3636,11 @@
             <a:r>
               <a:rPr>
                 <a:solidFill>
-                  <a:srgbClr val="C8C8FF"/>
+                  <a:srgbClr val="3C283C"/>
                 </a:solidFill>
-                <a:latin typeface="Arial"/>
+                <a:latin typeface="Verdana"/>
               </a:rPr>
-              <a:t>Topic: AI的发展历史与未来趋势</a:t>
+              <a:t>Topic: 文艺复兴大师与技法深度赏析</a:t>
             </a:r>
           </a:p>
         </p:txBody>
@@ -4016,401 +3653,7 @@
 </p:sld>
 </file>
 
-<file path=ppt/slides/slide10.xml><?xml version="1.0" encoding="utf-8"?>
-<p:sld xmlns:a="http://schemas.openxmlformats.org/drawingml/2006/main" xmlns:p="http://schemas.openxmlformats.org/presentationml/2006/main" xmlns:r="http://schemas.openxmlformats.org/officeDocument/2006/relationships">
-  <p:cSld>
-    <p:bg>
-      <p:bgPr>
-        <a:solidFill>
-          <a:srgbClr val="F5FFFA"/>
-        </a:solidFill>
-        <a:effectLst/>
-      </p:bgPr>
-    </p:bg>
-    <p:spTree>
-      <p:nvGrpSpPr>
-        <p:cNvPr id="1" name=""/>
-        <p:cNvGrpSpPr/>
-        <p:nvPr/>
-      </p:nvGrpSpPr>
-      <p:grpSpPr/>
-      <p:sp>
-        <p:nvSpPr>
-          <p:cNvPr id="2" name="Title 1"/>
-          <p:cNvSpPr>
-            <a:spLocks noGrp="1"/>
-          </p:cNvSpPr>
-          <p:nvPr>
-            <p:ph type="title"/>
-          </p:nvPr>
-        </p:nvSpPr>
-        <p:spPr/>
-        <p:txBody>
-          <a:bodyPr/>
-          <a:lstStyle/>
-          <a:p>
-            <a:r>
-              <a:rPr>
-                <a:solidFill>
-                  <a:srgbClr val="228B22"/>
-                </a:solidFill>
-                <a:latin typeface="Georgia"/>
-              </a:rPr>
-              <a:t>胰岛素敏感性：健康的万能钥匙</a:t>
-            </a:r>
-          </a:p>
-        </p:txBody>
-      </p:sp>
-      <p:sp>
-        <p:nvSpPr>
-          <p:cNvPr id="3" name="Content Placeholder 2"/>
-          <p:cNvSpPr>
-            <a:spLocks noGrp="1"/>
-          </p:cNvSpPr>
-          <p:nvPr>
-            <p:ph idx="1"/>
-          </p:nvPr>
-        </p:nvSpPr>
-        <p:spPr/>
-        <p:txBody>
-          <a:bodyPr wrap="square"/>
-          <a:lstStyle/>
-          <a:p/>
-          <a:p>
-            <a:pPr/>
-            <a:r>
-              <a:rPr>
-                <a:solidFill>
-                  <a:srgbClr val="325032"/>
-                </a:solidFill>
-                <a:latin typeface="Georgia"/>
-              </a:rPr>
-              <a:t>胰岛素抵抗 (Insulin Resistance)：不仅是糖尿病前兆，更是 2 型糖尿病、多囊卵巢综合征 (PCOS) 的核心驱动因素。</a:t>
-            </a:r>
-          </a:p>
-          <a:p>
-            <a:pPr/>
-            <a:r>
-              <a:rPr>
-                <a:solidFill>
-                  <a:srgbClr val="325032"/>
-                </a:solidFill>
-                <a:latin typeface="Georgia"/>
-              </a:rPr>
-              <a:t>血糖波动的负面影响：餐后高血糖导致的糖基化终产物 (AGEs) 会加速血管内膜老化。</a:t>
-            </a:r>
-          </a:p>
-          <a:p>
-            <a:pPr/>
-            <a:r>
-              <a:rPr>
-                <a:solidFill>
-                  <a:srgbClr val="325032"/>
-                </a:solidFill>
-                <a:latin typeface="Georgia"/>
-              </a:rPr>
-              <a:t>低 GI 饮食策略：通过全谷物和高纤维摄入，维持血清能量供应的平滑曲线。</a:t>
-            </a:r>
-          </a:p>
-          <a:p>
-            <a:pPr/>
-            <a:r>
-              <a:rPr>
-                <a:solidFill>
-                  <a:srgbClr val="325032"/>
-                </a:solidFill>
-                <a:latin typeface="Georgia"/>
-              </a:rPr>
-              <a:t>动态血糖监测 (CGM)：现代医疗技术从盲目补给向实时精准控糖的转变。</a:t>
-            </a:r>
-          </a:p>
-        </p:txBody>
-      </p:sp>
-    </p:spTree>
-  </p:cSld>
-  <p:clrMapOvr>
-    <a:masterClrMapping/>
-  </p:clrMapOvr>
-</p:sld>
-</file>
-
-<file path=ppt/slides/slide11.xml><?xml version="1.0" encoding="utf-8"?>
-<p:sld xmlns:a="http://schemas.openxmlformats.org/drawingml/2006/main" xmlns:p="http://schemas.openxmlformats.org/presentationml/2006/main" xmlns:r="http://schemas.openxmlformats.org/officeDocument/2006/relationships">
-  <p:cSld>
-    <p:bg>
-      <p:bgPr>
-        <a:solidFill>
-          <a:srgbClr val="F5FFFA"/>
-        </a:solidFill>
-        <a:effectLst/>
-      </p:bgPr>
-    </p:bg>
-    <p:spTree>
-      <p:nvGrpSpPr>
-        <p:cNvPr id="1" name=""/>
-        <p:cNvGrpSpPr/>
-        <p:nvPr/>
-      </p:nvGrpSpPr>
-      <p:grpSpPr/>
-      <p:sp>
-        <p:nvSpPr>
-          <p:cNvPr id="2" name="Title 1"/>
-          <p:cNvSpPr>
-            <a:spLocks noGrp="1"/>
-          </p:cNvSpPr>
-          <p:nvPr>
-            <p:ph type="title"/>
-          </p:nvPr>
-        </p:nvSpPr>
-        <p:spPr/>
-        <p:txBody>
-          <a:bodyPr/>
-          <a:lstStyle/>
-          <a:p>
-            <a:r>
-              <a:rPr>
-                <a:solidFill>
-                  <a:srgbClr val="228B22"/>
-                </a:solidFill>
-                <a:latin typeface="Georgia"/>
-              </a:rPr>
-              <a:t>线粒体功能与抗炎生活方式</a:t>
-            </a:r>
-          </a:p>
-        </p:txBody>
-      </p:sp>
-      <p:sp>
-        <p:nvSpPr>
-          <p:cNvPr id="3" name="Text Placeholder 2"/>
-          <p:cNvSpPr>
-            <a:spLocks noGrp="1"/>
-          </p:cNvSpPr>
-          <p:nvPr>
-            <p:ph type="body" idx="1"/>
-          </p:nvPr>
-        </p:nvSpPr>
-        <p:spPr/>
-        <p:txBody>
-          <a:bodyPr/>
-          <a:lstStyle/>
-          <a:p/>
-        </p:txBody>
-      </p:sp>
-    </p:spTree>
-  </p:cSld>
-  <p:clrMapOvr>
-    <a:masterClrMapping/>
-  </p:clrMapOvr>
-</p:sld>
-</file>
-
-<file path=ppt/slides/slide12.xml><?xml version="1.0" encoding="utf-8"?>
-<p:sld xmlns:a="http://schemas.openxmlformats.org/drawingml/2006/main" xmlns:p="http://schemas.openxmlformats.org/presentationml/2006/main" xmlns:r="http://schemas.openxmlformats.org/officeDocument/2006/relationships">
-  <p:cSld>
-    <p:bg>
-      <p:bgPr>
-        <a:solidFill>
-          <a:srgbClr val="F5FFFA"/>
-        </a:solidFill>
-        <a:effectLst/>
-      </p:bgPr>
-    </p:bg>
-    <p:spTree>
-      <p:nvGrpSpPr>
-        <p:cNvPr id="1" name=""/>
-        <p:cNvGrpSpPr/>
-        <p:nvPr/>
-      </p:nvGrpSpPr>
-      <p:grpSpPr/>
-      <p:sp>
-        <p:nvSpPr>
-          <p:cNvPr id="2" name="Title 1"/>
-          <p:cNvSpPr>
-            <a:spLocks noGrp="1"/>
-          </p:cNvSpPr>
-          <p:nvPr>
-            <p:ph type="title"/>
-          </p:nvPr>
-        </p:nvSpPr>
-        <p:spPr/>
-        <p:txBody>
-          <a:bodyPr/>
-          <a:lstStyle/>
-          <a:p>
-            <a:r>
-              <a:rPr>
-                <a:solidFill>
-                  <a:srgbClr val="228B22"/>
-                </a:solidFill>
-                <a:latin typeface="Georgia"/>
-              </a:rPr>
-              <a:t>线粒体：细胞的能量工厂</a:t>
-            </a:r>
-          </a:p>
-        </p:txBody>
-      </p:sp>
-      <p:sp>
-        <p:nvSpPr>
-          <p:cNvPr id="3" name="Content Placeholder 2"/>
-          <p:cNvSpPr>
-            <a:spLocks noGrp="1"/>
-          </p:cNvSpPr>
-          <p:nvPr>
-            <p:ph idx="1"/>
-          </p:nvPr>
-        </p:nvSpPr>
-        <p:spPr/>
-        <p:txBody>
-          <a:bodyPr wrap="square"/>
-          <a:lstStyle/>
-          <a:p/>
-          <a:p>
-            <a:pPr/>
-            <a:r>
-              <a:rPr>
-                <a:solidFill>
-                  <a:srgbClr val="325032"/>
-                </a:solidFill>
-                <a:latin typeface="Georgia"/>
-              </a:rPr>
-              <a:t>线粒体自噬 (Mitophagy)：通过断食或高强度间歇训练 (HIIT) 触发坏死线粒体的自我清理。</a:t>
-            </a:r>
-          </a:p>
-          <a:p>
-            <a:pPr/>
-            <a:r>
-              <a:rPr>
-                <a:solidFill>
-                  <a:srgbClr val="325032"/>
-                </a:solidFill>
-                <a:latin typeface="Georgia"/>
-              </a:rPr>
-              <a:t>氧化压力与抗氧化平衡：SOD 等内源性酶在抵御超氧阴离子自由基中的核心作用。</a:t>
-            </a:r>
-          </a:p>
-          <a:p>
-            <a:pPr/>
-            <a:r>
-              <a:rPr>
-                <a:solidFill>
-                  <a:srgbClr val="325032"/>
-                </a:solidFill>
-                <a:latin typeface="Georgia"/>
-              </a:rPr>
-              <a:t>睡眠与线粒体修复：深度睡眠期是大脑清除代谢废物（β-淀粉样蛋白）的唯一窗口期。</a:t>
-            </a:r>
-          </a:p>
-          <a:p>
-            <a:pPr/>
-            <a:r>
-              <a:rPr>
-                <a:solidFill>
-                  <a:srgbClr val="325032"/>
-                </a:solidFill>
-                <a:latin typeface="Georgia"/>
-              </a:rPr>
-              <a:t>Omega-3s 的抗炎机制：通过调节细胞膜流动性来降低慢性系统性炎症水平。</a:t>
-            </a:r>
-          </a:p>
-        </p:txBody>
-      </p:sp>
-    </p:spTree>
-  </p:cSld>
-  <p:clrMapOvr>
-    <a:masterClrMapping/>
-  </p:clrMapOvr>
-</p:sld>
-</file>
-
-<file path=ppt/slides/slide13.xml><?xml version="1.0" encoding="utf-8"?>
-<p:sld xmlns:a="http://schemas.openxmlformats.org/drawingml/2006/main" xmlns:p="http://schemas.openxmlformats.org/presentationml/2006/main" xmlns:r="http://schemas.openxmlformats.org/officeDocument/2006/relationships">
-  <p:cSld>
-    <p:spTree>
-      <p:nvGrpSpPr>
-        <p:cNvPr id="1" name=""/>
-        <p:cNvGrpSpPr/>
-        <p:nvPr/>
-      </p:nvGrpSpPr>
-      <p:grpSpPr/>
-      <p:sp>
-        <p:nvSpPr>
-          <p:cNvPr id="2" name="Title 1"/>
-          <p:cNvSpPr>
-            <a:spLocks noGrp="1"/>
-          </p:cNvSpPr>
-          <p:nvPr>
-            <p:ph type="title"/>
-          </p:nvPr>
-        </p:nvSpPr>
-        <p:spPr/>
-        <p:txBody>
-          <a:bodyPr/>
-          <a:lstStyle/>
-          <a:p>
-            <a:r>
-              <a:t>References</a:t>
-            </a:r>
-          </a:p>
-        </p:txBody>
-      </p:sp>
-      <p:sp>
-        <p:nvSpPr>
-          <p:cNvPr id="3" name="Content Placeholder 2"/>
-          <p:cNvSpPr>
-            <a:spLocks noGrp="1"/>
-          </p:cNvSpPr>
-          <p:nvPr>
-            <p:ph idx="1"/>
-          </p:nvPr>
-        </p:nvSpPr>
-        <p:spPr/>
-        <p:txBody>
-          <a:bodyPr/>
-          <a:lstStyle/>
-          <a:p/>
-          <a:p>
-            <a:pPr>
-              <a:defRPr sz="1200"/>
-            </a:pPr>
-            <a:r>
-              <a:t>https://www.nih.gov/</a:t>
-            </a:r>
-          </a:p>
-          <a:p>
-            <a:pPr>
-              <a:defRPr sz="1200"/>
-            </a:pPr>
-            <a:r>
-              <a:t>https://scholar.google.com/</a:t>
-            </a:r>
-          </a:p>
-          <a:p>
-            <a:pPr>
-              <a:defRPr sz="1200"/>
-            </a:pPr>
-            <a:r>
-              <a:t>https://www.jstor.org/</a:t>
-            </a:r>
-          </a:p>
-          <a:p>
-            <a:pPr>
-              <a:defRPr sz="1200"/>
-            </a:pPr>
-            <a:r>
-              <a:t>https://en.wikipedia.org/wiki/Main_Page</a:t>
-            </a:r>
-          </a:p>
-        </p:txBody>
-      </p:sp>
-    </p:spTree>
-  </p:cSld>
-  <p:clrMapOvr>
-    <a:masterClrMapping/>
-  </p:clrMapOvr>
-</p:sld>
-</file>
-
-<file path=ppt/slides/slide14.xml><?xml version="1.0" encoding="utf-8"?>
+<file path=ppt/slides/slide2.xml><?xml version="1.0" encoding="utf-8"?>
 <p:sld xmlns:a="http://schemas.openxmlformats.org/drawingml/2006/main" xmlns:p="http://schemas.openxmlformats.org/presentationml/2006/main" xmlns:r="http://schemas.openxmlformats.org/officeDocument/2006/relationships">
   <p:cSld>
     <p:bg>
@@ -4435,7 +3678,7 @@
             <a:spLocks noGrp="1"/>
           </p:cNvSpPr>
           <p:nvPr>
-            <p:ph type="ctrTitle"/>
+            <p:ph type="title"/>
           </p:nvPr>
         </p:nvSpPr>
         <p:spPr/>
@@ -4450,36 +3693,26 @@
                 </a:solidFill>
                 <a:latin typeface="Verdana"/>
               </a:rPr>
-              <a:t>透视与光影：文艺复兴艺术的技术巅峰</a:t>
-            </a:r>
-          </a:p>
-        </p:txBody>
-      </p:sp>
-      <p:sp>
-        <p:nvSpPr>
-          <p:cNvPr id="3" name="Subtitle 2"/>
-          <p:cNvSpPr>
-            <a:spLocks noGrp="1"/>
-          </p:cNvSpPr>
-          <p:nvPr>
-            <p:ph type="subTitle" idx="1"/>
-          </p:nvPr>
-        </p:nvSpPr>
-        <p:spPr/>
-        <p:txBody>
-          <a:bodyPr/>
-          <a:lstStyle/>
-          <a:p>
-            <a:r>
-              <a:rPr>
-                <a:solidFill>
-                  <a:srgbClr val="3C283C"/>
-                </a:solidFill>
-                <a:latin typeface="Verdana"/>
-              </a:rPr>
-              <a:t>Topic: 文艺复兴大师与技法深度赏析</a:t>
-            </a:r>
-          </a:p>
+              <a:t>科学写实主义的黄金时代</a:t>
+            </a:r>
+          </a:p>
+        </p:txBody>
+      </p:sp>
+      <p:sp>
+        <p:nvSpPr>
+          <p:cNvPr id="3" name="Text Placeholder 2"/>
+          <p:cNvSpPr>
+            <a:spLocks noGrp="1"/>
+          </p:cNvSpPr>
+          <p:nvPr>
+            <p:ph type="body" idx="1"/>
+          </p:nvPr>
+        </p:nvSpPr>
+        <p:spPr/>
+        <p:txBody>
+          <a:bodyPr/>
+          <a:lstStyle/>
+          <a:p/>
         </p:txBody>
       </p:sp>
     </p:spTree>
@@ -4490,7 +3723,7 @@
 </p:sld>
 </file>
 
-<file path=ppt/slides/slide15.xml><?xml version="1.0" encoding="utf-8"?>
+<file path=ppt/slides/slide3.xml><?xml version="1.0" encoding="utf-8"?>
 <p:sld xmlns:a="http://schemas.openxmlformats.org/drawingml/2006/main" xmlns:p="http://schemas.openxmlformats.org/presentationml/2006/main" xmlns:r="http://schemas.openxmlformats.org/officeDocument/2006/relationships">
   <p:cSld>
     <p:bg>
@@ -4530,26 +3763,74 @@
                 </a:solidFill>
                 <a:latin typeface="Verdana"/>
               </a:rPr>
-              <a:t>科学写实主义的黄金时代</a:t>
-            </a:r>
-          </a:p>
-        </p:txBody>
-      </p:sp>
-      <p:sp>
-        <p:nvSpPr>
-          <p:cNvPr id="3" name="Text Placeholder 2"/>
-          <p:cNvSpPr>
-            <a:spLocks noGrp="1"/>
-          </p:cNvSpPr>
-          <p:nvPr>
-            <p:ph type="body" idx="1"/>
-          </p:nvPr>
-        </p:nvSpPr>
-        <p:spPr/>
-        <p:txBody>
-          <a:bodyPr/>
+              <a:t>数学视角的引入：线性透视法</a:t>
+            </a:r>
+          </a:p>
+        </p:txBody>
+      </p:sp>
+      <p:sp>
+        <p:nvSpPr>
+          <p:cNvPr id="3" name="Content Placeholder 2"/>
+          <p:cNvSpPr>
+            <a:spLocks noGrp="1"/>
+          </p:cNvSpPr>
+          <p:nvPr>
+            <p:ph idx="1"/>
+          </p:nvPr>
+        </p:nvSpPr>
+        <p:spPr/>
+        <p:txBody>
+          <a:bodyPr wrap="square"/>
           <a:lstStyle/>
           <a:p/>
+          <a:p>
+            <a:pPr/>
+            <a:r>
+              <a:rPr>
+                <a:solidFill>
+                  <a:srgbClr val="3C283C"/>
+                </a:solidFill>
+                <a:latin typeface="Verdana"/>
+              </a:rPr>
+              <a:t>布鲁内莱斯基的发现：通过数学消失点 (Vanishing Point) 在二维平面还原三维物理空间。</a:t>
+            </a:r>
+          </a:p>
+          <a:p>
+            <a:pPr/>
+            <a:r>
+              <a:rPr>
+                <a:solidFill>
+                  <a:srgbClr val="3C283C"/>
+                </a:solidFill>
+                <a:latin typeface="Verdana"/>
+              </a:rPr>
+              <a:t>马萨乔的《圣三一》：西方艺术史上第一张严格遵循线性透视规则的大型湿壁画。</a:t>
+            </a:r>
+          </a:p>
+          <a:p>
+            <a:pPr/>
+            <a:r>
+              <a:rPr>
+                <a:solidFill>
+                  <a:srgbClr val="3C283C"/>
+                </a:solidFill>
+                <a:latin typeface="Verdana"/>
+              </a:rPr>
+              <a:t>缩短透视法 (Foreshortening)：使人体部位垂直于画平面，产生强烈的立体压缩感。</a:t>
+            </a:r>
+          </a:p>
+          <a:p>
+            <a:pPr/>
+            <a:r>
+              <a:rPr>
+                <a:solidFill>
+                  <a:srgbClr val="3C283C"/>
+                </a:solidFill>
+                <a:latin typeface="Verdana"/>
+              </a:rPr>
+              <a:t>艺术与科学的深度融合：艺术家由单纯的工匠转变为具备解剖学与光学知识的知识分子。</a:t>
+            </a:r>
+          </a:p>
         </p:txBody>
       </p:sp>
     </p:spTree>
@@ -4560,7 +3841,7 @@
 </p:sld>
 </file>
 
-<file path=ppt/slides/slide16.xml><?xml version="1.0" encoding="utf-8"?>
+<file path=ppt/slides/slide4.xml><?xml version="1.0" encoding="utf-8"?>
 <p:sld xmlns:a="http://schemas.openxmlformats.org/drawingml/2006/main" xmlns:p="http://schemas.openxmlformats.org/presentationml/2006/main" xmlns:r="http://schemas.openxmlformats.org/officeDocument/2006/relationships">
   <p:cSld>
     <p:bg>
@@ -4600,74 +3881,26 @@
                 </a:solidFill>
                 <a:latin typeface="Verdana"/>
               </a:rPr>
-              <a:t>数学视角的引入：线性透视法</a:t>
-            </a:r>
-          </a:p>
-        </p:txBody>
-      </p:sp>
-      <p:sp>
-        <p:nvSpPr>
-          <p:cNvPr id="3" name="Content Placeholder 2"/>
-          <p:cNvSpPr>
-            <a:spLocks noGrp="1"/>
-          </p:cNvSpPr>
-          <p:nvPr>
-            <p:ph idx="1"/>
-          </p:nvPr>
-        </p:nvSpPr>
-        <p:spPr/>
-        <p:txBody>
-          <a:bodyPr wrap="square"/>
+              <a:t>达芬奇与威尼斯画派的色彩革命</a:t>
+            </a:r>
+          </a:p>
+        </p:txBody>
+      </p:sp>
+      <p:sp>
+        <p:nvSpPr>
+          <p:cNvPr id="3" name="Text Placeholder 2"/>
+          <p:cNvSpPr>
+            <a:spLocks noGrp="1"/>
+          </p:cNvSpPr>
+          <p:nvPr>
+            <p:ph type="body" idx="1"/>
+          </p:nvPr>
+        </p:nvSpPr>
+        <p:spPr/>
+        <p:txBody>
+          <a:bodyPr/>
           <a:lstStyle/>
           <a:p/>
-          <a:p>
-            <a:pPr/>
-            <a:r>
-              <a:rPr>
-                <a:solidFill>
-                  <a:srgbClr val="3C283C"/>
-                </a:solidFill>
-                <a:latin typeface="Verdana"/>
-              </a:rPr>
-              <a:t>布鲁内莱斯基的发现：通过数学消失点 (Vanishing Point) 在二维平面还原三维物理空间。</a:t>
-            </a:r>
-          </a:p>
-          <a:p>
-            <a:pPr/>
-            <a:r>
-              <a:rPr>
-                <a:solidFill>
-                  <a:srgbClr val="3C283C"/>
-                </a:solidFill>
-                <a:latin typeface="Verdana"/>
-              </a:rPr>
-              <a:t>马萨乔的《圣三一》：西方艺术史上第一张严格遵循线性透视规则的大型湿壁画。</a:t>
-            </a:r>
-          </a:p>
-          <a:p>
-            <a:pPr/>
-            <a:r>
-              <a:rPr>
-                <a:solidFill>
-                  <a:srgbClr val="3C283C"/>
-                </a:solidFill>
-                <a:latin typeface="Verdana"/>
-              </a:rPr>
-              <a:t>缩短透视法 (Foreshortening)：使人体部位垂直于画平面，产生强烈的立体压缩感。</a:t>
-            </a:r>
-          </a:p>
-          <a:p>
-            <a:pPr/>
-            <a:r>
-              <a:rPr>
-                <a:solidFill>
-                  <a:srgbClr val="3C283C"/>
-                </a:solidFill>
-                <a:latin typeface="Verdana"/>
-              </a:rPr>
-              <a:t>艺术与科学的深度融合：艺术家由单纯的工匠转变为具备解剖学与光学知识的知识分子。</a:t>
-            </a:r>
-          </a:p>
         </p:txBody>
       </p:sp>
     </p:spTree>
@@ -4678,7 +3911,7 @@
 </p:sld>
 </file>
 
-<file path=ppt/slides/slide17.xml><?xml version="1.0" encoding="utf-8"?>
+<file path=ppt/slides/slide5.xml><?xml version="1.0" encoding="utf-8"?>
 <p:sld xmlns:a="http://schemas.openxmlformats.org/drawingml/2006/main" xmlns:p="http://schemas.openxmlformats.org/presentationml/2006/main" xmlns:r="http://schemas.openxmlformats.org/officeDocument/2006/relationships">
   <p:cSld>
     <p:bg>
@@ -4718,76 +3951,6 @@
                 </a:solidFill>
                 <a:latin typeface="Verdana"/>
               </a:rPr>
-              <a:t>达芬奇与威尼斯画派的色彩革命</a:t>
-            </a:r>
-          </a:p>
-        </p:txBody>
-      </p:sp>
-      <p:sp>
-        <p:nvSpPr>
-          <p:cNvPr id="3" name="Text Placeholder 2"/>
-          <p:cNvSpPr>
-            <a:spLocks noGrp="1"/>
-          </p:cNvSpPr>
-          <p:nvPr>
-            <p:ph type="body" idx="1"/>
-          </p:nvPr>
-        </p:nvSpPr>
-        <p:spPr/>
-        <p:txBody>
-          <a:bodyPr/>
-          <a:lstStyle/>
-          <a:p/>
-        </p:txBody>
-      </p:sp>
-    </p:spTree>
-  </p:cSld>
-  <p:clrMapOvr>
-    <a:masterClrMapping/>
-  </p:clrMapOvr>
-</p:sld>
-</file>
-
-<file path=ppt/slides/slide18.xml><?xml version="1.0" encoding="utf-8"?>
-<p:sld xmlns:a="http://schemas.openxmlformats.org/drawingml/2006/main" xmlns:p="http://schemas.openxmlformats.org/presentationml/2006/main" xmlns:r="http://schemas.openxmlformats.org/officeDocument/2006/relationships">
-  <p:cSld>
-    <p:bg>
-      <p:bgPr>
-        <a:solidFill>
-          <a:srgbClr val="FFFAF0"/>
-        </a:solidFill>
-        <a:effectLst/>
-      </p:bgPr>
-    </p:bg>
-    <p:spTree>
-      <p:nvGrpSpPr>
-        <p:cNvPr id="1" name=""/>
-        <p:cNvGrpSpPr/>
-        <p:nvPr/>
-      </p:nvGrpSpPr>
-      <p:grpSpPr/>
-      <p:sp>
-        <p:nvSpPr>
-          <p:cNvPr id="2" name="Title 1"/>
-          <p:cNvSpPr>
-            <a:spLocks noGrp="1"/>
-          </p:cNvSpPr>
-          <p:nvPr>
-            <p:ph type="title"/>
-          </p:nvPr>
-        </p:nvSpPr>
-        <p:spPr/>
-        <p:txBody>
-          <a:bodyPr/>
-          <a:lstStyle/>
-          <a:p>
-            <a:r>
-              <a:rPr>
-                <a:solidFill>
-                  <a:srgbClr val="C83296"/>
-                </a:solidFill>
-                <a:latin typeface="Verdana"/>
-              </a:rPr>
               <a:t>晕涂法与大气透视</a:t>
             </a:r>
           </a:p>
@@ -4856,470 +4019,6 @@
               <a:t>明暗对照法 (Chiaroscuro)：利用极端的光源对比，增强人物的情感张力与体积感。</a:t>
             </a:r>
           </a:p>
-        </p:txBody>
-      </p:sp>
-    </p:spTree>
-  </p:cSld>
-  <p:clrMapOvr>
-    <a:masterClrMapping/>
-  </p:clrMapOvr>
-</p:sld>
-</file>
-
-<file path=ppt/slides/slide19.xml><?xml version="1.0" encoding="utf-8"?>
-<p:sld xmlns:a="http://schemas.openxmlformats.org/drawingml/2006/main" xmlns:p="http://schemas.openxmlformats.org/presentationml/2006/main" xmlns:r="http://schemas.openxmlformats.org/officeDocument/2006/relationships">
-  <p:cSld>
-    <p:spTree>
-      <p:nvGrpSpPr>
-        <p:cNvPr id="1" name=""/>
-        <p:cNvGrpSpPr/>
-        <p:nvPr/>
-      </p:nvGrpSpPr>
-      <p:grpSpPr/>
-      <p:sp>
-        <p:nvSpPr>
-          <p:cNvPr id="2" name="Title 1"/>
-          <p:cNvSpPr>
-            <a:spLocks noGrp="1"/>
-          </p:cNvSpPr>
-          <p:nvPr>
-            <p:ph type="title"/>
-          </p:nvPr>
-        </p:nvSpPr>
-        <p:spPr/>
-        <p:txBody>
-          <a:bodyPr/>
-          <a:lstStyle/>
-          <a:p>
-            <a:r>
-              <a:t>References</a:t>
-            </a:r>
-          </a:p>
-        </p:txBody>
-      </p:sp>
-      <p:sp>
-        <p:nvSpPr>
-          <p:cNvPr id="3" name="Content Placeholder 2"/>
-          <p:cNvSpPr>
-            <a:spLocks noGrp="1"/>
-          </p:cNvSpPr>
-          <p:nvPr>
-            <p:ph idx="1"/>
-          </p:nvPr>
-        </p:nvSpPr>
-        <p:spPr/>
-        <p:txBody>
-          <a:bodyPr/>
-          <a:lstStyle/>
-          <a:p/>
-          <a:p>
-            <a:pPr>
-              <a:defRPr sz="1200"/>
-            </a:pPr>
-            <a:r>
-              <a:t>https://www.nih.gov/</a:t>
-            </a:r>
-          </a:p>
-          <a:p>
-            <a:pPr>
-              <a:defRPr sz="1200"/>
-            </a:pPr>
-            <a:r>
-              <a:t>https://scholar.google.com/</a:t>
-            </a:r>
-          </a:p>
-          <a:p>
-            <a:pPr>
-              <a:defRPr sz="1200"/>
-            </a:pPr>
-            <a:r>
-              <a:t>https://www.jstor.org/</a:t>
-            </a:r>
-          </a:p>
-          <a:p>
-            <a:pPr>
-              <a:defRPr sz="1200"/>
-            </a:pPr>
-            <a:r>
-              <a:t>https://en.wikipedia.org/wiki/Main_Page</a:t>
-            </a:r>
-          </a:p>
-        </p:txBody>
-      </p:sp>
-    </p:spTree>
-  </p:cSld>
-  <p:clrMapOvr>
-    <a:masterClrMapping/>
-  </p:clrMapOvr>
-</p:sld>
-</file>
-
-<file path=ppt/slides/slide2.xml><?xml version="1.0" encoding="utf-8"?>
-<p:sld xmlns:a="http://schemas.openxmlformats.org/drawingml/2006/main" xmlns:p="http://schemas.openxmlformats.org/presentationml/2006/main" xmlns:r="http://schemas.openxmlformats.org/officeDocument/2006/relationships">
-  <p:cSld>
-    <p:bg>
-      <p:bgPr>
-        <a:solidFill>
-          <a:srgbClr val="0A0A28"/>
-        </a:solidFill>
-        <a:effectLst/>
-      </p:bgPr>
-    </p:bg>
-    <p:spTree>
-      <p:nvGrpSpPr>
-        <p:cNvPr id="1" name=""/>
-        <p:cNvGrpSpPr/>
-        <p:nvPr/>
-      </p:nvGrpSpPr>
-      <p:grpSpPr/>
-      <p:sp>
-        <p:nvSpPr>
-          <p:cNvPr id="2" name="Title 1"/>
-          <p:cNvSpPr>
-            <a:spLocks noGrp="1"/>
-          </p:cNvSpPr>
-          <p:nvPr>
-            <p:ph type="title"/>
-          </p:nvPr>
-        </p:nvSpPr>
-        <p:spPr/>
-        <p:txBody>
-          <a:bodyPr/>
-          <a:lstStyle/>
-          <a:p>
-            <a:r>
-              <a:rPr>
-                <a:solidFill>
-                  <a:srgbClr val="0066CC"/>
-                </a:solidFill>
-                <a:latin typeface="Arial"/>
-              </a:rPr>
-              <a:t>计算智能的起源与逻辑奠基 (1950-1980)</a:t>
-            </a:r>
-          </a:p>
-        </p:txBody>
-      </p:sp>
-      <p:sp>
-        <p:nvSpPr>
-          <p:cNvPr id="3" name="Text Placeholder 2"/>
-          <p:cNvSpPr>
-            <a:spLocks noGrp="1"/>
-          </p:cNvSpPr>
-          <p:nvPr>
-            <p:ph type="body" idx="1"/>
-          </p:nvPr>
-        </p:nvSpPr>
-        <p:spPr/>
-        <p:txBody>
-          <a:bodyPr/>
-          <a:lstStyle/>
-          <a:p/>
-        </p:txBody>
-      </p:sp>
-    </p:spTree>
-  </p:cSld>
-  <p:clrMapOvr>
-    <a:masterClrMapping/>
-  </p:clrMapOvr>
-</p:sld>
-</file>
-
-<file path=ppt/slides/slide3.xml><?xml version="1.0" encoding="utf-8"?>
-<p:sld xmlns:a="http://schemas.openxmlformats.org/drawingml/2006/main" xmlns:p="http://schemas.openxmlformats.org/presentationml/2006/main" xmlns:r="http://schemas.openxmlformats.org/officeDocument/2006/relationships">
-  <p:cSld>
-    <p:bg>
-      <p:bgPr>
-        <a:solidFill>
-          <a:srgbClr val="0A0A28"/>
-        </a:solidFill>
-        <a:effectLst/>
-      </p:bgPr>
-    </p:bg>
-    <p:spTree>
-      <p:nvGrpSpPr>
-        <p:cNvPr id="1" name=""/>
-        <p:cNvGrpSpPr/>
-        <p:nvPr/>
-      </p:nvGrpSpPr>
-      <p:grpSpPr/>
-      <p:sp>
-        <p:nvSpPr>
-          <p:cNvPr id="2" name="Title 1"/>
-          <p:cNvSpPr>
-            <a:spLocks noGrp="1"/>
-          </p:cNvSpPr>
-          <p:nvPr>
-            <p:ph type="title"/>
-          </p:nvPr>
-        </p:nvSpPr>
-        <p:spPr/>
-        <p:txBody>
-          <a:bodyPr/>
-          <a:lstStyle/>
-          <a:p>
-            <a:r>
-              <a:rPr>
-                <a:solidFill>
-                  <a:srgbClr val="0066CC"/>
-                </a:solidFill>
-                <a:latin typeface="Arial"/>
-              </a:rPr>
-              <a:t>图灵测试与符号 AI 的诞生</a:t>
-            </a:r>
-          </a:p>
-        </p:txBody>
-      </p:sp>
-      <p:sp>
-        <p:nvSpPr>
-          <p:cNvPr id="3" name="Content Placeholder 2"/>
-          <p:cNvSpPr>
-            <a:spLocks noGrp="1"/>
-          </p:cNvSpPr>
-          <p:nvPr>
-            <p:ph idx="1"/>
-          </p:nvPr>
-        </p:nvSpPr>
-        <p:spPr/>
-        <p:txBody>
-          <a:bodyPr wrap="square"/>
-          <a:lstStyle/>
-          <a:p/>
-          <a:p>
-            <a:pPr/>
-            <a:r>
-              <a:rPr>
-                <a:solidFill>
-                  <a:srgbClr val="C8C8FF"/>
-                </a:solidFill>
-                <a:latin typeface="Arial"/>
-              </a:rPr>
-              <a:t>1950年：阿兰·图灵发表《计算机器与智能》，提出著名的“图灵测试” (Turing Test)。</a:t>
-            </a:r>
-          </a:p>
-          <a:p>
-            <a:pPr/>
-            <a:r>
-              <a:rPr>
-                <a:solidFill>
-                  <a:srgbClr val="C8C8FF"/>
-                </a:solidFill>
-                <a:latin typeface="Arial"/>
-              </a:rPr>
-              <a:t>1956年：达特茅斯会议 (Dartmouth Workshop) 正式确立“人工智能”学科，麦卡锡、明斯基等人为学科领袖。</a:t>
-            </a:r>
-          </a:p>
-          <a:p>
-            <a:pPr/>
-            <a:r>
-              <a:rPr>
-                <a:solidFill>
-                  <a:srgbClr val="C8C8FF"/>
-                </a:solidFill>
-                <a:latin typeface="Arial"/>
-              </a:rPr>
-              <a:t>逻辑主义时代：基于规则的专家系统（如 MYCIN）在特定医疗诊断领域取得初步成功。</a:t>
-            </a:r>
-          </a:p>
-          <a:p>
-            <a:pPr/>
-            <a:r>
-              <a:rPr>
-                <a:solidFill>
-                  <a:srgbClr val="C8C8FF"/>
-                </a:solidFill>
-                <a:latin typeface="Arial"/>
-              </a:rPr>
-              <a:t>瓶颈出现：早期 AI 难以处理模糊信息，导致70年代中期进入第一个“AI 冬天”。</a:t>
-            </a:r>
-          </a:p>
-        </p:txBody>
-      </p:sp>
-    </p:spTree>
-  </p:cSld>
-  <p:clrMapOvr>
-    <a:masterClrMapping/>
-  </p:clrMapOvr>
-</p:sld>
-</file>
-
-<file path=ppt/slides/slide4.xml><?xml version="1.0" encoding="utf-8"?>
-<p:sld xmlns:a="http://schemas.openxmlformats.org/drawingml/2006/main" xmlns:p="http://schemas.openxmlformats.org/presentationml/2006/main" xmlns:r="http://schemas.openxmlformats.org/officeDocument/2006/relationships">
-  <p:cSld>
-    <p:bg>
-      <p:bgPr>
-        <a:solidFill>
-          <a:srgbClr val="0A0A28"/>
-        </a:solidFill>
-        <a:effectLst/>
-      </p:bgPr>
-    </p:bg>
-    <p:spTree>
-      <p:nvGrpSpPr>
-        <p:cNvPr id="1" name=""/>
-        <p:cNvGrpSpPr/>
-        <p:nvPr/>
-      </p:nvGrpSpPr>
-      <p:grpSpPr/>
-      <p:sp>
-        <p:nvSpPr>
-          <p:cNvPr id="2" name="Title 1"/>
-          <p:cNvSpPr>
-            <a:spLocks noGrp="1"/>
-          </p:cNvSpPr>
-          <p:nvPr>
-            <p:ph type="title"/>
-          </p:nvPr>
-        </p:nvSpPr>
-        <p:spPr/>
-        <p:txBody>
-          <a:bodyPr/>
-          <a:lstStyle/>
-          <a:p>
-            <a:r>
-              <a:rPr>
-                <a:solidFill>
-                  <a:srgbClr val="0066CC"/>
-                </a:solidFill>
-                <a:latin typeface="Arial"/>
-              </a:rPr>
-              <a:t>联结主义与神经网络的复兴</a:t>
-            </a:r>
-          </a:p>
-        </p:txBody>
-      </p:sp>
-      <p:sp>
-        <p:nvSpPr>
-          <p:cNvPr id="3" name="Content Placeholder 2"/>
-          <p:cNvSpPr>
-            <a:spLocks noGrp="1"/>
-          </p:cNvSpPr>
-          <p:nvPr>
-            <p:ph idx="1"/>
-          </p:nvPr>
-        </p:nvSpPr>
-        <p:spPr/>
-        <p:txBody>
-          <a:bodyPr wrap="square"/>
-          <a:lstStyle/>
-          <a:p/>
-          <a:p>
-            <a:pPr/>
-            <a:r>
-              <a:rPr>
-                <a:solidFill>
-                  <a:srgbClr val="C8C8FF"/>
-                </a:solidFill>
-                <a:latin typeface="Arial"/>
-              </a:rPr>
-              <a:t>1986年：Rumelhart 提出反向传播算法 (Backpropagation)，解决了多层感知器的训练难题。</a:t>
-            </a:r>
-          </a:p>
-          <a:p>
-            <a:pPr/>
-            <a:r>
-              <a:rPr>
-                <a:solidFill>
-                  <a:srgbClr val="C8C8FF"/>
-                </a:solidFill>
-                <a:latin typeface="Arial"/>
-              </a:rPr>
-              <a:t>统计学习方法崛起：SVM 与随机森林在90年代成为机器学习的主流工具。</a:t>
-            </a:r>
-          </a:p>
-          <a:p>
-            <a:pPr/>
-            <a:r>
-              <a:rPr>
-                <a:solidFill>
-                  <a:srgbClr val="C8C8FF"/>
-                </a:solidFill>
-                <a:latin typeface="Arial"/>
-              </a:rPr>
-              <a:t>GPU 计算能力的增强：为复杂的矩阵运算提供了硬件基础，神经网络的研究重心逐渐转向深度化。</a:t>
-            </a:r>
-          </a:p>
-          <a:p>
-            <a:pPr/>
-            <a:r>
-              <a:rPr>
-                <a:solidFill>
-                  <a:srgbClr val="C8C8FF"/>
-                </a:solidFill>
-                <a:latin typeface="Arial"/>
-              </a:rPr>
-              <a:t>循环神经网络 (RNN) 与 LSTM：在高盛等金融机构及自然语言处理中开始显露头角。</a:t>
-            </a:r>
-          </a:p>
-        </p:txBody>
-      </p:sp>
-    </p:spTree>
-  </p:cSld>
-  <p:clrMapOvr>
-    <a:masterClrMapping/>
-  </p:clrMapOvr>
-</p:sld>
-</file>
-
-<file path=ppt/slides/slide5.xml><?xml version="1.0" encoding="utf-8"?>
-<p:sld xmlns:a="http://schemas.openxmlformats.org/drawingml/2006/main" xmlns:p="http://schemas.openxmlformats.org/presentationml/2006/main" xmlns:r="http://schemas.openxmlformats.org/officeDocument/2006/relationships">
-  <p:cSld>
-    <p:bg>
-      <p:bgPr>
-        <a:solidFill>
-          <a:srgbClr val="0A0A28"/>
-        </a:solidFill>
-        <a:effectLst/>
-      </p:bgPr>
-    </p:bg>
-    <p:spTree>
-      <p:nvGrpSpPr>
-        <p:cNvPr id="1" name=""/>
-        <p:cNvGrpSpPr/>
-        <p:nvPr/>
-      </p:nvGrpSpPr>
-      <p:grpSpPr/>
-      <p:sp>
-        <p:nvSpPr>
-          <p:cNvPr id="2" name="Title 1"/>
-          <p:cNvSpPr>
-            <a:spLocks noGrp="1"/>
-          </p:cNvSpPr>
-          <p:nvPr>
-            <p:ph type="title"/>
-          </p:nvPr>
-        </p:nvSpPr>
-        <p:spPr/>
-        <p:txBody>
-          <a:bodyPr/>
-          <a:lstStyle/>
-          <a:p>
-            <a:r>
-              <a:rPr>
-                <a:solidFill>
-                  <a:srgbClr val="0066CC"/>
-                </a:solidFill>
-                <a:latin typeface="Arial"/>
-              </a:rPr>
-              <a:t>深度学习革命与大模型时代 (2012-Present)</a:t>
-            </a:r>
-          </a:p>
-        </p:txBody>
-      </p:sp>
-      <p:sp>
-        <p:nvSpPr>
-          <p:cNvPr id="3" name="Text Placeholder 2"/>
-          <p:cNvSpPr>
-            <a:spLocks noGrp="1"/>
-          </p:cNvSpPr>
-          <p:nvPr>
-            <p:ph type="body" idx="1"/>
-          </p:nvPr>
-        </p:nvSpPr>
-        <p:spPr/>
-        <p:txBody>
-          <a:bodyPr/>
-          <a:lstStyle/>
-          <a:p/>
         </p:txBody>
       </p:sp>
     </p:spTree>
@@ -5333,14 +4032,6 @@
 <file path=ppt/slides/slide6.xml><?xml version="1.0" encoding="utf-8"?>
 <p:sld xmlns:a="http://schemas.openxmlformats.org/drawingml/2006/main" xmlns:p="http://schemas.openxmlformats.org/presentationml/2006/main" xmlns:r="http://schemas.openxmlformats.org/officeDocument/2006/relationships">
   <p:cSld>
-    <p:bg>
-      <p:bgPr>
-        <a:solidFill>
-          <a:srgbClr val="0A0A28"/>
-        </a:solidFill>
-        <a:effectLst/>
-      </p:bgPr>
-    </p:bg>
     <p:spTree>
       <p:nvGrpSpPr>
         <p:cNvPr id="1" name=""/>
@@ -5364,116 +4055,6 @@
           <a:lstStyle/>
           <a:p>
             <a:r>
-              <a:rPr>
-                <a:solidFill>
-                  <a:srgbClr val="0066CC"/>
-                </a:solidFill>
-                <a:latin typeface="Arial"/>
-              </a:rPr>
-              <a:t>从 ImageNet 到 Transformer 架构</a:t>
-            </a:r>
-          </a:p>
-        </p:txBody>
-      </p:sp>
-      <p:sp>
-        <p:nvSpPr>
-          <p:cNvPr id="3" name="Content Placeholder 2"/>
-          <p:cNvSpPr>
-            <a:spLocks noGrp="1"/>
-          </p:cNvSpPr>
-          <p:nvPr>
-            <p:ph idx="1"/>
-          </p:nvPr>
-        </p:nvSpPr>
-        <p:spPr/>
-        <p:txBody>
-          <a:bodyPr wrap="square"/>
-          <a:lstStyle/>
-          <a:p/>
-          <a:p>
-            <a:pPr/>
-            <a:r>
-              <a:rPr>
-                <a:solidFill>
-                  <a:srgbClr val="C8C8FF"/>
-                </a:solidFill>
-                <a:latin typeface="Arial"/>
-              </a:rPr>
-              <a:t>2012年：AlexNet 以领先第二名10.8%的优势夺得 ImageNet 冠军，开启深度卷积神经网络时代。</a:t>
-            </a:r>
-          </a:p>
-          <a:p>
-            <a:pPr/>
-            <a:r>
-              <a:rPr>
-                <a:solidFill>
-                  <a:srgbClr val="C8C8FF"/>
-                </a:solidFill>
-                <a:latin typeface="Arial"/>
-              </a:rPr>
-              <a:t>2017年：Google 发表《Attention is All You Need》，提出 Transformer 架构，颠覆序列建模模式。</a:t>
-            </a:r>
-          </a:p>
-          <a:p>
-            <a:pPr/>
-            <a:r>
-              <a:rPr>
-                <a:solidFill>
-                  <a:srgbClr val="C8C8FF"/>
-                </a:solidFill>
-                <a:latin typeface="Arial"/>
-              </a:rPr>
-              <a:t>预训练大模型 (LLMs)：GPT-3 的 1750亿参数规模展示了模型容量与涌现能力 (Emergent Abilities) 的正相关性。</a:t>
-            </a:r>
-          </a:p>
-          <a:p>
-            <a:pPr/>
-            <a:r>
-              <a:rPr>
-                <a:solidFill>
-                  <a:srgbClr val="C8C8FF"/>
-                </a:solidFill>
-                <a:latin typeface="Arial"/>
-              </a:rPr>
-              <a:t>推理与对齐：利用 RLHF (基于人类反馈的强化学习) 解决了模型在道德与逻辑层面的幻觉问题。</a:t>
-            </a:r>
-          </a:p>
-        </p:txBody>
-      </p:sp>
-    </p:spTree>
-  </p:cSld>
-  <p:clrMapOvr>
-    <a:masterClrMapping/>
-  </p:clrMapOvr>
-</p:sld>
-</file>
-
-<file path=ppt/slides/slide7.xml><?xml version="1.0" encoding="utf-8"?>
-<p:sld xmlns:a="http://schemas.openxmlformats.org/drawingml/2006/main" xmlns:p="http://schemas.openxmlformats.org/presentationml/2006/main" xmlns:r="http://schemas.openxmlformats.org/officeDocument/2006/relationships">
-  <p:cSld>
-    <p:spTree>
-      <p:nvGrpSpPr>
-        <p:cNvPr id="1" name=""/>
-        <p:cNvGrpSpPr/>
-        <p:nvPr/>
-      </p:nvGrpSpPr>
-      <p:grpSpPr/>
-      <p:sp>
-        <p:nvSpPr>
-          <p:cNvPr id="2" name="Title 1"/>
-          <p:cNvSpPr>
-            <a:spLocks noGrp="1"/>
-          </p:cNvSpPr>
-          <p:nvPr>
-            <p:ph type="title"/>
-          </p:nvPr>
-        </p:nvSpPr>
-        <p:spPr/>
-        <p:txBody>
-          <a:bodyPr/>
-          <a:lstStyle/>
-          <a:p>
-            <a:r>
               <a:t>References</a:t>
             </a:r>
           </a:p>
@@ -5499,7 +4080,7 @@
               <a:defRPr sz="1200"/>
             </a:pPr>
             <a:r>
-              <a:t>https://www.nih.gov/</a:t>
+              <a:t>https://zh.wikipedia.org/wiki/文艺复兴艺术</a:t>
             </a:r>
           </a:p>
           <a:p>
@@ -5507,7 +4088,7 @@
               <a:defRPr sz="1200"/>
             </a:pPr>
             <a:r>
-              <a:t>https://scholar.google.com/</a:t>
+              <a:t>https://zh.wikipedia.org/wiki/列奥纳多·达·芬奇</a:t>
             </a:r>
           </a:p>
           <a:p>
@@ -5515,167 +4096,9 @@
               <a:defRPr sz="1200"/>
             </a:pPr>
             <a:r>
-              <a:t>https://www.jstor.org/</a:t>
-            </a:r>
-          </a:p>
-          <a:p>
-            <a:pPr>
-              <a:defRPr sz="1200"/>
-            </a:pPr>
-            <a:r>
-              <a:t>https://en.wikipedia.org/wiki/Main_Page</a:t>
-            </a:r>
-          </a:p>
-        </p:txBody>
-      </p:sp>
-    </p:spTree>
-  </p:cSld>
-  <p:clrMapOvr>
-    <a:masterClrMapping/>
-  </p:clrMapOvr>
-</p:sld>
-</file>
-
-<file path=ppt/slides/slide8.xml><?xml version="1.0" encoding="utf-8"?>
-<p:sld xmlns:a="http://schemas.openxmlformats.org/drawingml/2006/main" xmlns:p="http://schemas.openxmlformats.org/presentationml/2006/main" xmlns:r="http://schemas.openxmlformats.org/officeDocument/2006/relationships">
-  <p:cSld>
-    <p:bg>
-      <p:bgPr>
-        <a:solidFill>
-          <a:srgbClr val="F5FFFA"/>
-        </a:solidFill>
-        <a:effectLst/>
-      </p:bgPr>
-    </p:bg>
-    <p:spTree>
-      <p:nvGrpSpPr>
-        <p:cNvPr id="1" name=""/>
-        <p:cNvGrpSpPr/>
-        <p:nvPr/>
-      </p:nvGrpSpPr>
-      <p:grpSpPr/>
-      <p:sp>
-        <p:nvSpPr>
-          <p:cNvPr id="2" name="Title 1"/>
-          <p:cNvSpPr>
-            <a:spLocks noGrp="1"/>
-          </p:cNvSpPr>
-          <p:nvPr>
-            <p:ph type="ctrTitle"/>
-          </p:nvPr>
-        </p:nvSpPr>
-        <p:spPr/>
-        <p:txBody>
-          <a:bodyPr/>
-          <a:lstStyle/>
-          <a:p>
-            <a:r>
-              <a:rPr>
-                <a:solidFill>
-                  <a:srgbClr val="228B22"/>
-                </a:solidFill>
-                <a:latin typeface="Georgia"/>
-              </a:rPr>
-              <a:t>代谢革命：基于现代营养学的长寿科学</a:t>
-            </a:r>
-          </a:p>
-        </p:txBody>
-      </p:sp>
-      <p:sp>
-        <p:nvSpPr>
-          <p:cNvPr id="3" name="Subtitle 2"/>
-          <p:cNvSpPr>
-            <a:spLocks noGrp="1"/>
-          </p:cNvSpPr>
-          <p:nvPr>
-            <p:ph type="subTitle" idx="1"/>
-          </p:nvPr>
-        </p:nvSpPr>
-        <p:spPr/>
-        <p:txBody>
-          <a:bodyPr/>
-          <a:lstStyle/>
-          <a:p>
-            <a:r>
-              <a:rPr>
-                <a:solidFill>
-                  <a:srgbClr val="325032"/>
-                </a:solidFill>
-                <a:latin typeface="Georgia"/>
-              </a:rPr>
-              <a:t>Topic: 现代营养学与代谢健康科学</a:t>
-            </a:r>
-          </a:p>
-        </p:txBody>
-      </p:sp>
-    </p:spTree>
-  </p:cSld>
-  <p:clrMapOvr>
-    <a:masterClrMapping/>
-  </p:clrMapOvr>
-</p:sld>
-</file>
-
-<file path=ppt/slides/slide9.xml><?xml version="1.0" encoding="utf-8"?>
-<p:sld xmlns:a="http://schemas.openxmlformats.org/drawingml/2006/main" xmlns:p="http://schemas.openxmlformats.org/presentationml/2006/main" xmlns:r="http://schemas.openxmlformats.org/officeDocument/2006/relationships">
-  <p:cSld>
-    <p:bg>
-      <p:bgPr>
-        <a:solidFill>
-          <a:srgbClr val="F5FFFA"/>
-        </a:solidFill>
-        <a:effectLst/>
-      </p:bgPr>
-    </p:bg>
-    <p:spTree>
-      <p:nvGrpSpPr>
-        <p:cNvPr id="1" name=""/>
-        <p:cNvGrpSpPr/>
-        <p:nvPr/>
-      </p:nvGrpSpPr>
-      <p:grpSpPr/>
-      <p:sp>
-        <p:nvSpPr>
-          <p:cNvPr id="2" name="Title 1"/>
-          <p:cNvSpPr>
-            <a:spLocks noGrp="1"/>
-          </p:cNvSpPr>
-          <p:nvPr>
-            <p:ph type="title"/>
-          </p:nvPr>
-        </p:nvSpPr>
-        <p:spPr/>
-        <p:txBody>
-          <a:bodyPr/>
-          <a:lstStyle/>
-          <a:p>
-            <a:r>
-              <a:rPr>
-                <a:solidFill>
-                  <a:srgbClr val="228B22"/>
-                </a:solidFill>
-                <a:latin typeface="Georgia"/>
-              </a:rPr>
-              <a:t>细胞能量代谢与胰岛素平衡</a:t>
-            </a:r>
-          </a:p>
-        </p:txBody>
-      </p:sp>
-      <p:sp>
-        <p:nvSpPr>
-          <p:cNvPr id="3" name="Text Placeholder 2"/>
-          <p:cNvSpPr>
-            <a:spLocks noGrp="1"/>
-          </p:cNvSpPr>
-          <p:nvPr>
-            <p:ph type="body" idx="1"/>
-          </p:nvPr>
-        </p:nvSpPr>
-        <p:spPr/>
-        <p:txBody>
-          <a:bodyPr/>
-          <a:lstStyle/>
-          <a:p/>
+              <a:t>https://www.metmuseum.org/toah/hd/itar/hd_itar.htm</a:t>
+            </a:r>
+          </a:p>
         </p:txBody>
       </p:sp>
     </p:spTree>

</xml_diff>